<commit_message>
adding new datasets (raw) and making a list of them in the pptx document
</commit_message>
<xml_diff>
--- a/Projects/M3/Project.pptx
+++ b/Projects/M3/Project.pptx
@@ -6,6 +6,9 @@
   </p:sldMasterIdLst>
   <p:sldIdLst>
     <p:sldId id="256" r:id="rId2"/>
+    <p:sldId id="257" r:id="rId3"/>
+    <p:sldId id="258" r:id="rId4"/>
+    <p:sldId id="259" r:id="rId5"/>
   </p:sldIdLst>
   <p:sldSz cx="12192000" cy="6858000"/>
   <p:notesSz cx="6858000" cy="9144000"/>
@@ -272,7 +275,7 @@
           <a:p>
             <a:fld id="{076CEB0B-9A46-6E4F-A893-3E4C3C2FD4BF}" type="datetimeFigureOut">
               <a:rPr lang="en-CH" smtClean="0"/>
-              <a:t>19.02.21</a:t>
+              <a:t>21.02.21</a:t>
             </a:fld>
             <a:endParaRPr lang="en-CH"/>
           </a:p>
@@ -472,7 +475,7 @@
           <a:p>
             <a:fld id="{076CEB0B-9A46-6E4F-A893-3E4C3C2FD4BF}" type="datetimeFigureOut">
               <a:rPr lang="en-CH" smtClean="0"/>
-              <a:t>19.02.21</a:t>
+              <a:t>21.02.21</a:t>
             </a:fld>
             <a:endParaRPr lang="en-CH"/>
           </a:p>
@@ -682,7 +685,7 @@
           <a:p>
             <a:fld id="{076CEB0B-9A46-6E4F-A893-3E4C3C2FD4BF}" type="datetimeFigureOut">
               <a:rPr lang="en-CH" smtClean="0"/>
-              <a:t>19.02.21</a:t>
+              <a:t>21.02.21</a:t>
             </a:fld>
             <a:endParaRPr lang="en-CH"/>
           </a:p>
@@ -882,7 +885,7 @@
           <a:p>
             <a:fld id="{076CEB0B-9A46-6E4F-A893-3E4C3C2FD4BF}" type="datetimeFigureOut">
               <a:rPr lang="en-CH" smtClean="0"/>
-              <a:t>19.02.21</a:t>
+              <a:t>21.02.21</a:t>
             </a:fld>
             <a:endParaRPr lang="en-CH"/>
           </a:p>
@@ -1158,7 +1161,7 @@
           <a:p>
             <a:fld id="{076CEB0B-9A46-6E4F-A893-3E4C3C2FD4BF}" type="datetimeFigureOut">
               <a:rPr lang="en-CH" smtClean="0"/>
-              <a:t>19.02.21</a:t>
+              <a:t>21.02.21</a:t>
             </a:fld>
             <a:endParaRPr lang="en-CH"/>
           </a:p>
@@ -1426,7 +1429,7 @@
           <a:p>
             <a:fld id="{076CEB0B-9A46-6E4F-A893-3E4C3C2FD4BF}" type="datetimeFigureOut">
               <a:rPr lang="en-CH" smtClean="0"/>
-              <a:t>19.02.21</a:t>
+              <a:t>21.02.21</a:t>
             </a:fld>
             <a:endParaRPr lang="en-CH"/>
           </a:p>
@@ -1841,7 +1844,7 @@
           <a:p>
             <a:fld id="{076CEB0B-9A46-6E4F-A893-3E4C3C2FD4BF}" type="datetimeFigureOut">
               <a:rPr lang="en-CH" smtClean="0"/>
-              <a:t>19.02.21</a:t>
+              <a:t>21.02.21</a:t>
             </a:fld>
             <a:endParaRPr lang="en-CH"/>
           </a:p>
@@ -1983,7 +1986,7 @@
           <a:p>
             <a:fld id="{076CEB0B-9A46-6E4F-A893-3E4C3C2FD4BF}" type="datetimeFigureOut">
               <a:rPr lang="en-CH" smtClean="0"/>
-              <a:t>19.02.21</a:t>
+              <a:t>21.02.21</a:t>
             </a:fld>
             <a:endParaRPr lang="en-CH"/>
           </a:p>
@@ -2096,7 +2099,7 @@
           <a:p>
             <a:fld id="{076CEB0B-9A46-6E4F-A893-3E4C3C2FD4BF}" type="datetimeFigureOut">
               <a:rPr lang="en-CH" smtClean="0"/>
-              <a:t>19.02.21</a:t>
+              <a:t>21.02.21</a:t>
             </a:fld>
             <a:endParaRPr lang="en-CH"/>
           </a:p>
@@ -2409,7 +2412,7 @@
           <a:p>
             <a:fld id="{076CEB0B-9A46-6E4F-A893-3E4C3C2FD4BF}" type="datetimeFigureOut">
               <a:rPr lang="en-CH" smtClean="0"/>
-              <a:t>19.02.21</a:t>
+              <a:t>21.02.21</a:t>
             </a:fld>
             <a:endParaRPr lang="en-CH"/>
           </a:p>
@@ -2698,7 +2701,7 @@
           <a:p>
             <a:fld id="{076CEB0B-9A46-6E4F-A893-3E4C3C2FD4BF}" type="datetimeFigureOut">
               <a:rPr lang="en-CH" smtClean="0"/>
-              <a:t>19.02.21</a:t>
+              <a:t>21.02.21</a:t>
             </a:fld>
             <a:endParaRPr lang="en-CH"/>
           </a:p>
@@ -2941,7 +2944,7 @@
           <a:p>
             <a:fld id="{076CEB0B-9A46-6E4F-A893-3E4C3C2FD4BF}" type="datetimeFigureOut">
               <a:rPr lang="en-CH" smtClean="0"/>
-              <a:t>19.02.21</a:t>
+              <a:t>21.02.21</a:t>
             </a:fld>
             <a:endParaRPr lang="en-CH"/>
           </a:p>
@@ -4675,6 +4678,3828 @@
 </p:sld>
 </file>
 
+<file path=ppt/slides/slide2.xml><?xml version="1.0" encoding="utf-8"?>
+<p:sld xmlns:a="http://schemas.openxmlformats.org/drawingml/2006/main" xmlns:r="http://schemas.openxmlformats.org/officeDocument/2006/relationships" xmlns:p="http://schemas.openxmlformats.org/presentationml/2006/main">
+  <p:cSld>
+    <p:spTree>
+      <p:nvGrpSpPr>
+        <p:cNvPr id="1" name=""/>
+        <p:cNvGrpSpPr/>
+        <p:nvPr/>
+      </p:nvGrpSpPr>
+      <p:grpSpPr>
+        <a:xfrm>
+          <a:off x="0" y="0"/>
+          <a:ext cx="0" cy="0"/>
+          <a:chOff x="0" y="0"/>
+          <a:chExt cx="0" cy="0"/>
+        </a:xfrm>
+      </p:grpSpPr>
+      <p:graphicFrame>
+        <p:nvGraphicFramePr>
+          <p:cNvPr id="2" name="Table 2">
+            <a:extLst>
+              <a:ext uri="{FF2B5EF4-FFF2-40B4-BE49-F238E27FC236}">
+                <a16:creationId xmlns:a16="http://schemas.microsoft.com/office/drawing/2014/main" id="{0B18FDD4-F617-3F41-8EA5-49E5BB8E8F8A}"/>
+              </a:ext>
+            </a:extLst>
+          </p:cNvPr>
+          <p:cNvGraphicFramePr>
+            <a:graphicFrameLocks noGrp="1"/>
+          </p:cNvGraphicFramePr>
+          <p:nvPr>
+            <p:extLst>
+              <p:ext uri="{D42A27DB-BD31-4B8C-83A1-F6EECF244321}">
+                <p14:modId xmlns:p14="http://schemas.microsoft.com/office/powerpoint/2010/main" val="2239274586"/>
+              </p:ext>
+            </p:extLst>
+          </p:nvPr>
+        </p:nvGraphicFramePr>
+        <p:xfrm>
+          <a:off x="262472" y="149860"/>
+          <a:ext cx="11578156" cy="6187440"/>
+        </p:xfrm>
+        <a:graphic>
+          <a:graphicData uri="http://schemas.openxmlformats.org/drawingml/2006/table">
+            <a:tbl>
+              <a:tblPr firstRow="1" bandRow="1">
+                <a:tableStyleId>{5C22544A-7EE6-4342-B048-85BDC9FD1C3A}</a:tableStyleId>
+              </a:tblPr>
+              <a:tblGrid>
+                <a:gridCol w="1172327">
+                  <a:extLst>
+                    <a:ext uri="{9D8B030D-6E8A-4147-A177-3AD203B41FA5}">
+                      <a16:colId xmlns:a16="http://schemas.microsoft.com/office/drawing/2014/main" val="560671824"/>
+                    </a:ext>
+                  </a:extLst>
+                </a:gridCol>
+                <a:gridCol w="1933506">
+                  <a:extLst>
+                    <a:ext uri="{9D8B030D-6E8A-4147-A177-3AD203B41FA5}">
+                      <a16:colId xmlns:a16="http://schemas.microsoft.com/office/drawing/2014/main" val="4152309054"/>
+                    </a:ext>
+                  </a:extLst>
+                </a:gridCol>
+                <a:gridCol w="1447630">
+                  <a:extLst>
+                    <a:ext uri="{9D8B030D-6E8A-4147-A177-3AD203B41FA5}">
+                      <a16:colId xmlns:a16="http://schemas.microsoft.com/office/drawing/2014/main" val="3334091744"/>
+                    </a:ext>
+                  </a:extLst>
+                </a:gridCol>
+                <a:gridCol w="1447630">
+                  <a:extLst>
+                    <a:ext uri="{9D8B030D-6E8A-4147-A177-3AD203B41FA5}">
+                      <a16:colId xmlns:a16="http://schemas.microsoft.com/office/drawing/2014/main" val="1803823765"/>
+                    </a:ext>
+                  </a:extLst>
+                </a:gridCol>
+                <a:gridCol w="1015964">
+                  <a:extLst>
+                    <a:ext uri="{9D8B030D-6E8A-4147-A177-3AD203B41FA5}">
+                      <a16:colId xmlns:a16="http://schemas.microsoft.com/office/drawing/2014/main" val="1239427225"/>
+                    </a:ext>
+                  </a:extLst>
+                </a:gridCol>
+                <a:gridCol w="1015964">
+                  <a:extLst>
+                    <a:ext uri="{9D8B030D-6E8A-4147-A177-3AD203B41FA5}">
+                      <a16:colId xmlns:a16="http://schemas.microsoft.com/office/drawing/2014/main" val="3084226329"/>
+                    </a:ext>
+                  </a:extLst>
+                </a:gridCol>
+                <a:gridCol w="1015964">
+                  <a:extLst>
+                    <a:ext uri="{9D8B030D-6E8A-4147-A177-3AD203B41FA5}">
+                      <a16:colId xmlns:a16="http://schemas.microsoft.com/office/drawing/2014/main" val="4170340966"/>
+                    </a:ext>
+                  </a:extLst>
+                </a:gridCol>
+                <a:gridCol w="2529171">
+                  <a:extLst>
+                    <a:ext uri="{9D8B030D-6E8A-4147-A177-3AD203B41FA5}">
+                      <a16:colId xmlns:a16="http://schemas.microsoft.com/office/drawing/2014/main" val="4264531284"/>
+                    </a:ext>
+                  </a:extLst>
+                </a:gridCol>
+              </a:tblGrid>
+              <a:tr h="370840">
+                <a:tc>
+                  <a:txBody>
+                    <a:bodyPr/>
+                    <a:lstStyle/>
+                    <a:p>
+                      <a:r>
+                        <a:rPr lang="en-CH" sz="1400" dirty="0"/>
+                        <a:t>Indicator</a:t>
+                      </a:r>
+                    </a:p>
+                  </a:txBody>
+                  <a:tcPr/>
+                </a:tc>
+                <a:tc>
+                  <a:txBody>
+                    <a:bodyPr/>
+                    <a:lstStyle/>
+                    <a:p>
+                      <a:r>
+                        <a:rPr lang="en-CH" sz="1400" dirty="0"/>
+                        <a:t>Source</a:t>
+                      </a:r>
+                    </a:p>
+                  </a:txBody>
+                  <a:tcPr/>
+                </a:tc>
+                <a:tc>
+                  <a:txBody>
+                    <a:bodyPr/>
+                    <a:lstStyle/>
+                    <a:p>
+                      <a:r>
+                        <a:rPr lang="en-CH" sz="1400" dirty="0"/>
+                        <a:t>Indicator class</a:t>
+                      </a:r>
+                    </a:p>
+                  </a:txBody>
+                  <a:tcPr/>
+                </a:tc>
+                <a:tc>
+                  <a:txBody>
+                    <a:bodyPr/>
+                    <a:lstStyle/>
+                    <a:p>
+                      <a:r>
+                        <a:rPr lang="en-CH" sz="1400" dirty="0"/>
+                        <a:t>Available years</a:t>
+                      </a:r>
+                    </a:p>
+                  </a:txBody>
+                  <a:tcPr/>
+                </a:tc>
+                <a:tc>
+                  <a:txBody>
+                    <a:bodyPr/>
+                    <a:lstStyle/>
+                    <a:p>
+                      <a:r>
+                        <a:rPr lang="en-CH" sz="1400" dirty="0"/>
+                        <a:t>Available countries</a:t>
+                      </a:r>
+                    </a:p>
+                  </a:txBody>
+                  <a:tcPr/>
+                </a:tc>
+                <a:tc>
+                  <a:txBody>
+                    <a:bodyPr/>
+                    <a:lstStyle/>
+                    <a:p>
+                      <a:r>
+                        <a:rPr lang="en-CH" sz="1400" dirty="0"/>
+                        <a:t>Access</a:t>
+                      </a:r>
+                    </a:p>
+                  </a:txBody>
+                  <a:tcPr/>
+                </a:tc>
+                <a:tc>
+                  <a:txBody>
+                    <a:bodyPr/>
+                    <a:lstStyle/>
+                    <a:p>
+                      <a:r>
+                        <a:rPr lang="en-GB" sz="1400" dirty="0"/>
+                        <a:t>Responsa</a:t>
+                      </a:r>
+                      <a:r>
+                        <a:rPr lang="en-CH" sz="1400" dirty="0"/>
+                        <a:t>ble?</a:t>
+                      </a:r>
+                    </a:p>
+                  </a:txBody>
+                  <a:tcPr/>
+                </a:tc>
+                <a:tc>
+                  <a:txBody>
+                    <a:bodyPr/>
+                    <a:lstStyle/>
+                    <a:p>
+                      <a:r>
+                        <a:rPr lang="en-CH" sz="1400" dirty="0"/>
+                        <a:t>Home link</a:t>
+                      </a:r>
+                    </a:p>
+                  </a:txBody>
+                  <a:tcPr/>
+                </a:tc>
+                <a:extLst>
+                  <a:ext uri="{0D108BD9-81ED-4DB2-BD59-A6C34878D82A}">
+                    <a16:rowId xmlns:a16="http://schemas.microsoft.com/office/drawing/2014/main" val="451230032"/>
+                  </a:ext>
+                </a:extLst>
+              </a:tr>
+              <a:tr h="370840">
+                <a:tc>
+                  <a:txBody>
+                    <a:bodyPr/>
+                    <a:lstStyle/>
+                    <a:p>
+                      <a:r>
+                        <a:rPr lang="en-CH" sz="1400" dirty="0"/>
+                        <a:t>Human development Index (HDI)</a:t>
+                      </a:r>
+                    </a:p>
+                  </a:txBody>
+                  <a:tcPr/>
+                </a:tc>
+                <a:tc>
+                  <a:txBody>
+                    <a:bodyPr/>
+                    <a:lstStyle/>
+                    <a:p>
+                      <a:r>
+                        <a:rPr lang="en-CH" sz="1400" dirty="0"/>
+                        <a:t>Human development data center (UNDP)</a:t>
+                      </a:r>
+                    </a:p>
+                  </a:txBody>
+                  <a:tcPr/>
+                </a:tc>
+                <a:tc>
+                  <a:txBody>
+                    <a:bodyPr/>
+                    <a:lstStyle/>
+                    <a:p>
+                      <a:r>
+                        <a:rPr lang="en-CH" sz="1400" dirty="0"/>
+                        <a:t>Socio economic, complex</a:t>
+                      </a:r>
+                    </a:p>
+                  </a:txBody>
+                  <a:tcPr/>
+                </a:tc>
+                <a:tc>
+                  <a:txBody>
+                    <a:bodyPr/>
+                    <a:lstStyle/>
+                    <a:p>
+                      <a:r>
+                        <a:rPr lang="en-CH" sz="1400" dirty="0"/>
+                        <a:t>2019-2010,</a:t>
+                      </a:r>
+                    </a:p>
+                    <a:p>
+                      <a:r>
+                        <a:rPr lang="en-CH" sz="1400" dirty="0"/>
+                        <a:t>2005, 2000,</a:t>
+                      </a:r>
+                    </a:p>
+                    <a:p>
+                      <a:r>
+                        <a:rPr lang="en-CH" sz="1400" dirty="0"/>
+                        <a:t>1995,1990</a:t>
+                      </a:r>
+                    </a:p>
+                  </a:txBody>
+                  <a:tcPr/>
+                </a:tc>
+                <a:tc>
+                  <a:txBody>
+                    <a:bodyPr/>
+                    <a:lstStyle/>
+                    <a:p>
+                      <a:r>
+                        <a:rPr lang="en-CH" sz="1400" dirty="0"/>
+                        <a:t>ALL?</a:t>
+                      </a:r>
+                    </a:p>
+                  </a:txBody>
+                  <a:tcPr/>
+                </a:tc>
+                <a:tc>
+                  <a:txBody>
+                    <a:bodyPr/>
+                    <a:lstStyle/>
+                    <a:p>
+                      <a:r>
+                        <a:rPr lang="en-CH" sz="1400" dirty="0"/>
+                        <a:t>API - UNDP</a:t>
+                      </a:r>
+                    </a:p>
+                  </a:txBody>
+                  <a:tcPr/>
+                </a:tc>
+                <a:tc>
+                  <a:txBody>
+                    <a:bodyPr/>
+                    <a:lstStyle/>
+                    <a:p>
+                      <a:r>
+                        <a:rPr lang="en-CH" sz="1400" dirty="0"/>
+                        <a:t>Ruben</a:t>
+                      </a:r>
+                    </a:p>
+                  </a:txBody>
+                  <a:tcPr/>
+                </a:tc>
+                <a:tc>
+                  <a:txBody>
+                    <a:bodyPr/>
+                    <a:lstStyle/>
+                    <a:p>
+                      <a:r>
+                        <a:rPr lang="en-GB" sz="1400" dirty="0"/>
+                        <a:t>http://</a:t>
+                      </a:r>
+                      <a:r>
+                        <a:rPr lang="en-GB" sz="1400" dirty="0" err="1"/>
+                        <a:t>hdr.undp.org</a:t>
+                      </a:r>
+                      <a:r>
+                        <a:rPr lang="en-GB" sz="1400" dirty="0"/>
+                        <a:t>/</a:t>
+                      </a:r>
+                      <a:r>
+                        <a:rPr lang="en-GB" sz="1400" dirty="0" err="1"/>
+                        <a:t>en</a:t>
+                      </a:r>
+                      <a:r>
+                        <a:rPr lang="en-GB" sz="1400" dirty="0"/>
+                        <a:t>/data</a:t>
+                      </a:r>
+                      <a:endParaRPr lang="en-CH" sz="1400" dirty="0"/>
+                    </a:p>
+                  </a:txBody>
+                  <a:tcPr/>
+                </a:tc>
+                <a:extLst>
+                  <a:ext uri="{0D108BD9-81ED-4DB2-BD59-A6C34878D82A}">
+                    <a16:rowId xmlns:a16="http://schemas.microsoft.com/office/drawing/2014/main" val="3825695763"/>
+                  </a:ext>
+                </a:extLst>
+              </a:tr>
+              <a:tr h="370840">
+                <a:tc>
+                  <a:txBody>
+                    <a:bodyPr/>
+                    <a:lstStyle/>
+                    <a:p>
+                      <a:r>
+                        <a:rPr lang="en-CH" sz="1400" dirty="0"/>
+                        <a:t>Gross National Income per capita in purchasing power parities (GNI,ppp)</a:t>
+                      </a:r>
+                    </a:p>
+                  </a:txBody>
+                  <a:tcPr/>
+                </a:tc>
+                <a:tc>
+                  <a:txBody>
+                    <a:bodyPr/>
+                    <a:lstStyle/>
+                    <a:p>
+                      <a:r>
+                        <a:rPr lang="en-CH" sz="1400" dirty="0"/>
+                        <a:t>World Bank</a:t>
+                      </a:r>
+                    </a:p>
+                  </a:txBody>
+                  <a:tcPr/>
+                </a:tc>
+                <a:tc>
+                  <a:txBody>
+                    <a:bodyPr/>
+                    <a:lstStyle/>
+                    <a:p>
+                      <a:r>
+                        <a:rPr lang="en-CH" sz="1400" dirty="0"/>
+                        <a:t>Economic</a:t>
+                      </a:r>
+                    </a:p>
+                  </a:txBody>
+                  <a:tcPr/>
+                </a:tc>
+                <a:tc>
+                  <a:txBody>
+                    <a:bodyPr/>
+                    <a:lstStyle/>
+                    <a:p>
+                      <a:r>
+                        <a:rPr lang="en-CH" sz="1400" dirty="0"/>
+                        <a:t>all?</a:t>
+                      </a:r>
+                    </a:p>
+                  </a:txBody>
+                  <a:tcPr/>
+                </a:tc>
+                <a:tc>
+                  <a:txBody>
+                    <a:bodyPr/>
+                    <a:lstStyle/>
+                    <a:p>
+                      <a:r>
+                        <a:rPr lang="en-CH" sz="1400" dirty="0"/>
+                        <a:t>All?</a:t>
+                      </a:r>
+                    </a:p>
+                  </a:txBody>
+                  <a:tcPr/>
+                </a:tc>
+                <a:tc>
+                  <a:txBody>
+                    <a:bodyPr/>
+                    <a:lstStyle/>
+                    <a:p>
+                      <a:r>
+                        <a:rPr lang="en-CH" sz="1400" dirty="0"/>
+                        <a:t>API – World Bnak</a:t>
+                      </a:r>
+                    </a:p>
+                  </a:txBody>
+                  <a:tcPr/>
+                </a:tc>
+                <a:tc>
+                  <a:txBody>
+                    <a:bodyPr/>
+                    <a:lstStyle/>
+                    <a:p>
+                      <a:r>
+                        <a:rPr lang="en-CH" sz="1400" dirty="0"/>
+                        <a:t>Ruben</a:t>
+                      </a:r>
+                    </a:p>
+                  </a:txBody>
+                  <a:tcPr/>
+                </a:tc>
+                <a:tc>
+                  <a:txBody>
+                    <a:bodyPr/>
+                    <a:lstStyle/>
+                    <a:p>
+                      <a:r>
+                        <a:rPr lang="en-GB" sz="1400" dirty="0"/>
+                        <a:t>https://</a:t>
+                      </a:r>
+                      <a:r>
+                        <a:rPr lang="en-GB" sz="1400" dirty="0" err="1"/>
+                        <a:t>datahelpdesk.worldbank.org</a:t>
+                      </a:r>
+                      <a:r>
+                        <a:rPr lang="en-GB" sz="1400" dirty="0"/>
+                        <a:t>/knowledgebase/topics/125589-developer-information</a:t>
+                      </a:r>
+                      <a:endParaRPr lang="en-CH" sz="1400" dirty="0"/>
+                    </a:p>
+                  </a:txBody>
+                  <a:tcPr/>
+                </a:tc>
+                <a:extLst>
+                  <a:ext uri="{0D108BD9-81ED-4DB2-BD59-A6C34878D82A}">
+                    <a16:rowId xmlns:a16="http://schemas.microsoft.com/office/drawing/2014/main" val="1829815335"/>
+                  </a:ext>
+                </a:extLst>
+              </a:tr>
+              <a:tr h="370840">
+                <a:tc>
+                  <a:txBody>
+                    <a:bodyPr/>
+                    <a:lstStyle/>
+                    <a:p>
+                      <a:r>
+                        <a:rPr lang="en-CH" sz="1400" dirty="0"/>
+                        <a:t>Corruption Perception Index (CPI)</a:t>
+                      </a:r>
+                    </a:p>
+                  </a:txBody>
+                  <a:tcPr/>
+                </a:tc>
+                <a:tc>
+                  <a:txBody>
+                    <a:bodyPr/>
+                    <a:lstStyle/>
+                    <a:p>
+                      <a:r>
+                        <a:rPr lang="en-CH" sz="1400" dirty="0"/>
+                        <a:t>Transparency international</a:t>
+                      </a:r>
+                    </a:p>
+                  </a:txBody>
+                  <a:tcPr/>
+                </a:tc>
+                <a:tc>
+                  <a:txBody>
+                    <a:bodyPr/>
+                    <a:lstStyle/>
+                    <a:p>
+                      <a:r>
+                        <a:rPr lang="en-CH" sz="1400" dirty="0"/>
+                        <a:t>Political, complex</a:t>
+                      </a:r>
+                    </a:p>
+                  </a:txBody>
+                  <a:tcPr/>
+                </a:tc>
+                <a:tc>
+                  <a:txBody>
+                    <a:bodyPr/>
+                    <a:lstStyle/>
+                    <a:p>
+                      <a:r>
+                        <a:rPr lang="en-CH" sz="1400" dirty="0"/>
+                        <a:t>&gt;2012</a:t>
+                      </a:r>
+                    </a:p>
+                  </a:txBody>
+                  <a:tcPr/>
+                </a:tc>
+                <a:tc>
+                  <a:txBody>
+                    <a:bodyPr/>
+                    <a:lstStyle/>
+                    <a:p>
+                      <a:r>
+                        <a:rPr lang="en-CH" sz="1400" dirty="0"/>
+                        <a:t>ALL?</a:t>
+                      </a:r>
+                    </a:p>
+                  </a:txBody>
+                  <a:tcPr/>
+                </a:tc>
+                <a:tc>
+                  <a:txBody>
+                    <a:bodyPr/>
+                    <a:lstStyle/>
+                    <a:p>
+                      <a:r>
+                        <a:rPr lang="en-GB" sz="1400" dirty="0"/>
+                        <a:t>D</a:t>
+                      </a:r>
+                      <a:r>
+                        <a:rPr lang="en-CH" sz="1400" dirty="0"/>
+                        <a:t>irect download</a:t>
+                      </a:r>
+                    </a:p>
+                  </a:txBody>
+                  <a:tcPr/>
+                </a:tc>
+                <a:tc>
+                  <a:txBody>
+                    <a:bodyPr/>
+                    <a:lstStyle/>
+                    <a:p>
+                      <a:r>
+                        <a:rPr lang="en-CH" sz="1400" dirty="0"/>
+                        <a:t>Ruben</a:t>
+                      </a:r>
+                    </a:p>
+                  </a:txBody>
+                  <a:tcPr/>
+                </a:tc>
+                <a:tc>
+                  <a:txBody>
+                    <a:bodyPr/>
+                    <a:lstStyle/>
+                    <a:p>
+                      <a:r>
+                        <a:rPr lang="en-GB" sz="1400" dirty="0"/>
+                        <a:t>https://</a:t>
+                      </a:r>
+                      <a:r>
+                        <a:rPr lang="en-GB" sz="1400" dirty="0" err="1"/>
+                        <a:t>www.transparency.org</a:t>
+                      </a:r>
+                      <a:r>
+                        <a:rPr lang="en-GB" sz="1400" dirty="0"/>
+                        <a:t>/</a:t>
+                      </a:r>
+                      <a:r>
+                        <a:rPr lang="en-GB" sz="1400" dirty="0" err="1"/>
+                        <a:t>en</a:t>
+                      </a:r>
+                      <a:r>
+                        <a:rPr lang="en-GB" sz="1400" dirty="0"/>
+                        <a:t>/cpi/2020/index/</a:t>
+                      </a:r>
+                      <a:r>
+                        <a:rPr lang="en-GB" sz="1400" dirty="0" err="1"/>
+                        <a:t>nzl</a:t>
+                      </a:r>
+                      <a:endParaRPr lang="en-CH" sz="1400" dirty="0"/>
+                    </a:p>
+                  </a:txBody>
+                  <a:tcPr/>
+                </a:tc>
+                <a:extLst>
+                  <a:ext uri="{0D108BD9-81ED-4DB2-BD59-A6C34878D82A}">
+                    <a16:rowId xmlns:a16="http://schemas.microsoft.com/office/drawing/2014/main" val="2216577571"/>
+                  </a:ext>
+                </a:extLst>
+              </a:tr>
+              <a:tr h="370840">
+                <a:tc>
+                  <a:txBody>
+                    <a:bodyPr/>
+                    <a:lstStyle/>
+                    <a:p>
+                      <a:r>
+                        <a:rPr lang="en-CH" sz="1400" dirty="0"/>
+                        <a:t>Government Effectiveness Indicator (GEI)</a:t>
+                      </a:r>
+                    </a:p>
+                  </a:txBody>
+                  <a:tcPr/>
+                </a:tc>
+                <a:tc>
+                  <a:txBody>
+                    <a:bodyPr/>
+                    <a:lstStyle/>
+                    <a:p>
+                      <a:pPr marL="0" marR="0" lvl="0" indent="0" algn="l" defTabSz="914400" rtl="0" eaLnBrk="1" fontAlgn="auto" latinLnBrk="0" hangingPunct="1">
+                        <a:lnSpc>
+                          <a:spcPct val="100000"/>
+                        </a:lnSpc>
+                        <a:spcBef>
+                          <a:spcPts val="0"/>
+                        </a:spcBef>
+                        <a:spcAft>
+                          <a:spcPts val="0"/>
+                        </a:spcAft>
+                        <a:buClrTx/>
+                        <a:buSzTx/>
+                        <a:buFontTx/>
+                        <a:buNone/>
+                        <a:tabLst/>
+                        <a:defRPr/>
+                      </a:pPr>
+                      <a:r>
+                        <a:rPr lang="en-CH" sz="1400" dirty="0"/>
+                        <a:t>World Bank</a:t>
+                      </a:r>
+                    </a:p>
+                    <a:p>
+                      <a:endParaRPr lang="en-CH" sz="1400" dirty="0"/>
+                    </a:p>
+                  </a:txBody>
+                  <a:tcPr/>
+                </a:tc>
+                <a:tc>
+                  <a:txBody>
+                    <a:bodyPr/>
+                    <a:lstStyle/>
+                    <a:p>
+                      <a:r>
+                        <a:rPr lang="en-CH" sz="1400" dirty="0"/>
+                        <a:t>Political, complex</a:t>
+                      </a:r>
+                    </a:p>
+                  </a:txBody>
+                  <a:tcPr/>
+                </a:tc>
+                <a:tc>
+                  <a:txBody>
+                    <a:bodyPr/>
+                    <a:lstStyle/>
+                    <a:p>
+                      <a:r>
+                        <a:rPr lang="en-CH" sz="1400" dirty="0"/>
+                        <a:t>&gt;1996</a:t>
+                      </a:r>
+                    </a:p>
+                  </a:txBody>
+                  <a:tcPr/>
+                </a:tc>
+                <a:tc>
+                  <a:txBody>
+                    <a:bodyPr/>
+                    <a:lstStyle/>
+                    <a:p>
+                      <a:r>
+                        <a:rPr lang="en-CH" sz="1400" dirty="0"/>
+                        <a:t>ALL?</a:t>
+                      </a:r>
+                    </a:p>
+                  </a:txBody>
+                  <a:tcPr/>
+                </a:tc>
+                <a:tc>
+                  <a:txBody>
+                    <a:bodyPr/>
+                    <a:lstStyle/>
+                    <a:p>
+                      <a:pPr marL="0" marR="0" lvl="0" indent="0" algn="l" defTabSz="914400" rtl="0" eaLnBrk="1" fontAlgn="auto" latinLnBrk="0" hangingPunct="1">
+                        <a:lnSpc>
+                          <a:spcPct val="100000"/>
+                        </a:lnSpc>
+                        <a:spcBef>
+                          <a:spcPts val="0"/>
+                        </a:spcBef>
+                        <a:spcAft>
+                          <a:spcPts val="0"/>
+                        </a:spcAft>
+                        <a:buClrTx/>
+                        <a:buSzTx/>
+                        <a:buFontTx/>
+                        <a:buNone/>
+                        <a:tabLst/>
+                        <a:defRPr/>
+                      </a:pPr>
+                      <a:r>
+                        <a:rPr lang="en-GB" sz="1400" dirty="0"/>
+                        <a:t>D</a:t>
+                      </a:r>
+                      <a:r>
+                        <a:rPr lang="en-CH" sz="1400" dirty="0"/>
+                        <a:t>irect download</a:t>
+                      </a:r>
+                    </a:p>
+                    <a:p>
+                      <a:endParaRPr lang="en-CH" sz="1400" dirty="0"/>
+                    </a:p>
+                  </a:txBody>
+                  <a:tcPr/>
+                </a:tc>
+                <a:tc>
+                  <a:txBody>
+                    <a:bodyPr/>
+                    <a:lstStyle/>
+                    <a:p>
+                      <a:r>
+                        <a:rPr lang="en-CH" sz="1400" dirty="0"/>
+                        <a:t>Ruben</a:t>
+                      </a:r>
+                    </a:p>
+                  </a:txBody>
+                  <a:tcPr/>
+                </a:tc>
+                <a:tc>
+                  <a:txBody>
+                    <a:bodyPr/>
+                    <a:lstStyle/>
+                    <a:p>
+                      <a:r>
+                        <a:rPr lang="en-GB" sz="1400" dirty="0"/>
+                        <a:t>http://</a:t>
+                      </a:r>
+                      <a:r>
+                        <a:rPr lang="en-GB" sz="1400" dirty="0" err="1"/>
+                        <a:t>info.worldbank.org</a:t>
+                      </a:r>
+                      <a:r>
+                        <a:rPr lang="en-GB" sz="1400" dirty="0"/>
+                        <a:t>/governance/</a:t>
+                      </a:r>
+                      <a:r>
+                        <a:rPr lang="en-GB" sz="1400" dirty="0" err="1"/>
+                        <a:t>wgi</a:t>
+                      </a:r>
+                      <a:r>
+                        <a:rPr lang="en-GB" sz="1400" dirty="0"/>
+                        <a:t>/</a:t>
+                      </a:r>
+                      <a:endParaRPr lang="en-CH" sz="1400" dirty="0"/>
+                    </a:p>
+                  </a:txBody>
+                  <a:tcPr/>
+                </a:tc>
+                <a:extLst>
+                  <a:ext uri="{0D108BD9-81ED-4DB2-BD59-A6C34878D82A}">
+                    <a16:rowId xmlns:a16="http://schemas.microsoft.com/office/drawing/2014/main" val="499843032"/>
+                  </a:ext>
+                </a:extLst>
+              </a:tr>
+              <a:tr h="370840">
+                <a:tc>
+                  <a:txBody>
+                    <a:bodyPr/>
+                    <a:lstStyle/>
+                    <a:p>
+                      <a:r>
+                        <a:rPr lang="en-CH" sz="1400" dirty="0"/>
+                        <a:t>Politics right Index (PRI)</a:t>
+                      </a:r>
+                    </a:p>
+                  </a:txBody>
+                  <a:tcPr/>
+                </a:tc>
+                <a:tc>
+                  <a:txBody>
+                    <a:bodyPr/>
+                    <a:lstStyle/>
+                    <a:p>
+                      <a:r>
+                        <a:rPr lang="en-CH" sz="1400" dirty="0"/>
+                        <a:t>Freedom Hause</a:t>
+                      </a:r>
+                    </a:p>
+                  </a:txBody>
+                  <a:tcPr/>
+                </a:tc>
+                <a:tc>
+                  <a:txBody>
+                    <a:bodyPr/>
+                    <a:lstStyle/>
+                    <a:p>
+                      <a:r>
+                        <a:rPr lang="en-CH" sz="1400" dirty="0"/>
+                        <a:t>Political, social, complex</a:t>
+                      </a:r>
+                    </a:p>
+                  </a:txBody>
+                  <a:tcPr/>
+                </a:tc>
+                <a:tc>
+                  <a:txBody>
+                    <a:bodyPr/>
+                    <a:lstStyle/>
+                    <a:p>
+                      <a:r>
+                        <a:rPr lang="en-CH" sz="1400" dirty="0"/>
+                        <a:t>&gt;2013</a:t>
+                      </a:r>
+                    </a:p>
+                  </a:txBody>
+                  <a:tcPr/>
+                </a:tc>
+                <a:tc>
+                  <a:txBody>
+                    <a:bodyPr/>
+                    <a:lstStyle/>
+                    <a:p>
+                      <a:r>
+                        <a:rPr lang="en-GB" sz="1400" dirty="0"/>
+                        <a:t>A</a:t>
+                      </a:r>
+                      <a:r>
+                        <a:rPr lang="en-CH" sz="1400" dirty="0"/>
+                        <a:t>ll?</a:t>
+                      </a:r>
+                    </a:p>
+                  </a:txBody>
+                  <a:tcPr/>
+                </a:tc>
+                <a:tc>
+                  <a:txBody>
+                    <a:bodyPr/>
+                    <a:lstStyle/>
+                    <a:p>
+                      <a:pPr marL="0" marR="0" lvl="0" indent="0" algn="l" defTabSz="914400" rtl="0" eaLnBrk="1" fontAlgn="auto" latinLnBrk="0" hangingPunct="1">
+                        <a:lnSpc>
+                          <a:spcPct val="100000"/>
+                        </a:lnSpc>
+                        <a:spcBef>
+                          <a:spcPts val="0"/>
+                        </a:spcBef>
+                        <a:spcAft>
+                          <a:spcPts val="0"/>
+                        </a:spcAft>
+                        <a:buClrTx/>
+                        <a:buSzTx/>
+                        <a:buFontTx/>
+                        <a:buNone/>
+                        <a:tabLst/>
+                        <a:defRPr/>
+                      </a:pPr>
+                      <a:r>
+                        <a:rPr lang="en-GB" sz="1400" dirty="0"/>
+                        <a:t>D</a:t>
+                      </a:r>
+                      <a:r>
+                        <a:rPr lang="en-CH" sz="1400" dirty="0"/>
+                        <a:t>irect download</a:t>
+                      </a:r>
+                    </a:p>
+                  </a:txBody>
+                  <a:tcPr/>
+                </a:tc>
+                <a:tc>
+                  <a:txBody>
+                    <a:bodyPr/>
+                    <a:lstStyle/>
+                    <a:p>
+                      <a:r>
+                        <a:rPr lang="en-CH" sz="1400" dirty="0"/>
+                        <a:t>Ruben</a:t>
+                      </a:r>
+                    </a:p>
+                  </a:txBody>
+                  <a:tcPr/>
+                </a:tc>
+                <a:tc>
+                  <a:txBody>
+                    <a:bodyPr/>
+                    <a:lstStyle/>
+                    <a:p>
+                      <a:r>
+                        <a:rPr lang="en-GB" sz="1400" dirty="0"/>
+                        <a:t>https://</a:t>
+                      </a:r>
+                      <a:r>
+                        <a:rPr lang="en-GB" sz="1400" dirty="0" err="1"/>
+                        <a:t>freedomhouse.org</a:t>
+                      </a:r>
+                      <a:r>
+                        <a:rPr lang="en-GB" sz="1400" dirty="0"/>
+                        <a:t>/report/freedom-world</a:t>
+                      </a:r>
+                      <a:endParaRPr lang="en-CH" sz="1400" dirty="0"/>
+                    </a:p>
+                  </a:txBody>
+                  <a:tcPr/>
+                </a:tc>
+                <a:extLst>
+                  <a:ext uri="{0D108BD9-81ED-4DB2-BD59-A6C34878D82A}">
+                    <a16:rowId xmlns:a16="http://schemas.microsoft.com/office/drawing/2014/main" val="4103178330"/>
+                  </a:ext>
+                </a:extLst>
+              </a:tr>
+              <a:tr h="370840">
+                <a:tc>
+                  <a:txBody>
+                    <a:bodyPr/>
+                    <a:lstStyle/>
+                    <a:p>
+                      <a:r>
+                        <a:rPr lang="en-CH" sz="1400" dirty="0"/>
+                        <a:t>Civil Liberties index</a:t>
+                      </a:r>
+                    </a:p>
+                  </a:txBody>
+                  <a:tcPr/>
+                </a:tc>
+                <a:tc>
+                  <a:txBody>
+                    <a:bodyPr/>
+                    <a:lstStyle/>
+                    <a:p>
+                      <a:pPr marL="0" marR="0" lvl="0" indent="0" algn="l" defTabSz="914400" rtl="0" eaLnBrk="1" fontAlgn="auto" latinLnBrk="0" hangingPunct="1">
+                        <a:lnSpc>
+                          <a:spcPct val="100000"/>
+                        </a:lnSpc>
+                        <a:spcBef>
+                          <a:spcPts val="0"/>
+                        </a:spcBef>
+                        <a:spcAft>
+                          <a:spcPts val="0"/>
+                        </a:spcAft>
+                        <a:buClrTx/>
+                        <a:buSzTx/>
+                        <a:buFontTx/>
+                        <a:buNone/>
+                        <a:tabLst/>
+                        <a:defRPr/>
+                      </a:pPr>
+                      <a:r>
+                        <a:rPr lang="en-CH" sz="1400" dirty="0"/>
+                        <a:t>World Bank</a:t>
+                      </a:r>
+                    </a:p>
+                  </a:txBody>
+                  <a:tcPr/>
+                </a:tc>
+                <a:tc>
+                  <a:txBody>
+                    <a:bodyPr/>
+                    <a:lstStyle/>
+                    <a:p>
+                      <a:r>
+                        <a:rPr lang="en-CH" sz="1400" dirty="0"/>
+                        <a:t>Social, political, complex</a:t>
+                      </a:r>
+                    </a:p>
+                  </a:txBody>
+                  <a:tcPr/>
+                </a:tc>
+                <a:tc>
+                  <a:txBody>
+                    <a:bodyPr/>
+                    <a:lstStyle/>
+                    <a:p>
+                      <a:r>
+                        <a:rPr lang="en-CH" sz="1400" dirty="0"/>
+                        <a:t>&gt;1975</a:t>
+                      </a:r>
+                    </a:p>
+                  </a:txBody>
+                  <a:tcPr/>
+                </a:tc>
+                <a:tc>
+                  <a:txBody>
+                    <a:bodyPr/>
+                    <a:lstStyle/>
+                    <a:p>
+                      <a:r>
+                        <a:rPr lang="en-CH" sz="1400" dirty="0"/>
+                        <a:t>All?</a:t>
+                      </a:r>
+                    </a:p>
+                  </a:txBody>
+                  <a:tcPr/>
+                </a:tc>
+                <a:tc>
+                  <a:txBody>
+                    <a:bodyPr/>
+                    <a:lstStyle/>
+                    <a:p>
+                      <a:r>
+                        <a:rPr lang="en-GB" sz="1400" dirty="0"/>
+                        <a:t>D</a:t>
+                      </a:r>
+                      <a:r>
+                        <a:rPr lang="en-CH" sz="1400" dirty="0"/>
+                        <a:t>irect download</a:t>
+                      </a:r>
+                    </a:p>
+                  </a:txBody>
+                  <a:tcPr/>
+                </a:tc>
+                <a:tc>
+                  <a:txBody>
+                    <a:bodyPr/>
+                    <a:lstStyle/>
+                    <a:p>
+                      <a:r>
+                        <a:rPr lang="en-CH" sz="1400" dirty="0"/>
+                        <a:t>Ruben</a:t>
+                      </a:r>
+                    </a:p>
+                  </a:txBody>
+                  <a:tcPr/>
+                </a:tc>
+                <a:tc>
+                  <a:txBody>
+                    <a:bodyPr/>
+                    <a:lstStyle/>
+                    <a:p>
+                      <a:r>
+                        <a:rPr lang="en-GB" sz="1400" dirty="0"/>
+                        <a:t>https://govdata360.worldbank.org/indicators/h5c6649ff?country=</a:t>
+                      </a:r>
+                      <a:r>
+                        <a:rPr lang="en-GB" sz="1400" dirty="0" err="1"/>
+                        <a:t>BRA&amp;indicator</a:t>
+                      </a:r>
+                      <a:r>
+                        <a:rPr lang="en-GB" sz="1400" dirty="0"/>
+                        <a:t>=41826&amp;viz=</a:t>
+                      </a:r>
+                      <a:r>
+                        <a:rPr lang="en-GB" sz="1400" dirty="0" err="1"/>
+                        <a:t>line_chart&amp;years</a:t>
+                      </a:r>
+                      <a:r>
+                        <a:rPr lang="en-GB" sz="1400" dirty="0"/>
+                        <a:t>=1975,2018</a:t>
+                      </a:r>
+                      <a:endParaRPr lang="en-CH" sz="1400" dirty="0"/>
+                    </a:p>
+                  </a:txBody>
+                  <a:tcPr/>
+                </a:tc>
+                <a:extLst>
+                  <a:ext uri="{0D108BD9-81ED-4DB2-BD59-A6C34878D82A}">
+                    <a16:rowId xmlns:a16="http://schemas.microsoft.com/office/drawing/2014/main" val="1653469390"/>
+                  </a:ext>
+                </a:extLst>
+              </a:tr>
+            </a:tbl>
+          </a:graphicData>
+        </a:graphic>
+      </p:graphicFrame>
+    </p:spTree>
+    <p:extLst>
+      <p:ext uri="{BB962C8B-B14F-4D97-AF65-F5344CB8AC3E}">
+        <p14:creationId xmlns:p14="http://schemas.microsoft.com/office/powerpoint/2010/main" val="1847318824"/>
+      </p:ext>
+    </p:extLst>
+  </p:cSld>
+  <p:clrMapOvr>
+    <a:masterClrMapping/>
+  </p:clrMapOvr>
+</p:sld>
+</file>
+
+<file path=ppt/slides/slide3.xml><?xml version="1.0" encoding="utf-8"?>
+<p:sld xmlns:a="http://schemas.openxmlformats.org/drawingml/2006/main" xmlns:r="http://schemas.openxmlformats.org/officeDocument/2006/relationships" xmlns:p="http://schemas.openxmlformats.org/presentationml/2006/main">
+  <p:cSld>
+    <p:spTree>
+      <p:nvGrpSpPr>
+        <p:cNvPr id="1" name=""/>
+        <p:cNvGrpSpPr/>
+        <p:nvPr/>
+      </p:nvGrpSpPr>
+      <p:grpSpPr>
+        <a:xfrm>
+          <a:off x="0" y="0"/>
+          <a:ext cx="0" cy="0"/>
+          <a:chOff x="0" y="0"/>
+          <a:chExt cx="0" cy="0"/>
+        </a:xfrm>
+      </p:grpSpPr>
+      <p:graphicFrame>
+        <p:nvGraphicFramePr>
+          <p:cNvPr id="2" name="Table 2">
+            <a:extLst>
+              <a:ext uri="{FF2B5EF4-FFF2-40B4-BE49-F238E27FC236}">
+                <a16:creationId xmlns:a16="http://schemas.microsoft.com/office/drawing/2014/main" id="{0B18FDD4-F617-3F41-8EA5-49E5BB8E8F8A}"/>
+              </a:ext>
+            </a:extLst>
+          </p:cNvPr>
+          <p:cNvGraphicFramePr>
+            <a:graphicFrameLocks noGrp="1"/>
+          </p:cNvGraphicFramePr>
+          <p:nvPr>
+            <p:extLst>
+              <p:ext uri="{D42A27DB-BD31-4B8C-83A1-F6EECF244321}">
+                <p14:modId xmlns:p14="http://schemas.microsoft.com/office/powerpoint/2010/main" val="4275760309"/>
+              </p:ext>
+            </p:extLst>
+          </p:nvPr>
+        </p:nvGraphicFramePr>
+        <p:xfrm>
+          <a:off x="262472" y="149860"/>
+          <a:ext cx="11578156" cy="6278880"/>
+        </p:xfrm>
+        <a:graphic>
+          <a:graphicData uri="http://schemas.openxmlformats.org/drawingml/2006/table">
+            <a:tbl>
+              <a:tblPr firstRow="1" bandRow="1">
+                <a:tableStyleId>{5C22544A-7EE6-4342-B048-85BDC9FD1C3A}</a:tableStyleId>
+              </a:tblPr>
+              <a:tblGrid>
+                <a:gridCol w="1172327">
+                  <a:extLst>
+                    <a:ext uri="{9D8B030D-6E8A-4147-A177-3AD203B41FA5}">
+                      <a16:colId xmlns:a16="http://schemas.microsoft.com/office/drawing/2014/main" val="560671824"/>
+                    </a:ext>
+                  </a:extLst>
+                </a:gridCol>
+                <a:gridCol w="1933506">
+                  <a:extLst>
+                    <a:ext uri="{9D8B030D-6E8A-4147-A177-3AD203B41FA5}">
+                      <a16:colId xmlns:a16="http://schemas.microsoft.com/office/drawing/2014/main" val="4152309054"/>
+                    </a:ext>
+                  </a:extLst>
+                </a:gridCol>
+                <a:gridCol w="1447630">
+                  <a:extLst>
+                    <a:ext uri="{9D8B030D-6E8A-4147-A177-3AD203B41FA5}">
+                      <a16:colId xmlns:a16="http://schemas.microsoft.com/office/drawing/2014/main" val="3334091744"/>
+                    </a:ext>
+                  </a:extLst>
+                </a:gridCol>
+                <a:gridCol w="1447630">
+                  <a:extLst>
+                    <a:ext uri="{9D8B030D-6E8A-4147-A177-3AD203B41FA5}">
+                      <a16:colId xmlns:a16="http://schemas.microsoft.com/office/drawing/2014/main" val="1803823765"/>
+                    </a:ext>
+                  </a:extLst>
+                </a:gridCol>
+                <a:gridCol w="1015964">
+                  <a:extLst>
+                    <a:ext uri="{9D8B030D-6E8A-4147-A177-3AD203B41FA5}">
+                      <a16:colId xmlns:a16="http://schemas.microsoft.com/office/drawing/2014/main" val="1239427225"/>
+                    </a:ext>
+                  </a:extLst>
+                </a:gridCol>
+                <a:gridCol w="1015964">
+                  <a:extLst>
+                    <a:ext uri="{9D8B030D-6E8A-4147-A177-3AD203B41FA5}">
+                      <a16:colId xmlns:a16="http://schemas.microsoft.com/office/drawing/2014/main" val="3084226329"/>
+                    </a:ext>
+                  </a:extLst>
+                </a:gridCol>
+                <a:gridCol w="1015964">
+                  <a:extLst>
+                    <a:ext uri="{9D8B030D-6E8A-4147-A177-3AD203B41FA5}">
+                      <a16:colId xmlns:a16="http://schemas.microsoft.com/office/drawing/2014/main" val="4170340966"/>
+                    </a:ext>
+                  </a:extLst>
+                </a:gridCol>
+                <a:gridCol w="2529171">
+                  <a:extLst>
+                    <a:ext uri="{9D8B030D-6E8A-4147-A177-3AD203B41FA5}">
+                      <a16:colId xmlns:a16="http://schemas.microsoft.com/office/drawing/2014/main" val="4264531284"/>
+                    </a:ext>
+                  </a:extLst>
+                </a:gridCol>
+              </a:tblGrid>
+              <a:tr h="370840">
+                <a:tc>
+                  <a:txBody>
+                    <a:bodyPr/>
+                    <a:lstStyle/>
+                    <a:p>
+                      <a:r>
+                        <a:rPr lang="en-CH" sz="1400" dirty="0"/>
+                        <a:t>Indicator</a:t>
+                      </a:r>
+                    </a:p>
+                  </a:txBody>
+                  <a:tcPr/>
+                </a:tc>
+                <a:tc>
+                  <a:txBody>
+                    <a:bodyPr/>
+                    <a:lstStyle/>
+                    <a:p>
+                      <a:r>
+                        <a:rPr lang="en-CH" sz="1400" dirty="0"/>
+                        <a:t>Source</a:t>
+                      </a:r>
+                    </a:p>
+                  </a:txBody>
+                  <a:tcPr/>
+                </a:tc>
+                <a:tc>
+                  <a:txBody>
+                    <a:bodyPr/>
+                    <a:lstStyle/>
+                    <a:p>
+                      <a:r>
+                        <a:rPr lang="en-CH" sz="1400" dirty="0"/>
+                        <a:t>Indicator class</a:t>
+                      </a:r>
+                    </a:p>
+                  </a:txBody>
+                  <a:tcPr/>
+                </a:tc>
+                <a:tc>
+                  <a:txBody>
+                    <a:bodyPr/>
+                    <a:lstStyle/>
+                    <a:p>
+                      <a:r>
+                        <a:rPr lang="en-CH" sz="1400" dirty="0"/>
+                        <a:t>Available years</a:t>
+                      </a:r>
+                    </a:p>
+                  </a:txBody>
+                  <a:tcPr/>
+                </a:tc>
+                <a:tc>
+                  <a:txBody>
+                    <a:bodyPr/>
+                    <a:lstStyle/>
+                    <a:p>
+                      <a:r>
+                        <a:rPr lang="en-CH" sz="1400" dirty="0"/>
+                        <a:t>Available countries</a:t>
+                      </a:r>
+                    </a:p>
+                  </a:txBody>
+                  <a:tcPr/>
+                </a:tc>
+                <a:tc>
+                  <a:txBody>
+                    <a:bodyPr/>
+                    <a:lstStyle/>
+                    <a:p>
+                      <a:r>
+                        <a:rPr lang="en-CH" sz="1400" dirty="0"/>
+                        <a:t>Access</a:t>
+                      </a:r>
+                    </a:p>
+                  </a:txBody>
+                  <a:tcPr/>
+                </a:tc>
+                <a:tc>
+                  <a:txBody>
+                    <a:bodyPr/>
+                    <a:lstStyle/>
+                    <a:p>
+                      <a:r>
+                        <a:rPr lang="en-GB" sz="1400" dirty="0"/>
+                        <a:t>Responsa</a:t>
+                      </a:r>
+                      <a:r>
+                        <a:rPr lang="en-CH" sz="1400" dirty="0"/>
+                        <a:t>ble?</a:t>
+                      </a:r>
+                    </a:p>
+                  </a:txBody>
+                  <a:tcPr/>
+                </a:tc>
+                <a:tc>
+                  <a:txBody>
+                    <a:bodyPr/>
+                    <a:lstStyle/>
+                    <a:p>
+                      <a:r>
+                        <a:rPr lang="en-CH" sz="1400" dirty="0"/>
+                        <a:t>Home link</a:t>
+                      </a:r>
+                    </a:p>
+                  </a:txBody>
+                  <a:tcPr/>
+                </a:tc>
+                <a:extLst>
+                  <a:ext uri="{0D108BD9-81ED-4DB2-BD59-A6C34878D82A}">
+                    <a16:rowId xmlns:a16="http://schemas.microsoft.com/office/drawing/2014/main" val="451230032"/>
+                  </a:ext>
+                </a:extLst>
+              </a:tr>
+              <a:tr h="370840">
+                <a:tc>
+                  <a:txBody>
+                    <a:bodyPr/>
+                    <a:lstStyle/>
+                    <a:p>
+                      <a:r>
+                        <a:rPr lang="en-CH" sz="1400" dirty="0"/>
+                        <a:t>Global Social mobility index (MI)</a:t>
+                      </a:r>
+                    </a:p>
+                    <a:p>
+                      <a:r>
+                        <a:rPr lang="en-CH" sz="1400" dirty="0"/>
+                        <a:t>????</a:t>
+                      </a:r>
+                    </a:p>
+                  </a:txBody>
+                  <a:tcPr/>
+                </a:tc>
+                <a:tc>
+                  <a:txBody>
+                    <a:bodyPr/>
+                    <a:lstStyle/>
+                    <a:p>
+                      <a:r>
+                        <a:rPr lang="en-CH" sz="1400" dirty="0"/>
+                        <a:t>World Economic Forum</a:t>
+                      </a:r>
+                    </a:p>
+                  </a:txBody>
+                  <a:tcPr/>
+                </a:tc>
+                <a:tc>
+                  <a:txBody>
+                    <a:bodyPr/>
+                    <a:lstStyle/>
+                    <a:p>
+                      <a:r>
+                        <a:rPr lang="en-CH" sz="1400" dirty="0"/>
+                        <a:t>Social, complex</a:t>
+                      </a:r>
+                    </a:p>
+                  </a:txBody>
+                  <a:tcPr/>
+                </a:tc>
+                <a:tc>
+                  <a:txBody>
+                    <a:bodyPr/>
+                    <a:lstStyle/>
+                    <a:p>
+                      <a:r>
+                        <a:rPr lang="en-CH" sz="1400" dirty="0"/>
+                        <a:t>?</a:t>
+                      </a:r>
+                    </a:p>
+                  </a:txBody>
+                  <a:tcPr/>
+                </a:tc>
+                <a:tc>
+                  <a:txBody>
+                    <a:bodyPr/>
+                    <a:lstStyle/>
+                    <a:p>
+                      <a:r>
+                        <a:rPr lang="en-CH" sz="1400" dirty="0"/>
+                        <a:t>?</a:t>
+                      </a:r>
+                    </a:p>
+                  </a:txBody>
+                  <a:tcPr/>
+                </a:tc>
+                <a:tc>
+                  <a:txBody>
+                    <a:bodyPr/>
+                    <a:lstStyle/>
+                    <a:p>
+                      <a:r>
+                        <a:rPr lang="en-CH" sz="1400" dirty="0"/>
+                        <a:t>?</a:t>
+                      </a:r>
+                    </a:p>
+                  </a:txBody>
+                  <a:tcPr/>
+                </a:tc>
+                <a:tc>
+                  <a:txBody>
+                    <a:bodyPr/>
+                    <a:lstStyle/>
+                    <a:p>
+                      <a:r>
+                        <a:rPr lang="en-CH" sz="1400" dirty="0"/>
+                        <a:t>Valeria?</a:t>
+                      </a:r>
+                    </a:p>
+                  </a:txBody>
+                  <a:tcPr/>
+                </a:tc>
+                <a:tc>
+                  <a:txBody>
+                    <a:bodyPr/>
+                    <a:lstStyle/>
+                    <a:p>
+                      <a:r>
+                        <a:rPr lang="en-GB" sz="1400" dirty="0"/>
+                        <a:t>https://</a:t>
+                      </a:r>
+                      <a:r>
+                        <a:rPr lang="en-GB" sz="1400" dirty="0" err="1"/>
+                        <a:t>www.weforum.org</a:t>
+                      </a:r>
+                      <a:r>
+                        <a:rPr lang="en-GB" sz="1400" dirty="0"/>
+                        <a:t>/reports/global-social-mobility-index-2020-why-economies-benefit-from-fixing-inequality</a:t>
+                      </a:r>
+                      <a:endParaRPr lang="en-CH" sz="1400" dirty="0"/>
+                    </a:p>
+                  </a:txBody>
+                  <a:tcPr/>
+                </a:tc>
+                <a:extLst>
+                  <a:ext uri="{0D108BD9-81ED-4DB2-BD59-A6C34878D82A}">
+                    <a16:rowId xmlns:a16="http://schemas.microsoft.com/office/drawing/2014/main" val="3825695763"/>
+                  </a:ext>
+                </a:extLst>
+              </a:tr>
+              <a:tr h="370840">
+                <a:tc>
+                  <a:txBody>
+                    <a:bodyPr/>
+                    <a:lstStyle/>
+                    <a:p>
+                      <a:r>
+                        <a:rPr lang="en-CH" sz="1400" dirty="0"/>
+                        <a:t>Enviromental performance index</a:t>
+                      </a:r>
+                    </a:p>
+                  </a:txBody>
+                  <a:tcPr/>
+                </a:tc>
+                <a:tc>
+                  <a:txBody>
+                    <a:bodyPr/>
+                    <a:lstStyle/>
+                    <a:p>
+                      <a:r>
+                        <a:rPr lang="en-CH" sz="1400" dirty="0"/>
+                        <a:t>Socioeconomic data and aplication center</a:t>
+                      </a:r>
+                    </a:p>
+                  </a:txBody>
+                  <a:tcPr/>
+                </a:tc>
+                <a:tc>
+                  <a:txBody>
+                    <a:bodyPr/>
+                    <a:lstStyle/>
+                    <a:p>
+                      <a:r>
+                        <a:rPr lang="en-GB" sz="1400" dirty="0"/>
+                        <a:t>E</a:t>
+                      </a:r>
+                      <a:r>
+                        <a:rPr lang="en-CH" sz="1400" dirty="0"/>
+                        <a:t>nviromental </a:t>
+                      </a:r>
+                    </a:p>
+                  </a:txBody>
+                  <a:tcPr/>
+                </a:tc>
+                <a:tc>
+                  <a:txBody>
+                    <a:bodyPr/>
+                    <a:lstStyle/>
+                    <a:p>
+                      <a:r>
+                        <a:rPr lang="en-CH" sz="1400" dirty="0"/>
+                        <a:t>?</a:t>
+                      </a:r>
+                    </a:p>
+                  </a:txBody>
+                  <a:tcPr/>
+                </a:tc>
+                <a:tc>
+                  <a:txBody>
+                    <a:bodyPr/>
+                    <a:lstStyle/>
+                    <a:p>
+                      <a:r>
+                        <a:rPr lang="en-CH" sz="1400" dirty="0"/>
+                        <a:t>?</a:t>
+                      </a:r>
+                    </a:p>
+                  </a:txBody>
+                  <a:tcPr/>
+                </a:tc>
+                <a:tc>
+                  <a:txBody>
+                    <a:bodyPr/>
+                    <a:lstStyle/>
+                    <a:p>
+                      <a:r>
+                        <a:rPr lang="en-CH" sz="1400" dirty="0"/>
+                        <a:t>?</a:t>
+                      </a:r>
+                    </a:p>
+                  </a:txBody>
+                  <a:tcPr/>
+                </a:tc>
+                <a:tc>
+                  <a:txBody>
+                    <a:bodyPr/>
+                    <a:lstStyle/>
+                    <a:p>
+                      <a:r>
+                        <a:rPr lang="en-GB" sz="1400" dirty="0"/>
+                        <a:t>V</a:t>
+                      </a:r>
+                      <a:r>
+                        <a:rPr lang="en-CH" sz="1400" dirty="0"/>
+                        <a:t>aleria?</a:t>
+                      </a:r>
+                    </a:p>
+                  </a:txBody>
+                  <a:tcPr/>
+                </a:tc>
+                <a:tc>
+                  <a:txBody>
+                    <a:bodyPr/>
+                    <a:lstStyle/>
+                    <a:p>
+                      <a:r>
+                        <a:rPr lang="en-GB" sz="1400" dirty="0"/>
+                        <a:t>https://</a:t>
+                      </a:r>
+                      <a:r>
+                        <a:rPr lang="en-GB" sz="1400" dirty="0" err="1"/>
+                        <a:t>sedac.ciesin.columbia.edu</a:t>
+                      </a:r>
+                      <a:r>
+                        <a:rPr lang="en-GB" sz="1400" dirty="0"/>
+                        <a:t>/data/set/epi-environmental-performance-index-2020/data-download#</a:t>
+                      </a:r>
+                      <a:endParaRPr lang="en-CH" sz="1400" dirty="0"/>
+                    </a:p>
+                  </a:txBody>
+                  <a:tcPr/>
+                </a:tc>
+                <a:extLst>
+                  <a:ext uri="{0D108BD9-81ED-4DB2-BD59-A6C34878D82A}">
+                    <a16:rowId xmlns:a16="http://schemas.microsoft.com/office/drawing/2014/main" val="1829815335"/>
+                  </a:ext>
+                </a:extLst>
+              </a:tr>
+              <a:tr h="370840">
+                <a:tc>
+                  <a:txBody>
+                    <a:bodyPr/>
+                    <a:lstStyle/>
+                    <a:p>
+                      <a:r>
+                        <a:rPr lang="en-CH" sz="1400" dirty="0"/>
+                        <a:t>Population</a:t>
+                      </a:r>
+                    </a:p>
+                  </a:txBody>
+                  <a:tcPr/>
+                </a:tc>
+                <a:tc>
+                  <a:txBody>
+                    <a:bodyPr/>
+                    <a:lstStyle/>
+                    <a:p>
+                      <a:pPr marL="0" marR="0" lvl="0" indent="0" algn="l" defTabSz="914400" rtl="0" eaLnBrk="1" fontAlgn="auto" latinLnBrk="0" hangingPunct="1">
+                        <a:lnSpc>
+                          <a:spcPct val="100000"/>
+                        </a:lnSpc>
+                        <a:spcBef>
+                          <a:spcPts val="0"/>
+                        </a:spcBef>
+                        <a:spcAft>
+                          <a:spcPts val="0"/>
+                        </a:spcAft>
+                        <a:buClrTx/>
+                        <a:buSzTx/>
+                        <a:buFontTx/>
+                        <a:buNone/>
+                        <a:tabLst/>
+                        <a:defRPr/>
+                      </a:pPr>
+                      <a:r>
+                        <a:rPr lang="en-CH" sz="1400" dirty="0"/>
+                        <a:t>World Bank</a:t>
+                      </a:r>
+                    </a:p>
+                  </a:txBody>
+                  <a:tcPr/>
+                </a:tc>
+                <a:tc>
+                  <a:txBody>
+                    <a:bodyPr/>
+                    <a:lstStyle/>
+                    <a:p>
+                      <a:r>
+                        <a:rPr lang="en-CH" sz="1400" dirty="0"/>
+                        <a:t>Demografic</a:t>
+                      </a:r>
+                    </a:p>
+                  </a:txBody>
+                  <a:tcPr/>
+                </a:tc>
+                <a:tc>
+                  <a:txBody>
+                    <a:bodyPr/>
+                    <a:lstStyle/>
+                    <a:p>
+                      <a:r>
+                        <a:rPr lang="en-CH" sz="1400" dirty="0"/>
+                        <a:t>all?</a:t>
+                      </a:r>
+                    </a:p>
+                  </a:txBody>
+                  <a:tcPr/>
+                </a:tc>
+                <a:tc>
+                  <a:txBody>
+                    <a:bodyPr/>
+                    <a:lstStyle/>
+                    <a:p>
+                      <a:r>
+                        <a:rPr lang="en-CH" sz="1400" dirty="0"/>
+                        <a:t>All?</a:t>
+                      </a:r>
+                    </a:p>
+                  </a:txBody>
+                  <a:tcPr/>
+                </a:tc>
+                <a:tc>
+                  <a:txBody>
+                    <a:bodyPr/>
+                    <a:lstStyle/>
+                    <a:p>
+                      <a:r>
+                        <a:rPr lang="en-CH" sz="1400" dirty="0"/>
+                        <a:t>API – World Bnak</a:t>
+                      </a:r>
+                    </a:p>
+                  </a:txBody>
+                  <a:tcPr/>
+                </a:tc>
+                <a:tc>
+                  <a:txBody>
+                    <a:bodyPr/>
+                    <a:lstStyle/>
+                    <a:p>
+                      <a:r>
+                        <a:rPr lang="en-CH" sz="1400" dirty="0"/>
+                        <a:t>Ruben</a:t>
+                      </a:r>
+                    </a:p>
+                  </a:txBody>
+                  <a:tcPr/>
+                </a:tc>
+                <a:tc>
+                  <a:txBody>
+                    <a:bodyPr/>
+                    <a:lstStyle/>
+                    <a:p>
+                      <a:pPr marL="0" marR="0" lvl="0" indent="0" algn="l" defTabSz="914400" rtl="0" eaLnBrk="1" fontAlgn="auto" latinLnBrk="0" hangingPunct="1">
+                        <a:lnSpc>
+                          <a:spcPct val="100000"/>
+                        </a:lnSpc>
+                        <a:spcBef>
+                          <a:spcPts val="0"/>
+                        </a:spcBef>
+                        <a:spcAft>
+                          <a:spcPts val="0"/>
+                        </a:spcAft>
+                        <a:buClrTx/>
+                        <a:buSzTx/>
+                        <a:buFontTx/>
+                        <a:buNone/>
+                        <a:tabLst/>
+                        <a:defRPr/>
+                      </a:pPr>
+                      <a:r>
+                        <a:rPr kumimoji="0" lang="en-GB" sz="1400" b="0" i="0" u="none" strike="noStrike" kern="1200" cap="none" spc="0" normalizeH="0" baseline="0" noProof="0">
+                          <a:ln>
+                            <a:noFill/>
+                          </a:ln>
+                          <a:solidFill>
+                            <a:prstClr val="black"/>
+                          </a:solidFill>
+                          <a:effectLst/>
+                          <a:uLnTx/>
+                          <a:uFillTx/>
+                          <a:latin typeface="Calibri" panose="020F0502020204030204"/>
+                          <a:ea typeface="+mn-ea"/>
+                          <a:cs typeface="+mn-cs"/>
+                        </a:rPr>
+                        <a:t>https://datahelpdesk.worldbank.org/knowledgebase/topics/125589-developer-information</a:t>
+                      </a:r>
+                      <a:endParaRPr kumimoji="0" lang="en-CH" sz="1400" b="0" i="0" u="none" strike="noStrike" kern="1200" cap="none" spc="0" normalizeH="0" baseline="0" noProof="0" dirty="0">
+                        <a:ln>
+                          <a:noFill/>
+                        </a:ln>
+                        <a:solidFill>
+                          <a:prstClr val="black"/>
+                        </a:solidFill>
+                        <a:effectLst/>
+                        <a:uLnTx/>
+                        <a:uFillTx/>
+                        <a:latin typeface="Calibri" panose="020F0502020204030204"/>
+                        <a:ea typeface="+mn-ea"/>
+                        <a:cs typeface="+mn-cs"/>
+                      </a:endParaRPr>
+                    </a:p>
+                  </a:txBody>
+                  <a:tcPr/>
+                </a:tc>
+                <a:extLst>
+                  <a:ext uri="{0D108BD9-81ED-4DB2-BD59-A6C34878D82A}">
+                    <a16:rowId xmlns:a16="http://schemas.microsoft.com/office/drawing/2014/main" val="2216577571"/>
+                  </a:ext>
+                </a:extLst>
+              </a:tr>
+              <a:tr h="370840">
+                <a:tc>
+                  <a:txBody>
+                    <a:bodyPr/>
+                    <a:lstStyle/>
+                    <a:p>
+                      <a:r>
+                        <a:rPr lang="en-CH" sz="1400" dirty="0"/>
+                        <a:t>Life expectancy</a:t>
+                      </a:r>
+                    </a:p>
+                  </a:txBody>
+                  <a:tcPr/>
+                </a:tc>
+                <a:tc>
+                  <a:txBody>
+                    <a:bodyPr/>
+                    <a:lstStyle/>
+                    <a:p>
+                      <a:pPr marL="0" marR="0" lvl="0" indent="0" algn="l" defTabSz="914400" rtl="0" eaLnBrk="1" fontAlgn="auto" latinLnBrk="0" hangingPunct="1">
+                        <a:lnSpc>
+                          <a:spcPct val="100000"/>
+                        </a:lnSpc>
+                        <a:spcBef>
+                          <a:spcPts val="0"/>
+                        </a:spcBef>
+                        <a:spcAft>
+                          <a:spcPts val="0"/>
+                        </a:spcAft>
+                        <a:buClrTx/>
+                        <a:buSzTx/>
+                        <a:buFontTx/>
+                        <a:buNone/>
+                        <a:tabLst/>
+                        <a:defRPr/>
+                      </a:pPr>
+                      <a:r>
+                        <a:rPr lang="en-CH" sz="1400" dirty="0"/>
+                        <a:t>World Bank</a:t>
+                      </a:r>
+                    </a:p>
+                    <a:p>
+                      <a:endParaRPr lang="en-CH" sz="1400" dirty="0"/>
+                    </a:p>
+                  </a:txBody>
+                  <a:tcPr/>
+                </a:tc>
+                <a:tc>
+                  <a:txBody>
+                    <a:bodyPr/>
+                    <a:lstStyle/>
+                    <a:p>
+                      <a:r>
+                        <a:rPr lang="en-CH" sz="1400" dirty="0"/>
+                        <a:t>Demografic</a:t>
+                      </a:r>
+                    </a:p>
+                  </a:txBody>
+                  <a:tcPr/>
+                </a:tc>
+                <a:tc>
+                  <a:txBody>
+                    <a:bodyPr/>
+                    <a:lstStyle/>
+                    <a:p>
+                      <a:r>
+                        <a:rPr lang="en-CH" sz="1400" dirty="0"/>
+                        <a:t>all?</a:t>
+                      </a:r>
+                    </a:p>
+                  </a:txBody>
+                  <a:tcPr/>
+                </a:tc>
+                <a:tc>
+                  <a:txBody>
+                    <a:bodyPr/>
+                    <a:lstStyle/>
+                    <a:p>
+                      <a:r>
+                        <a:rPr lang="en-CH" sz="1400" dirty="0"/>
+                        <a:t>All?</a:t>
+                      </a:r>
+                    </a:p>
+                  </a:txBody>
+                  <a:tcPr/>
+                </a:tc>
+                <a:tc>
+                  <a:txBody>
+                    <a:bodyPr/>
+                    <a:lstStyle/>
+                    <a:p>
+                      <a:r>
+                        <a:rPr lang="en-CH" sz="1400" dirty="0"/>
+                        <a:t>API – World Bnak</a:t>
+                      </a:r>
+                    </a:p>
+                  </a:txBody>
+                  <a:tcPr/>
+                </a:tc>
+                <a:tc>
+                  <a:txBody>
+                    <a:bodyPr/>
+                    <a:lstStyle/>
+                    <a:p>
+                      <a:r>
+                        <a:rPr lang="en-CH" sz="1400" dirty="0"/>
+                        <a:t>Ruben</a:t>
+                      </a:r>
+                    </a:p>
+                  </a:txBody>
+                  <a:tcPr/>
+                </a:tc>
+                <a:tc>
+                  <a:txBody>
+                    <a:bodyPr/>
+                    <a:lstStyle/>
+                    <a:p>
+                      <a:pPr marL="0" marR="0" lvl="0" indent="0" algn="l" defTabSz="914400" rtl="0" eaLnBrk="1" fontAlgn="auto" latinLnBrk="0" hangingPunct="1">
+                        <a:lnSpc>
+                          <a:spcPct val="100000"/>
+                        </a:lnSpc>
+                        <a:spcBef>
+                          <a:spcPts val="0"/>
+                        </a:spcBef>
+                        <a:spcAft>
+                          <a:spcPts val="0"/>
+                        </a:spcAft>
+                        <a:buClrTx/>
+                        <a:buSzTx/>
+                        <a:buFontTx/>
+                        <a:buNone/>
+                        <a:tabLst/>
+                        <a:defRPr/>
+                      </a:pPr>
+                      <a:r>
+                        <a:rPr kumimoji="0" lang="en-GB" sz="1400" b="0" i="0" u="none" strike="noStrike" kern="1200" cap="none" spc="0" normalizeH="0" baseline="0" noProof="0">
+                          <a:ln>
+                            <a:noFill/>
+                          </a:ln>
+                          <a:solidFill>
+                            <a:prstClr val="black"/>
+                          </a:solidFill>
+                          <a:effectLst/>
+                          <a:uLnTx/>
+                          <a:uFillTx/>
+                          <a:latin typeface="Calibri" panose="020F0502020204030204"/>
+                          <a:ea typeface="+mn-ea"/>
+                          <a:cs typeface="+mn-cs"/>
+                        </a:rPr>
+                        <a:t>https://datahelpdesk.worldbank.org/knowledgebase/topics/125589-developer-information</a:t>
+                      </a:r>
+                      <a:endParaRPr kumimoji="0" lang="en-CH" sz="1400" b="0" i="0" u="none" strike="noStrike" kern="1200" cap="none" spc="0" normalizeH="0" baseline="0" noProof="0" dirty="0">
+                        <a:ln>
+                          <a:noFill/>
+                        </a:ln>
+                        <a:solidFill>
+                          <a:prstClr val="black"/>
+                        </a:solidFill>
+                        <a:effectLst/>
+                        <a:uLnTx/>
+                        <a:uFillTx/>
+                        <a:latin typeface="Calibri" panose="020F0502020204030204"/>
+                        <a:ea typeface="+mn-ea"/>
+                        <a:cs typeface="+mn-cs"/>
+                      </a:endParaRPr>
+                    </a:p>
+                  </a:txBody>
+                  <a:tcPr/>
+                </a:tc>
+                <a:extLst>
+                  <a:ext uri="{0D108BD9-81ED-4DB2-BD59-A6C34878D82A}">
+                    <a16:rowId xmlns:a16="http://schemas.microsoft.com/office/drawing/2014/main" val="499843032"/>
+                  </a:ext>
+                </a:extLst>
+              </a:tr>
+              <a:tr h="370840">
+                <a:tc>
+                  <a:txBody>
+                    <a:bodyPr/>
+                    <a:lstStyle/>
+                    <a:p>
+                      <a:r>
+                        <a:rPr lang="en-CH" sz="1400" dirty="0"/>
+                        <a:t>Current health expenditure (%GDP)</a:t>
+                      </a:r>
+                    </a:p>
+                  </a:txBody>
+                  <a:tcPr/>
+                </a:tc>
+                <a:tc>
+                  <a:txBody>
+                    <a:bodyPr/>
+                    <a:lstStyle/>
+                    <a:p>
+                      <a:pPr marL="0" marR="0" lvl="0" indent="0" algn="l" defTabSz="914400" rtl="0" eaLnBrk="1" fontAlgn="auto" latinLnBrk="0" hangingPunct="1">
+                        <a:lnSpc>
+                          <a:spcPct val="100000"/>
+                        </a:lnSpc>
+                        <a:spcBef>
+                          <a:spcPts val="0"/>
+                        </a:spcBef>
+                        <a:spcAft>
+                          <a:spcPts val="0"/>
+                        </a:spcAft>
+                        <a:buClrTx/>
+                        <a:buSzTx/>
+                        <a:buFontTx/>
+                        <a:buNone/>
+                        <a:tabLst/>
+                        <a:defRPr/>
+                      </a:pPr>
+                      <a:r>
+                        <a:rPr lang="en-CH" sz="1400" dirty="0"/>
+                        <a:t>World Bank</a:t>
+                      </a:r>
+                    </a:p>
+                    <a:p>
+                      <a:endParaRPr lang="en-CH" sz="1400" dirty="0"/>
+                    </a:p>
+                  </a:txBody>
+                  <a:tcPr/>
+                </a:tc>
+                <a:tc>
+                  <a:txBody>
+                    <a:bodyPr/>
+                    <a:lstStyle/>
+                    <a:p>
+                      <a:r>
+                        <a:rPr lang="en-CH" sz="1400" dirty="0"/>
+                        <a:t>Health</a:t>
+                      </a:r>
+                    </a:p>
+                  </a:txBody>
+                  <a:tcPr/>
+                </a:tc>
+                <a:tc>
+                  <a:txBody>
+                    <a:bodyPr/>
+                    <a:lstStyle/>
+                    <a:p>
+                      <a:r>
+                        <a:rPr lang="en-CH" sz="1400" dirty="0"/>
+                        <a:t>all?</a:t>
+                      </a:r>
+                    </a:p>
+                  </a:txBody>
+                  <a:tcPr/>
+                </a:tc>
+                <a:tc>
+                  <a:txBody>
+                    <a:bodyPr/>
+                    <a:lstStyle/>
+                    <a:p>
+                      <a:r>
+                        <a:rPr lang="en-CH" sz="1400" dirty="0"/>
+                        <a:t>All?</a:t>
+                      </a:r>
+                    </a:p>
+                  </a:txBody>
+                  <a:tcPr/>
+                </a:tc>
+                <a:tc>
+                  <a:txBody>
+                    <a:bodyPr/>
+                    <a:lstStyle/>
+                    <a:p>
+                      <a:r>
+                        <a:rPr lang="en-CH" sz="1400" dirty="0"/>
+                        <a:t>API – World Bnak</a:t>
+                      </a:r>
+                    </a:p>
+                  </a:txBody>
+                  <a:tcPr/>
+                </a:tc>
+                <a:tc>
+                  <a:txBody>
+                    <a:bodyPr/>
+                    <a:lstStyle/>
+                    <a:p>
+                      <a:r>
+                        <a:rPr lang="en-CH" sz="1400" dirty="0"/>
+                        <a:t>Ruben</a:t>
+                      </a:r>
+                    </a:p>
+                  </a:txBody>
+                  <a:tcPr/>
+                </a:tc>
+                <a:tc>
+                  <a:txBody>
+                    <a:bodyPr/>
+                    <a:lstStyle/>
+                    <a:p>
+                      <a:pPr marL="0" marR="0" lvl="0" indent="0" algn="l" defTabSz="914400" rtl="0" eaLnBrk="1" fontAlgn="auto" latinLnBrk="0" hangingPunct="1">
+                        <a:lnSpc>
+                          <a:spcPct val="100000"/>
+                        </a:lnSpc>
+                        <a:spcBef>
+                          <a:spcPts val="0"/>
+                        </a:spcBef>
+                        <a:spcAft>
+                          <a:spcPts val="0"/>
+                        </a:spcAft>
+                        <a:buClrTx/>
+                        <a:buSzTx/>
+                        <a:buFontTx/>
+                        <a:buNone/>
+                        <a:tabLst/>
+                        <a:defRPr/>
+                      </a:pPr>
+                      <a:r>
+                        <a:rPr kumimoji="0" lang="en-GB" sz="1400" b="0" i="0" u="none" strike="noStrike" kern="1200" cap="none" spc="0" normalizeH="0" baseline="0" noProof="0" dirty="0">
+                          <a:ln>
+                            <a:noFill/>
+                          </a:ln>
+                          <a:solidFill>
+                            <a:prstClr val="black"/>
+                          </a:solidFill>
+                          <a:effectLst/>
+                          <a:uLnTx/>
+                          <a:uFillTx/>
+                          <a:latin typeface="Calibri" panose="020F0502020204030204"/>
+                          <a:ea typeface="+mn-ea"/>
+                          <a:cs typeface="+mn-cs"/>
+                        </a:rPr>
+                        <a:t>https://</a:t>
+                      </a:r>
+                      <a:r>
+                        <a:rPr kumimoji="0" lang="en-GB" sz="1400" b="0" i="0" u="none" strike="noStrike" kern="1200" cap="none" spc="0" normalizeH="0" baseline="0" noProof="0" dirty="0" err="1">
+                          <a:ln>
+                            <a:noFill/>
+                          </a:ln>
+                          <a:solidFill>
+                            <a:prstClr val="black"/>
+                          </a:solidFill>
+                          <a:effectLst/>
+                          <a:uLnTx/>
+                          <a:uFillTx/>
+                          <a:latin typeface="Calibri" panose="020F0502020204030204"/>
+                          <a:ea typeface="+mn-ea"/>
+                          <a:cs typeface="+mn-cs"/>
+                        </a:rPr>
+                        <a:t>datahelpdesk.worldbank.org</a:t>
+                      </a:r>
+                      <a:r>
+                        <a:rPr kumimoji="0" lang="en-GB" sz="1400" b="0" i="0" u="none" strike="noStrike" kern="1200" cap="none" spc="0" normalizeH="0" baseline="0" noProof="0" dirty="0">
+                          <a:ln>
+                            <a:noFill/>
+                          </a:ln>
+                          <a:solidFill>
+                            <a:prstClr val="black"/>
+                          </a:solidFill>
+                          <a:effectLst/>
+                          <a:uLnTx/>
+                          <a:uFillTx/>
+                          <a:latin typeface="Calibri" panose="020F0502020204030204"/>
+                          <a:ea typeface="+mn-ea"/>
+                          <a:cs typeface="+mn-cs"/>
+                        </a:rPr>
+                        <a:t>/knowledgebase/topics/125589-developer-information</a:t>
+                      </a:r>
+                      <a:endParaRPr kumimoji="0" lang="en-CH" sz="1400" b="0" i="0" u="none" strike="noStrike" kern="1200" cap="none" spc="0" normalizeH="0" baseline="0" noProof="0" dirty="0">
+                        <a:ln>
+                          <a:noFill/>
+                        </a:ln>
+                        <a:solidFill>
+                          <a:prstClr val="black"/>
+                        </a:solidFill>
+                        <a:effectLst/>
+                        <a:uLnTx/>
+                        <a:uFillTx/>
+                        <a:latin typeface="Calibri" panose="020F0502020204030204"/>
+                        <a:ea typeface="+mn-ea"/>
+                        <a:cs typeface="+mn-cs"/>
+                      </a:endParaRPr>
+                    </a:p>
+                  </a:txBody>
+                  <a:tcPr/>
+                </a:tc>
+                <a:extLst>
+                  <a:ext uri="{0D108BD9-81ED-4DB2-BD59-A6C34878D82A}">
+                    <a16:rowId xmlns:a16="http://schemas.microsoft.com/office/drawing/2014/main" val="4103178330"/>
+                  </a:ext>
+                </a:extLst>
+              </a:tr>
+              <a:tr h="370840">
+                <a:tc>
+                  <a:txBody>
+                    <a:bodyPr/>
+                    <a:lstStyle/>
+                    <a:p>
+                      <a:r>
+                        <a:rPr lang="en-CH" sz="1400" dirty="0"/>
+                        <a:t>Economic Group</a:t>
+                      </a:r>
+                    </a:p>
+                  </a:txBody>
+                  <a:tcPr/>
+                </a:tc>
+                <a:tc>
+                  <a:txBody>
+                    <a:bodyPr/>
+                    <a:lstStyle/>
+                    <a:p>
+                      <a:pPr marL="0" marR="0" lvl="0" indent="0" algn="l" defTabSz="914400" rtl="0" eaLnBrk="1" fontAlgn="auto" latinLnBrk="0" hangingPunct="1">
+                        <a:lnSpc>
+                          <a:spcPct val="100000"/>
+                        </a:lnSpc>
+                        <a:spcBef>
+                          <a:spcPts val="0"/>
+                        </a:spcBef>
+                        <a:spcAft>
+                          <a:spcPts val="0"/>
+                        </a:spcAft>
+                        <a:buClrTx/>
+                        <a:buSzTx/>
+                        <a:buFontTx/>
+                        <a:buNone/>
+                        <a:tabLst/>
+                        <a:defRPr/>
+                      </a:pPr>
+                      <a:r>
+                        <a:rPr lang="en-CH" sz="1400" dirty="0"/>
+                        <a:t>World Bank</a:t>
+                      </a:r>
+                    </a:p>
+                    <a:p>
+                      <a:pPr marL="0" marR="0" lvl="0" indent="0" algn="l" defTabSz="914400" rtl="0" eaLnBrk="1" fontAlgn="auto" latinLnBrk="0" hangingPunct="1">
+                        <a:lnSpc>
+                          <a:spcPct val="100000"/>
+                        </a:lnSpc>
+                        <a:spcBef>
+                          <a:spcPts val="0"/>
+                        </a:spcBef>
+                        <a:spcAft>
+                          <a:spcPts val="0"/>
+                        </a:spcAft>
+                        <a:buClrTx/>
+                        <a:buSzTx/>
+                        <a:buFontTx/>
+                        <a:buNone/>
+                        <a:tabLst/>
+                        <a:defRPr/>
+                      </a:pPr>
+                      <a:endParaRPr lang="en-CH" sz="1400" dirty="0"/>
+                    </a:p>
+                  </a:txBody>
+                  <a:tcPr/>
+                </a:tc>
+                <a:tc>
+                  <a:txBody>
+                    <a:bodyPr/>
+                    <a:lstStyle/>
+                    <a:p>
+                      <a:r>
+                        <a:rPr lang="en-CH" sz="1400" dirty="0"/>
+                        <a:t>Economic</a:t>
+                      </a:r>
+                    </a:p>
+                  </a:txBody>
+                  <a:tcPr/>
+                </a:tc>
+                <a:tc>
+                  <a:txBody>
+                    <a:bodyPr/>
+                    <a:lstStyle/>
+                    <a:p>
+                      <a:r>
+                        <a:rPr lang="en-CH" sz="1400" dirty="0"/>
+                        <a:t>all?</a:t>
+                      </a:r>
+                    </a:p>
+                  </a:txBody>
+                  <a:tcPr/>
+                </a:tc>
+                <a:tc>
+                  <a:txBody>
+                    <a:bodyPr/>
+                    <a:lstStyle/>
+                    <a:p>
+                      <a:r>
+                        <a:rPr lang="en-CH" sz="1400" dirty="0"/>
+                        <a:t>All?</a:t>
+                      </a:r>
+                    </a:p>
+                  </a:txBody>
+                  <a:tcPr/>
+                </a:tc>
+                <a:tc>
+                  <a:txBody>
+                    <a:bodyPr/>
+                    <a:lstStyle/>
+                    <a:p>
+                      <a:r>
+                        <a:rPr lang="en-CH" sz="1400" dirty="0"/>
+                        <a:t>API – World Bnak</a:t>
+                      </a:r>
+                    </a:p>
+                  </a:txBody>
+                  <a:tcPr/>
+                </a:tc>
+                <a:tc>
+                  <a:txBody>
+                    <a:bodyPr/>
+                    <a:lstStyle/>
+                    <a:p>
+                      <a:r>
+                        <a:rPr lang="en-CH" sz="1400" dirty="0"/>
+                        <a:t>Ruben</a:t>
+                      </a:r>
+                    </a:p>
+                  </a:txBody>
+                  <a:tcPr/>
+                </a:tc>
+                <a:tc>
+                  <a:txBody>
+                    <a:bodyPr/>
+                    <a:lstStyle/>
+                    <a:p>
+                      <a:pPr marL="0" marR="0" lvl="0" indent="0" algn="l" defTabSz="914400" rtl="0" eaLnBrk="1" fontAlgn="auto" latinLnBrk="0" hangingPunct="1">
+                        <a:lnSpc>
+                          <a:spcPct val="100000"/>
+                        </a:lnSpc>
+                        <a:spcBef>
+                          <a:spcPts val="0"/>
+                        </a:spcBef>
+                        <a:spcAft>
+                          <a:spcPts val="0"/>
+                        </a:spcAft>
+                        <a:buClrTx/>
+                        <a:buSzTx/>
+                        <a:buFontTx/>
+                        <a:buNone/>
+                        <a:tabLst/>
+                        <a:defRPr/>
+                      </a:pPr>
+                      <a:r>
+                        <a:rPr kumimoji="0" lang="en-GB" sz="1400" b="0" i="0" u="none" strike="noStrike" kern="1200" cap="none" spc="0" normalizeH="0" baseline="0" noProof="0" dirty="0">
+                          <a:ln>
+                            <a:noFill/>
+                          </a:ln>
+                          <a:solidFill>
+                            <a:prstClr val="black"/>
+                          </a:solidFill>
+                          <a:effectLst/>
+                          <a:uLnTx/>
+                          <a:uFillTx/>
+                          <a:latin typeface="Calibri" panose="020F0502020204030204"/>
+                          <a:ea typeface="+mn-ea"/>
+                          <a:cs typeface="+mn-cs"/>
+                        </a:rPr>
+                        <a:t>https://</a:t>
+                      </a:r>
+                      <a:r>
+                        <a:rPr kumimoji="0" lang="en-GB" sz="1400" b="0" i="0" u="none" strike="noStrike" kern="1200" cap="none" spc="0" normalizeH="0" baseline="0" noProof="0" dirty="0" err="1">
+                          <a:ln>
+                            <a:noFill/>
+                          </a:ln>
+                          <a:solidFill>
+                            <a:prstClr val="black"/>
+                          </a:solidFill>
+                          <a:effectLst/>
+                          <a:uLnTx/>
+                          <a:uFillTx/>
+                          <a:latin typeface="Calibri" panose="020F0502020204030204"/>
+                          <a:ea typeface="+mn-ea"/>
+                          <a:cs typeface="+mn-cs"/>
+                        </a:rPr>
+                        <a:t>datahelpdesk.worldbank.org</a:t>
+                      </a:r>
+                      <a:r>
+                        <a:rPr kumimoji="0" lang="en-GB" sz="1400" b="0" i="0" u="none" strike="noStrike" kern="1200" cap="none" spc="0" normalizeH="0" baseline="0" noProof="0" dirty="0">
+                          <a:ln>
+                            <a:noFill/>
+                          </a:ln>
+                          <a:solidFill>
+                            <a:prstClr val="black"/>
+                          </a:solidFill>
+                          <a:effectLst/>
+                          <a:uLnTx/>
+                          <a:uFillTx/>
+                          <a:latin typeface="Calibri" panose="020F0502020204030204"/>
+                          <a:ea typeface="+mn-ea"/>
+                          <a:cs typeface="+mn-cs"/>
+                        </a:rPr>
+                        <a:t>/knowledgebase/topics/125589-developer-information</a:t>
+                      </a:r>
+                      <a:endParaRPr kumimoji="0" lang="en-CH" sz="1400" b="0" i="0" u="none" strike="noStrike" kern="1200" cap="none" spc="0" normalizeH="0" baseline="0" noProof="0" dirty="0">
+                        <a:ln>
+                          <a:noFill/>
+                        </a:ln>
+                        <a:solidFill>
+                          <a:prstClr val="black"/>
+                        </a:solidFill>
+                        <a:effectLst/>
+                        <a:uLnTx/>
+                        <a:uFillTx/>
+                        <a:latin typeface="Calibri" panose="020F0502020204030204"/>
+                        <a:ea typeface="+mn-ea"/>
+                        <a:cs typeface="+mn-cs"/>
+                      </a:endParaRPr>
+                    </a:p>
+                  </a:txBody>
+                  <a:tcPr/>
+                </a:tc>
+                <a:extLst>
+                  <a:ext uri="{0D108BD9-81ED-4DB2-BD59-A6C34878D82A}">
+                    <a16:rowId xmlns:a16="http://schemas.microsoft.com/office/drawing/2014/main" val="1653469390"/>
+                  </a:ext>
+                </a:extLst>
+              </a:tr>
+              <a:tr h="370840">
+                <a:tc>
+                  <a:txBody>
+                    <a:bodyPr/>
+                    <a:lstStyle/>
+                    <a:p>
+                      <a:r>
+                        <a:rPr lang="en-CH" sz="1400" dirty="0"/>
+                        <a:t>Gender equality index</a:t>
+                      </a:r>
+                    </a:p>
+                  </a:txBody>
+                  <a:tcPr/>
+                </a:tc>
+                <a:tc>
+                  <a:txBody>
+                    <a:bodyPr/>
+                    <a:lstStyle/>
+                    <a:p>
+                      <a:pPr marL="0" marR="0" lvl="0" indent="0" algn="l" defTabSz="914400" rtl="0" eaLnBrk="1" fontAlgn="auto" latinLnBrk="0" hangingPunct="1">
+                        <a:lnSpc>
+                          <a:spcPct val="100000"/>
+                        </a:lnSpc>
+                        <a:spcBef>
+                          <a:spcPts val="0"/>
+                        </a:spcBef>
+                        <a:spcAft>
+                          <a:spcPts val="0"/>
+                        </a:spcAft>
+                        <a:buClrTx/>
+                        <a:buSzTx/>
+                        <a:buFontTx/>
+                        <a:buNone/>
+                        <a:tabLst/>
+                        <a:defRPr/>
+                      </a:pPr>
+                      <a:r>
+                        <a:rPr lang="en-CH" sz="1400" dirty="0"/>
+                        <a:t>World Bank</a:t>
+                      </a:r>
+                    </a:p>
+                    <a:p>
+                      <a:pPr marL="0" marR="0" lvl="0" indent="0" algn="l" defTabSz="914400" rtl="0" eaLnBrk="1" fontAlgn="auto" latinLnBrk="0" hangingPunct="1">
+                        <a:lnSpc>
+                          <a:spcPct val="100000"/>
+                        </a:lnSpc>
+                        <a:spcBef>
+                          <a:spcPts val="0"/>
+                        </a:spcBef>
+                        <a:spcAft>
+                          <a:spcPts val="0"/>
+                        </a:spcAft>
+                        <a:buClrTx/>
+                        <a:buSzTx/>
+                        <a:buFontTx/>
+                        <a:buNone/>
+                        <a:tabLst/>
+                        <a:defRPr/>
+                      </a:pPr>
+                      <a:endParaRPr lang="en-CH" sz="1400" dirty="0"/>
+                    </a:p>
+                  </a:txBody>
+                  <a:tcPr/>
+                </a:tc>
+                <a:tc>
+                  <a:txBody>
+                    <a:bodyPr/>
+                    <a:lstStyle/>
+                    <a:p>
+                      <a:r>
+                        <a:rPr lang="en-CH" sz="1400" dirty="0"/>
+                        <a:t>Social</a:t>
+                      </a:r>
+                    </a:p>
+                  </a:txBody>
+                  <a:tcPr/>
+                </a:tc>
+                <a:tc>
+                  <a:txBody>
+                    <a:bodyPr/>
+                    <a:lstStyle/>
+                    <a:p>
+                      <a:r>
+                        <a:rPr lang="en-CH" sz="1400" dirty="0"/>
+                        <a:t>all?</a:t>
+                      </a:r>
+                    </a:p>
+                  </a:txBody>
+                  <a:tcPr/>
+                </a:tc>
+                <a:tc>
+                  <a:txBody>
+                    <a:bodyPr/>
+                    <a:lstStyle/>
+                    <a:p>
+                      <a:r>
+                        <a:rPr lang="en-CH" sz="1400" dirty="0"/>
+                        <a:t>All?</a:t>
+                      </a:r>
+                    </a:p>
+                  </a:txBody>
+                  <a:tcPr/>
+                </a:tc>
+                <a:tc>
+                  <a:txBody>
+                    <a:bodyPr/>
+                    <a:lstStyle/>
+                    <a:p>
+                      <a:r>
+                        <a:rPr lang="en-CH" sz="1400" dirty="0"/>
+                        <a:t>API – World Bnak</a:t>
+                      </a:r>
+                    </a:p>
+                  </a:txBody>
+                  <a:tcPr/>
+                </a:tc>
+                <a:tc>
+                  <a:txBody>
+                    <a:bodyPr/>
+                    <a:lstStyle/>
+                    <a:p>
+                      <a:r>
+                        <a:rPr lang="en-CH" sz="1400" dirty="0"/>
+                        <a:t>Ruben</a:t>
+                      </a:r>
+                    </a:p>
+                  </a:txBody>
+                  <a:tcPr/>
+                </a:tc>
+                <a:tc>
+                  <a:txBody>
+                    <a:bodyPr/>
+                    <a:lstStyle/>
+                    <a:p>
+                      <a:pPr marL="0" marR="0" lvl="0" indent="0" algn="l" defTabSz="914400" rtl="0" eaLnBrk="1" fontAlgn="auto" latinLnBrk="0" hangingPunct="1">
+                        <a:lnSpc>
+                          <a:spcPct val="100000"/>
+                        </a:lnSpc>
+                        <a:spcBef>
+                          <a:spcPts val="0"/>
+                        </a:spcBef>
+                        <a:spcAft>
+                          <a:spcPts val="0"/>
+                        </a:spcAft>
+                        <a:buClrTx/>
+                        <a:buSzTx/>
+                        <a:buFontTx/>
+                        <a:buNone/>
+                        <a:tabLst/>
+                        <a:defRPr/>
+                      </a:pPr>
+                      <a:r>
+                        <a:rPr kumimoji="0" lang="en-GB" sz="1400" b="0" i="0" u="none" strike="noStrike" kern="1200" cap="none" spc="0" normalizeH="0" baseline="0" noProof="0" dirty="0">
+                          <a:ln>
+                            <a:noFill/>
+                          </a:ln>
+                          <a:solidFill>
+                            <a:prstClr val="black"/>
+                          </a:solidFill>
+                          <a:effectLst/>
+                          <a:uLnTx/>
+                          <a:uFillTx/>
+                          <a:latin typeface="Calibri" panose="020F0502020204030204"/>
+                          <a:ea typeface="+mn-ea"/>
+                          <a:cs typeface="+mn-cs"/>
+                        </a:rPr>
+                        <a:t>https://</a:t>
+                      </a:r>
+                      <a:r>
+                        <a:rPr kumimoji="0" lang="en-GB" sz="1400" b="0" i="0" u="none" strike="noStrike" kern="1200" cap="none" spc="0" normalizeH="0" baseline="0" noProof="0" dirty="0" err="1">
+                          <a:ln>
+                            <a:noFill/>
+                          </a:ln>
+                          <a:solidFill>
+                            <a:prstClr val="black"/>
+                          </a:solidFill>
+                          <a:effectLst/>
+                          <a:uLnTx/>
+                          <a:uFillTx/>
+                          <a:latin typeface="Calibri" panose="020F0502020204030204"/>
+                          <a:ea typeface="+mn-ea"/>
+                          <a:cs typeface="+mn-cs"/>
+                        </a:rPr>
+                        <a:t>datahelpdesk.worldbank.org</a:t>
+                      </a:r>
+                      <a:r>
+                        <a:rPr kumimoji="0" lang="en-GB" sz="1400" b="0" i="0" u="none" strike="noStrike" kern="1200" cap="none" spc="0" normalizeH="0" baseline="0" noProof="0" dirty="0">
+                          <a:ln>
+                            <a:noFill/>
+                          </a:ln>
+                          <a:solidFill>
+                            <a:prstClr val="black"/>
+                          </a:solidFill>
+                          <a:effectLst/>
+                          <a:uLnTx/>
+                          <a:uFillTx/>
+                          <a:latin typeface="Calibri" panose="020F0502020204030204"/>
+                          <a:ea typeface="+mn-ea"/>
+                          <a:cs typeface="+mn-cs"/>
+                        </a:rPr>
+                        <a:t>/knowledgebase/topics/125589-developer-information</a:t>
+                      </a:r>
+                      <a:endParaRPr kumimoji="0" lang="en-CH" sz="1400" b="0" i="0" u="none" strike="noStrike" kern="1200" cap="none" spc="0" normalizeH="0" baseline="0" noProof="0" dirty="0">
+                        <a:ln>
+                          <a:noFill/>
+                        </a:ln>
+                        <a:solidFill>
+                          <a:prstClr val="black"/>
+                        </a:solidFill>
+                        <a:effectLst/>
+                        <a:uLnTx/>
+                        <a:uFillTx/>
+                        <a:latin typeface="Calibri" panose="020F0502020204030204"/>
+                        <a:ea typeface="+mn-ea"/>
+                        <a:cs typeface="+mn-cs"/>
+                      </a:endParaRPr>
+                    </a:p>
+                  </a:txBody>
+                  <a:tcPr/>
+                </a:tc>
+                <a:extLst>
+                  <a:ext uri="{0D108BD9-81ED-4DB2-BD59-A6C34878D82A}">
+                    <a16:rowId xmlns:a16="http://schemas.microsoft.com/office/drawing/2014/main" val="1632130514"/>
+                  </a:ext>
+                </a:extLst>
+              </a:tr>
+            </a:tbl>
+          </a:graphicData>
+        </a:graphic>
+      </p:graphicFrame>
+    </p:spTree>
+    <p:extLst>
+      <p:ext uri="{BB962C8B-B14F-4D97-AF65-F5344CB8AC3E}">
+        <p14:creationId xmlns:p14="http://schemas.microsoft.com/office/powerpoint/2010/main" val="1294214092"/>
+      </p:ext>
+    </p:extLst>
+  </p:cSld>
+  <p:clrMapOvr>
+    <a:masterClrMapping/>
+  </p:clrMapOvr>
+</p:sld>
+</file>
+
+<file path=ppt/slides/slide4.xml><?xml version="1.0" encoding="utf-8"?>
+<p:sld xmlns:a="http://schemas.openxmlformats.org/drawingml/2006/main" xmlns:r="http://schemas.openxmlformats.org/officeDocument/2006/relationships" xmlns:p="http://schemas.openxmlformats.org/presentationml/2006/main">
+  <p:cSld>
+    <p:spTree>
+      <p:nvGrpSpPr>
+        <p:cNvPr id="1" name=""/>
+        <p:cNvGrpSpPr/>
+        <p:nvPr/>
+      </p:nvGrpSpPr>
+      <p:grpSpPr>
+        <a:xfrm>
+          <a:off x="0" y="0"/>
+          <a:ext cx="0" cy="0"/>
+          <a:chOff x="0" y="0"/>
+          <a:chExt cx="0" cy="0"/>
+        </a:xfrm>
+      </p:grpSpPr>
+      <p:graphicFrame>
+        <p:nvGraphicFramePr>
+          <p:cNvPr id="2" name="Table 2">
+            <a:extLst>
+              <a:ext uri="{FF2B5EF4-FFF2-40B4-BE49-F238E27FC236}">
+                <a16:creationId xmlns:a16="http://schemas.microsoft.com/office/drawing/2014/main" id="{0B18FDD4-F617-3F41-8EA5-49E5BB8E8F8A}"/>
+              </a:ext>
+            </a:extLst>
+          </p:cNvPr>
+          <p:cNvGraphicFramePr>
+            <a:graphicFrameLocks noGrp="1"/>
+          </p:cNvGraphicFramePr>
+          <p:nvPr>
+            <p:extLst>
+              <p:ext uri="{D42A27DB-BD31-4B8C-83A1-F6EECF244321}">
+                <p14:modId xmlns:p14="http://schemas.microsoft.com/office/powerpoint/2010/main" val="1356703667"/>
+              </p:ext>
+            </p:extLst>
+          </p:nvPr>
+        </p:nvGraphicFramePr>
+        <p:xfrm>
+          <a:off x="262472" y="149860"/>
+          <a:ext cx="11578156" cy="4770120"/>
+        </p:xfrm>
+        <a:graphic>
+          <a:graphicData uri="http://schemas.openxmlformats.org/drawingml/2006/table">
+            <a:tbl>
+              <a:tblPr firstRow="1" bandRow="1">
+                <a:tableStyleId>{5C22544A-7EE6-4342-B048-85BDC9FD1C3A}</a:tableStyleId>
+              </a:tblPr>
+              <a:tblGrid>
+                <a:gridCol w="1172327">
+                  <a:extLst>
+                    <a:ext uri="{9D8B030D-6E8A-4147-A177-3AD203B41FA5}">
+                      <a16:colId xmlns:a16="http://schemas.microsoft.com/office/drawing/2014/main" val="560671824"/>
+                    </a:ext>
+                  </a:extLst>
+                </a:gridCol>
+                <a:gridCol w="1933506">
+                  <a:extLst>
+                    <a:ext uri="{9D8B030D-6E8A-4147-A177-3AD203B41FA5}">
+                      <a16:colId xmlns:a16="http://schemas.microsoft.com/office/drawing/2014/main" val="4152309054"/>
+                    </a:ext>
+                  </a:extLst>
+                </a:gridCol>
+                <a:gridCol w="1447630">
+                  <a:extLst>
+                    <a:ext uri="{9D8B030D-6E8A-4147-A177-3AD203B41FA5}">
+                      <a16:colId xmlns:a16="http://schemas.microsoft.com/office/drawing/2014/main" val="3334091744"/>
+                    </a:ext>
+                  </a:extLst>
+                </a:gridCol>
+                <a:gridCol w="1447630">
+                  <a:extLst>
+                    <a:ext uri="{9D8B030D-6E8A-4147-A177-3AD203B41FA5}">
+                      <a16:colId xmlns:a16="http://schemas.microsoft.com/office/drawing/2014/main" val="1803823765"/>
+                    </a:ext>
+                  </a:extLst>
+                </a:gridCol>
+                <a:gridCol w="1015964">
+                  <a:extLst>
+                    <a:ext uri="{9D8B030D-6E8A-4147-A177-3AD203B41FA5}">
+                      <a16:colId xmlns:a16="http://schemas.microsoft.com/office/drawing/2014/main" val="1239427225"/>
+                    </a:ext>
+                  </a:extLst>
+                </a:gridCol>
+                <a:gridCol w="1015964">
+                  <a:extLst>
+                    <a:ext uri="{9D8B030D-6E8A-4147-A177-3AD203B41FA5}">
+                      <a16:colId xmlns:a16="http://schemas.microsoft.com/office/drawing/2014/main" val="3084226329"/>
+                    </a:ext>
+                  </a:extLst>
+                </a:gridCol>
+                <a:gridCol w="1015964">
+                  <a:extLst>
+                    <a:ext uri="{9D8B030D-6E8A-4147-A177-3AD203B41FA5}">
+                      <a16:colId xmlns:a16="http://schemas.microsoft.com/office/drawing/2014/main" val="4170340966"/>
+                    </a:ext>
+                  </a:extLst>
+                </a:gridCol>
+                <a:gridCol w="2529171">
+                  <a:extLst>
+                    <a:ext uri="{9D8B030D-6E8A-4147-A177-3AD203B41FA5}">
+                      <a16:colId xmlns:a16="http://schemas.microsoft.com/office/drawing/2014/main" val="4264531284"/>
+                    </a:ext>
+                  </a:extLst>
+                </a:gridCol>
+              </a:tblGrid>
+              <a:tr h="370840">
+                <a:tc>
+                  <a:txBody>
+                    <a:bodyPr/>
+                    <a:lstStyle/>
+                    <a:p>
+                      <a:r>
+                        <a:rPr lang="en-CH" sz="1400" dirty="0"/>
+                        <a:t>Indicator</a:t>
+                      </a:r>
+                    </a:p>
+                  </a:txBody>
+                  <a:tcPr/>
+                </a:tc>
+                <a:tc>
+                  <a:txBody>
+                    <a:bodyPr/>
+                    <a:lstStyle/>
+                    <a:p>
+                      <a:r>
+                        <a:rPr lang="en-CH" sz="1400" dirty="0"/>
+                        <a:t>Source</a:t>
+                      </a:r>
+                    </a:p>
+                  </a:txBody>
+                  <a:tcPr/>
+                </a:tc>
+                <a:tc>
+                  <a:txBody>
+                    <a:bodyPr/>
+                    <a:lstStyle/>
+                    <a:p>
+                      <a:r>
+                        <a:rPr lang="en-CH" sz="1400" dirty="0"/>
+                        <a:t>Indicator class</a:t>
+                      </a:r>
+                    </a:p>
+                  </a:txBody>
+                  <a:tcPr/>
+                </a:tc>
+                <a:tc>
+                  <a:txBody>
+                    <a:bodyPr/>
+                    <a:lstStyle/>
+                    <a:p>
+                      <a:r>
+                        <a:rPr lang="en-CH" sz="1400" dirty="0"/>
+                        <a:t>Available years</a:t>
+                      </a:r>
+                    </a:p>
+                  </a:txBody>
+                  <a:tcPr/>
+                </a:tc>
+                <a:tc>
+                  <a:txBody>
+                    <a:bodyPr/>
+                    <a:lstStyle/>
+                    <a:p>
+                      <a:r>
+                        <a:rPr lang="en-CH" sz="1400" dirty="0"/>
+                        <a:t>Available countries</a:t>
+                      </a:r>
+                    </a:p>
+                  </a:txBody>
+                  <a:tcPr/>
+                </a:tc>
+                <a:tc>
+                  <a:txBody>
+                    <a:bodyPr/>
+                    <a:lstStyle/>
+                    <a:p>
+                      <a:r>
+                        <a:rPr lang="en-CH" sz="1400" dirty="0"/>
+                        <a:t>Access</a:t>
+                      </a:r>
+                    </a:p>
+                  </a:txBody>
+                  <a:tcPr/>
+                </a:tc>
+                <a:tc>
+                  <a:txBody>
+                    <a:bodyPr/>
+                    <a:lstStyle/>
+                    <a:p>
+                      <a:r>
+                        <a:rPr lang="en-GB" sz="1400" dirty="0"/>
+                        <a:t>Responsa</a:t>
+                      </a:r>
+                      <a:r>
+                        <a:rPr lang="en-CH" sz="1400" dirty="0"/>
+                        <a:t>ble?</a:t>
+                      </a:r>
+                    </a:p>
+                  </a:txBody>
+                  <a:tcPr/>
+                </a:tc>
+                <a:tc>
+                  <a:txBody>
+                    <a:bodyPr/>
+                    <a:lstStyle/>
+                    <a:p>
+                      <a:r>
+                        <a:rPr lang="en-CH" sz="1400" dirty="0"/>
+                        <a:t>Home link</a:t>
+                      </a:r>
+                    </a:p>
+                  </a:txBody>
+                  <a:tcPr/>
+                </a:tc>
+                <a:extLst>
+                  <a:ext uri="{0D108BD9-81ED-4DB2-BD59-A6C34878D82A}">
+                    <a16:rowId xmlns:a16="http://schemas.microsoft.com/office/drawing/2014/main" val="451230032"/>
+                  </a:ext>
+                </a:extLst>
+              </a:tr>
+              <a:tr h="370840">
+                <a:tc>
+                  <a:txBody>
+                    <a:bodyPr/>
+                    <a:lstStyle/>
+                    <a:p>
+                      <a:r>
+                        <a:rPr lang="en-CH" sz="1400" dirty="0"/>
+                        <a:t>Gender development index</a:t>
+                      </a:r>
+                    </a:p>
+                  </a:txBody>
+                  <a:tcPr/>
+                </a:tc>
+                <a:tc>
+                  <a:txBody>
+                    <a:bodyPr/>
+                    <a:lstStyle/>
+                    <a:p>
+                      <a:r>
+                        <a:rPr lang="en-CH" sz="1400" dirty="0"/>
+                        <a:t>Human development data center (UNDP)</a:t>
+                      </a:r>
+                    </a:p>
+                  </a:txBody>
+                  <a:tcPr/>
+                </a:tc>
+                <a:tc>
+                  <a:txBody>
+                    <a:bodyPr/>
+                    <a:lstStyle/>
+                    <a:p>
+                      <a:r>
+                        <a:rPr lang="en-CH" sz="1400" dirty="0"/>
+                        <a:t>Socio economic, complex</a:t>
+                      </a:r>
+                    </a:p>
+                  </a:txBody>
+                  <a:tcPr/>
+                </a:tc>
+                <a:tc>
+                  <a:txBody>
+                    <a:bodyPr/>
+                    <a:lstStyle/>
+                    <a:p>
+                      <a:r>
+                        <a:rPr lang="en-CH" sz="1400" dirty="0"/>
+                        <a:t>2019-2010,</a:t>
+                      </a:r>
+                    </a:p>
+                    <a:p>
+                      <a:r>
+                        <a:rPr lang="en-CH" sz="1400" dirty="0"/>
+                        <a:t>2005, 2000,</a:t>
+                      </a:r>
+                    </a:p>
+                    <a:p>
+                      <a:r>
+                        <a:rPr lang="en-CH" sz="1400" dirty="0"/>
+                        <a:t>1995,1990</a:t>
+                      </a:r>
+                    </a:p>
+                  </a:txBody>
+                  <a:tcPr/>
+                </a:tc>
+                <a:tc>
+                  <a:txBody>
+                    <a:bodyPr/>
+                    <a:lstStyle/>
+                    <a:p>
+                      <a:r>
+                        <a:rPr lang="en-CH" sz="1400" dirty="0"/>
+                        <a:t>ALL?</a:t>
+                      </a:r>
+                    </a:p>
+                  </a:txBody>
+                  <a:tcPr/>
+                </a:tc>
+                <a:tc>
+                  <a:txBody>
+                    <a:bodyPr/>
+                    <a:lstStyle/>
+                    <a:p>
+                      <a:r>
+                        <a:rPr lang="en-CH" sz="1400" dirty="0"/>
+                        <a:t>API - UNDP</a:t>
+                      </a:r>
+                    </a:p>
+                  </a:txBody>
+                  <a:tcPr/>
+                </a:tc>
+                <a:tc>
+                  <a:txBody>
+                    <a:bodyPr/>
+                    <a:lstStyle/>
+                    <a:p>
+                      <a:r>
+                        <a:rPr lang="en-CH" sz="1400" dirty="0"/>
+                        <a:t>Ruben</a:t>
+                      </a:r>
+                    </a:p>
+                  </a:txBody>
+                  <a:tcPr/>
+                </a:tc>
+                <a:tc>
+                  <a:txBody>
+                    <a:bodyPr/>
+                    <a:lstStyle/>
+                    <a:p>
+                      <a:r>
+                        <a:rPr lang="en-GB" sz="1400" dirty="0"/>
+                        <a:t>http://</a:t>
+                      </a:r>
+                      <a:r>
+                        <a:rPr lang="en-GB" sz="1400" dirty="0" err="1"/>
+                        <a:t>hdr.undp.org</a:t>
+                      </a:r>
+                      <a:r>
+                        <a:rPr lang="en-GB" sz="1400" dirty="0"/>
+                        <a:t>/</a:t>
+                      </a:r>
+                      <a:r>
+                        <a:rPr lang="en-GB" sz="1400" dirty="0" err="1"/>
+                        <a:t>en</a:t>
+                      </a:r>
+                      <a:r>
+                        <a:rPr lang="en-GB" sz="1400" dirty="0"/>
+                        <a:t>/data</a:t>
+                      </a:r>
+                      <a:endParaRPr lang="en-CH" sz="1400" dirty="0"/>
+                    </a:p>
+                  </a:txBody>
+                  <a:tcPr/>
+                </a:tc>
+                <a:extLst>
+                  <a:ext uri="{0D108BD9-81ED-4DB2-BD59-A6C34878D82A}">
+                    <a16:rowId xmlns:a16="http://schemas.microsoft.com/office/drawing/2014/main" val="3825695763"/>
+                  </a:ext>
+                </a:extLst>
+              </a:tr>
+              <a:tr h="370840">
+                <a:tc>
+                  <a:txBody>
+                    <a:bodyPr/>
+                    <a:lstStyle/>
+                    <a:p>
+                      <a:r>
+                        <a:rPr lang="en-GB" sz="1400" dirty="0"/>
+                        <a:t>seats held by women in national parliaments</a:t>
+                      </a:r>
+                      <a:endParaRPr lang="en-CH" sz="1400" dirty="0"/>
+                    </a:p>
+                  </a:txBody>
+                  <a:tcPr/>
+                </a:tc>
+                <a:tc>
+                  <a:txBody>
+                    <a:bodyPr/>
+                    <a:lstStyle/>
+                    <a:p>
+                      <a:pPr marL="0" marR="0" lvl="0" indent="0" algn="l" defTabSz="914400" rtl="0" eaLnBrk="1" fontAlgn="auto" latinLnBrk="0" hangingPunct="1">
+                        <a:lnSpc>
+                          <a:spcPct val="100000"/>
+                        </a:lnSpc>
+                        <a:spcBef>
+                          <a:spcPts val="0"/>
+                        </a:spcBef>
+                        <a:spcAft>
+                          <a:spcPts val="0"/>
+                        </a:spcAft>
+                        <a:buClrTx/>
+                        <a:buSzTx/>
+                        <a:buFontTx/>
+                        <a:buNone/>
+                        <a:tabLst/>
+                        <a:defRPr/>
+                      </a:pPr>
+                      <a:r>
+                        <a:rPr lang="en-CH" sz="1400"/>
+                        <a:t>World Bank</a:t>
+                      </a:r>
+                    </a:p>
+                    <a:p>
+                      <a:endParaRPr lang="en-CH" sz="1400" dirty="0"/>
+                    </a:p>
+                  </a:txBody>
+                  <a:tcPr/>
+                </a:tc>
+                <a:tc>
+                  <a:txBody>
+                    <a:bodyPr/>
+                    <a:lstStyle/>
+                    <a:p>
+                      <a:r>
+                        <a:rPr lang="en-GB" sz="1400" dirty="0"/>
+                        <a:t>G</a:t>
+                      </a:r>
+                      <a:r>
+                        <a:rPr lang="en-CH" sz="1400" dirty="0"/>
+                        <a:t>ender, political</a:t>
+                      </a:r>
+                    </a:p>
+                  </a:txBody>
+                  <a:tcPr/>
+                </a:tc>
+                <a:tc>
+                  <a:txBody>
+                    <a:bodyPr/>
+                    <a:lstStyle/>
+                    <a:p>
+                      <a:r>
+                        <a:rPr lang="en-CH" sz="1400" dirty="0"/>
+                        <a:t>all?</a:t>
+                      </a:r>
+                    </a:p>
+                  </a:txBody>
+                  <a:tcPr/>
+                </a:tc>
+                <a:tc>
+                  <a:txBody>
+                    <a:bodyPr/>
+                    <a:lstStyle/>
+                    <a:p>
+                      <a:r>
+                        <a:rPr lang="en-CH" sz="1400" dirty="0"/>
+                        <a:t>All?</a:t>
+                      </a:r>
+                    </a:p>
+                  </a:txBody>
+                  <a:tcPr/>
+                </a:tc>
+                <a:tc>
+                  <a:txBody>
+                    <a:bodyPr/>
+                    <a:lstStyle/>
+                    <a:p>
+                      <a:r>
+                        <a:rPr lang="en-CH" sz="1400" dirty="0"/>
+                        <a:t>API – World Bnak</a:t>
+                      </a:r>
+                    </a:p>
+                  </a:txBody>
+                  <a:tcPr/>
+                </a:tc>
+                <a:tc>
+                  <a:txBody>
+                    <a:bodyPr/>
+                    <a:lstStyle/>
+                    <a:p>
+                      <a:r>
+                        <a:rPr lang="en-CH" sz="1400" dirty="0"/>
+                        <a:t>Ruben</a:t>
+                      </a:r>
+                    </a:p>
+                  </a:txBody>
+                  <a:tcPr/>
+                </a:tc>
+                <a:tc>
+                  <a:txBody>
+                    <a:bodyPr/>
+                    <a:lstStyle/>
+                    <a:p>
+                      <a:r>
+                        <a:rPr lang="en-GB" sz="1400" dirty="0"/>
+                        <a:t>https://</a:t>
+                      </a:r>
+                      <a:r>
+                        <a:rPr lang="en-GB" sz="1400" dirty="0" err="1"/>
+                        <a:t>datahelpdesk.worldbank.org</a:t>
+                      </a:r>
+                      <a:r>
+                        <a:rPr lang="en-GB" sz="1400" dirty="0"/>
+                        <a:t>/knowledgebase/topics/125589-developer-information</a:t>
+                      </a:r>
+                      <a:endParaRPr lang="en-CH" sz="1400" dirty="0"/>
+                    </a:p>
+                  </a:txBody>
+                  <a:tcPr/>
+                </a:tc>
+                <a:extLst>
+                  <a:ext uri="{0D108BD9-81ED-4DB2-BD59-A6C34878D82A}">
+                    <a16:rowId xmlns:a16="http://schemas.microsoft.com/office/drawing/2014/main" val="1829815335"/>
+                  </a:ext>
+                </a:extLst>
+              </a:tr>
+              <a:tr h="370840">
+                <a:tc>
+                  <a:txBody>
+                    <a:bodyPr/>
+                    <a:lstStyle/>
+                    <a:p>
+                      <a:r>
+                        <a:rPr lang="en-CH" sz="1400" dirty="0"/>
+                        <a:t>Multidimentional poverty index</a:t>
+                      </a:r>
+                    </a:p>
+                  </a:txBody>
+                  <a:tcPr/>
+                </a:tc>
+                <a:tc>
+                  <a:txBody>
+                    <a:bodyPr/>
+                    <a:lstStyle/>
+                    <a:p>
+                      <a:pPr marL="0" marR="0" lvl="0" indent="0" algn="l" defTabSz="914400" rtl="0" eaLnBrk="1" fontAlgn="auto" latinLnBrk="0" hangingPunct="1">
+                        <a:lnSpc>
+                          <a:spcPct val="100000"/>
+                        </a:lnSpc>
+                        <a:spcBef>
+                          <a:spcPts val="0"/>
+                        </a:spcBef>
+                        <a:spcAft>
+                          <a:spcPts val="0"/>
+                        </a:spcAft>
+                        <a:buClrTx/>
+                        <a:buSzTx/>
+                        <a:buFontTx/>
+                        <a:buNone/>
+                        <a:tabLst/>
+                        <a:defRPr/>
+                      </a:pPr>
+                      <a:r>
+                        <a:rPr lang="en-CH" sz="1400" dirty="0"/>
+                        <a:t>Human development data center (UNDP)</a:t>
+                      </a:r>
+                    </a:p>
+                    <a:p>
+                      <a:pPr marL="0" marR="0" lvl="0" indent="0" algn="l" defTabSz="914400" rtl="0" eaLnBrk="1" fontAlgn="auto" latinLnBrk="0" hangingPunct="1">
+                        <a:lnSpc>
+                          <a:spcPct val="100000"/>
+                        </a:lnSpc>
+                        <a:spcBef>
+                          <a:spcPts val="0"/>
+                        </a:spcBef>
+                        <a:spcAft>
+                          <a:spcPts val="0"/>
+                        </a:spcAft>
+                        <a:buClrTx/>
+                        <a:buSzTx/>
+                        <a:buFontTx/>
+                        <a:buNone/>
+                        <a:tabLst/>
+                        <a:defRPr/>
+                      </a:pPr>
+                      <a:endParaRPr lang="en-CH" sz="1400" dirty="0"/>
+                    </a:p>
+                  </a:txBody>
+                  <a:tcPr/>
+                </a:tc>
+                <a:tc>
+                  <a:txBody>
+                    <a:bodyPr/>
+                    <a:lstStyle/>
+                    <a:p>
+                      <a:r>
+                        <a:rPr lang="en-CH" sz="1400" dirty="0"/>
+                        <a:t>Socio economic, complex</a:t>
+                      </a:r>
+                    </a:p>
+                  </a:txBody>
+                  <a:tcPr/>
+                </a:tc>
+                <a:tc>
+                  <a:txBody>
+                    <a:bodyPr/>
+                    <a:lstStyle/>
+                    <a:p>
+                      <a:r>
+                        <a:rPr lang="en-CH" sz="1400" dirty="0"/>
+                        <a:t>2019-2010,</a:t>
+                      </a:r>
+                    </a:p>
+                    <a:p>
+                      <a:r>
+                        <a:rPr lang="en-CH" sz="1400" dirty="0"/>
+                        <a:t>2005, 2000,</a:t>
+                      </a:r>
+                    </a:p>
+                    <a:p>
+                      <a:r>
+                        <a:rPr lang="en-CH" sz="1400" dirty="0"/>
+                        <a:t>1995,1990</a:t>
+                      </a:r>
+                    </a:p>
+                  </a:txBody>
+                  <a:tcPr/>
+                </a:tc>
+                <a:tc>
+                  <a:txBody>
+                    <a:bodyPr/>
+                    <a:lstStyle/>
+                    <a:p>
+                      <a:r>
+                        <a:rPr lang="en-CH" sz="1400" dirty="0"/>
+                        <a:t>ALL?</a:t>
+                      </a:r>
+                    </a:p>
+                  </a:txBody>
+                  <a:tcPr/>
+                </a:tc>
+                <a:tc>
+                  <a:txBody>
+                    <a:bodyPr/>
+                    <a:lstStyle/>
+                    <a:p>
+                      <a:r>
+                        <a:rPr lang="en-CH" sz="1400" dirty="0"/>
+                        <a:t>API - UNDP</a:t>
+                      </a:r>
+                    </a:p>
+                  </a:txBody>
+                  <a:tcPr/>
+                </a:tc>
+                <a:tc>
+                  <a:txBody>
+                    <a:bodyPr/>
+                    <a:lstStyle/>
+                    <a:p>
+                      <a:r>
+                        <a:rPr lang="en-CH" sz="1400" dirty="0"/>
+                        <a:t>Ruben</a:t>
+                      </a:r>
+                    </a:p>
+                  </a:txBody>
+                  <a:tcPr/>
+                </a:tc>
+                <a:tc>
+                  <a:txBody>
+                    <a:bodyPr/>
+                    <a:lstStyle/>
+                    <a:p>
+                      <a:r>
+                        <a:rPr lang="en-GB" sz="1400" dirty="0"/>
+                        <a:t>http://</a:t>
+                      </a:r>
+                      <a:r>
+                        <a:rPr lang="en-GB" sz="1400" dirty="0" err="1"/>
+                        <a:t>hdr.undp.org</a:t>
+                      </a:r>
+                      <a:r>
+                        <a:rPr lang="en-GB" sz="1400" dirty="0"/>
+                        <a:t>/</a:t>
+                      </a:r>
+                      <a:r>
+                        <a:rPr lang="en-GB" sz="1400" dirty="0" err="1"/>
+                        <a:t>en</a:t>
+                      </a:r>
+                      <a:r>
+                        <a:rPr lang="en-GB" sz="1400" dirty="0"/>
+                        <a:t>/data</a:t>
+                      </a:r>
+                      <a:endParaRPr lang="en-CH" sz="1400" dirty="0"/>
+                    </a:p>
+                  </a:txBody>
+                  <a:tcPr/>
+                </a:tc>
+                <a:extLst>
+                  <a:ext uri="{0D108BD9-81ED-4DB2-BD59-A6C34878D82A}">
+                    <a16:rowId xmlns:a16="http://schemas.microsoft.com/office/drawing/2014/main" val="2216577571"/>
+                  </a:ext>
+                </a:extLst>
+              </a:tr>
+              <a:tr h="370840">
+                <a:tc>
+                  <a:txBody>
+                    <a:bodyPr/>
+                    <a:lstStyle/>
+                    <a:p>
+                      <a:r>
+                        <a:rPr lang="en-CH" sz="1400" dirty="0"/>
+                        <a:t>Geographical regions</a:t>
+                      </a:r>
+                    </a:p>
+                  </a:txBody>
+                  <a:tcPr/>
+                </a:tc>
+                <a:tc>
+                  <a:txBody>
+                    <a:bodyPr/>
+                    <a:lstStyle/>
+                    <a:p>
+                      <a:pPr marL="0" marR="0" lvl="0" indent="0" algn="l" defTabSz="914400" rtl="0" eaLnBrk="1" fontAlgn="auto" latinLnBrk="0" hangingPunct="1">
+                        <a:lnSpc>
+                          <a:spcPct val="100000"/>
+                        </a:lnSpc>
+                        <a:spcBef>
+                          <a:spcPts val="0"/>
+                        </a:spcBef>
+                        <a:spcAft>
+                          <a:spcPts val="0"/>
+                        </a:spcAft>
+                        <a:buClrTx/>
+                        <a:buSzTx/>
+                        <a:buFontTx/>
+                        <a:buNone/>
+                        <a:tabLst/>
+                        <a:defRPr/>
+                      </a:pPr>
+                      <a:r>
+                        <a:rPr lang="en-CH" sz="1400" dirty="0"/>
+                        <a:t>World Bank</a:t>
+                      </a:r>
+                    </a:p>
+                    <a:p>
+                      <a:endParaRPr lang="en-CH" sz="1400" dirty="0"/>
+                    </a:p>
+                  </a:txBody>
+                  <a:tcPr/>
+                </a:tc>
+                <a:tc>
+                  <a:txBody>
+                    <a:bodyPr/>
+                    <a:lstStyle/>
+                    <a:p>
+                      <a:r>
+                        <a:rPr lang="en-CH" sz="1400" dirty="0"/>
+                        <a:t>Geographical</a:t>
+                      </a:r>
+                    </a:p>
+                  </a:txBody>
+                  <a:tcPr/>
+                </a:tc>
+                <a:tc>
+                  <a:txBody>
+                    <a:bodyPr/>
+                    <a:lstStyle/>
+                    <a:p>
+                      <a:r>
+                        <a:rPr lang="en-CH" sz="1400" dirty="0"/>
+                        <a:t>all?</a:t>
+                      </a:r>
+                    </a:p>
+                  </a:txBody>
+                  <a:tcPr/>
+                </a:tc>
+                <a:tc>
+                  <a:txBody>
+                    <a:bodyPr/>
+                    <a:lstStyle/>
+                    <a:p>
+                      <a:r>
+                        <a:rPr lang="en-CH" sz="1400" dirty="0"/>
+                        <a:t>All?</a:t>
+                      </a:r>
+                    </a:p>
+                  </a:txBody>
+                  <a:tcPr/>
+                </a:tc>
+                <a:tc>
+                  <a:txBody>
+                    <a:bodyPr/>
+                    <a:lstStyle/>
+                    <a:p>
+                      <a:r>
+                        <a:rPr lang="en-CH" sz="1400" dirty="0"/>
+                        <a:t>API – World Bnak</a:t>
+                      </a:r>
+                    </a:p>
+                  </a:txBody>
+                  <a:tcPr/>
+                </a:tc>
+                <a:tc>
+                  <a:txBody>
+                    <a:bodyPr/>
+                    <a:lstStyle/>
+                    <a:p>
+                      <a:r>
+                        <a:rPr lang="en-CH" sz="1400" dirty="0"/>
+                        <a:t>Ruben</a:t>
+                      </a:r>
+                    </a:p>
+                  </a:txBody>
+                  <a:tcPr/>
+                </a:tc>
+                <a:tc>
+                  <a:txBody>
+                    <a:bodyPr/>
+                    <a:lstStyle/>
+                    <a:p>
+                      <a:r>
+                        <a:rPr lang="en-GB" sz="1400" dirty="0"/>
+                        <a:t>https://</a:t>
+                      </a:r>
+                      <a:r>
+                        <a:rPr lang="en-GB" sz="1400" dirty="0" err="1"/>
+                        <a:t>datahelpdesk.worldbank.org</a:t>
+                      </a:r>
+                      <a:r>
+                        <a:rPr lang="en-GB" sz="1400" dirty="0"/>
+                        <a:t>/knowledgebase/topics/125589-developer-information</a:t>
+                      </a:r>
+                      <a:endParaRPr lang="en-CH" sz="1400" dirty="0"/>
+                    </a:p>
+                  </a:txBody>
+                  <a:tcPr/>
+                </a:tc>
+                <a:extLst>
+                  <a:ext uri="{0D108BD9-81ED-4DB2-BD59-A6C34878D82A}">
+                    <a16:rowId xmlns:a16="http://schemas.microsoft.com/office/drawing/2014/main" val="499843032"/>
+                  </a:ext>
+                </a:extLst>
+              </a:tr>
+              <a:tr h="370840">
+                <a:tc>
+                  <a:txBody>
+                    <a:bodyPr/>
+                    <a:lstStyle/>
+                    <a:p>
+                      <a:endParaRPr lang="en-CH" sz="1400" dirty="0"/>
+                    </a:p>
+                  </a:txBody>
+                  <a:tcPr/>
+                </a:tc>
+                <a:tc>
+                  <a:txBody>
+                    <a:bodyPr/>
+                    <a:lstStyle/>
+                    <a:p>
+                      <a:endParaRPr lang="en-CH" sz="1400" dirty="0"/>
+                    </a:p>
+                  </a:txBody>
+                  <a:tcPr/>
+                </a:tc>
+                <a:tc>
+                  <a:txBody>
+                    <a:bodyPr/>
+                    <a:lstStyle/>
+                    <a:p>
+                      <a:endParaRPr lang="en-CH" sz="1400" dirty="0"/>
+                    </a:p>
+                  </a:txBody>
+                  <a:tcPr/>
+                </a:tc>
+                <a:tc>
+                  <a:txBody>
+                    <a:bodyPr/>
+                    <a:lstStyle/>
+                    <a:p>
+                      <a:endParaRPr lang="en-CH" sz="1400" dirty="0"/>
+                    </a:p>
+                  </a:txBody>
+                  <a:tcPr/>
+                </a:tc>
+                <a:tc>
+                  <a:txBody>
+                    <a:bodyPr/>
+                    <a:lstStyle/>
+                    <a:p>
+                      <a:endParaRPr lang="en-CH" sz="1400" dirty="0"/>
+                    </a:p>
+                  </a:txBody>
+                  <a:tcPr/>
+                </a:tc>
+                <a:tc>
+                  <a:txBody>
+                    <a:bodyPr/>
+                    <a:lstStyle/>
+                    <a:p>
+                      <a:endParaRPr lang="en-CH" sz="1400" dirty="0"/>
+                    </a:p>
+                  </a:txBody>
+                  <a:tcPr/>
+                </a:tc>
+                <a:tc>
+                  <a:txBody>
+                    <a:bodyPr/>
+                    <a:lstStyle/>
+                    <a:p>
+                      <a:endParaRPr lang="en-CH" sz="1400" dirty="0"/>
+                    </a:p>
+                  </a:txBody>
+                  <a:tcPr/>
+                </a:tc>
+                <a:tc>
+                  <a:txBody>
+                    <a:bodyPr/>
+                    <a:lstStyle/>
+                    <a:p>
+                      <a:pPr marL="0" marR="0" lvl="0" indent="0" algn="l" defTabSz="914400" rtl="0" eaLnBrk="1" fontAlgn="auto" latinLnBrk="0" hangingPunct="1">
+                        <a:lnSpc>
+                          <a:spcPct val="100000"/>
+                        </a:lnSpc>
+                        <a:spcBef>
+                          <a:spcPts val="0"/>
+                        </a:spcBef>
+                        <a:spcAft>
+                          <a:spcPts val="0"/>
+                        </a:spcAft>
+                        <a:buClrTx/>
+                        <a:buSzTx/>
+                        <a:buFontTx/>
+                        <a:buNone/>
+                        <a:tabLst/>
+                        <a:defRPr/>
+                      </a:pPr>
+                      <a:endParaRPr kumimoji="0" lang="en-CH" sz="1400" b="0" i="0" u="none" strike="noStrike" kern="1200" cap="none" spc="0" normalizeH="0" baseline="0" noProof="0" dirty="0">
+                        <a:ln>
+                          <a:noFill/>
+                        </a:ln>
+                        <a:solidFill>
+                          <a:prstClr val="black"/>
+                        </a:solidFill>
+                        <a:effectLst/>
+                        <a:uLnTx/>
+                        <a:uFillTx/>
+                        <a:latin typeface="Calibri" panose="020F0502020204030204"/>
+                        <a:ea typeface="+mn-ea"/>
+                        <a:cs typeface="+mn-cs"/>
+                      </a:endParaRPr>
+                    </a:p>
+                  </a:txBody>
+                  <a:tcPr/>
+                </a:tc>
+                <a:extLst>
+                  <a:ext uri="{0D108BD9-81ED-4DB2-BD59-A6C34878D82A}">
+                    <a16:rowId xmlns:a16="http://schemas.microsoft.com/office/drawing/2014/main" val="4103178330"/>
+                  </a:ext>
+                </a:extLst>
+              </a:tr>
+              <a:tr h="370840">
+                <a:tc>
+                  <a:txBody>
+                    <a:bodyPr/>
+                    <a:lstStyle/>
+                    <a:p>
+                      <a:endParaRPr lang="en-CH" sz="1400" dirty="0"/>
+                    </a:p>
+                  </a:txBody>
+                  <a:tcPr/>
+                </a:tc>
+                <a:tc>
+                  <a:txBody>
+                    <a:bodyPr/>
+                    <a:lstStyle/>
+                    <a:p>
+                      <a:pPr marL="0" marR="0" lvl="0" indent="0" algn="l" defTabSz="914400" rtl="0" eaLnBrk="1" fontAlgn="auto" latinLnBrk="0" hangingPunct="1">
+                        <a:lnSpc>
+                          <a:spcPct val="100000"/>
+                        </a:lnSpc>
+                        <a:spcBef>
+                          <a:spcPts val="0"/>
+                        </a:spcBef>
+                        <a:spcAft>
+                          <a:spcPts val="0"/>
+                        </a:spcAft>
+                        <a:buClrTx/>
+                        <a:buSzTx/>
+                        <a:buFontTx/>
+                        <a:buNone/>
+                        <a:tabLst/>
+                        <a:defRPr/>
+                      </a:pPr>
+                      <a:endParaRPr lang="en-CH" sz="1400" dirty="0"/>
+                    </a:p>
+                  </a:txBody>
+                  <a:tcPr/>
+                </a:tc>
+                <a:tc>
+                  <a:txBody>
+                    <a:bodyPr/>
+                    <a:lstStyle/>
+                    <a:p>
+                      <a:endParaRPr lang="en-CH" sz="1400" dirty="0"/>
+                    </a:p>
+                  </a:txBody>
+                  <a:tcPr/>
+                </a:tc>
+                <a:tc>
+                  <a:txBody>
+                    <a:bodyPr/>
+                    <a:lstStyle/>
+                    <a:p>
+                      <a:endParaRPr lang="en-CH" sz="1400" dirty="0"/>
+                    </a:p>
+                  </a:txBody>
+                  <a:tcPr/>
+                </a:tc>
+                <a:tc>
+                  <a:txBody>
+                    <a:bodyPr/>
+                    <a:lstStyle/>
+                    <a:p>
+                      <a:endParaRPr lang="en-CH" sz="1400" dirty="0"/>
+                    </a:p>
+                  </a:txBody>
+                  <a:tcPr/>
+                </a:tc>
+                <a:tc>
+                  <a:txBody>
+                    <a:bodyPr/>
+                    <a:lstStyle/>
+                    <a:p>
+                      <a:endParaRPr lang="en-CH" sz="1400" dirty="0"/>
+                    </a:p>
+                  </a:txBody>
+                  <a:tcPr/>
+                </a:tc>
+                <a:tc>
+                  <a:txBody>
+                    <a:bodyPr/>
+                    <a:lstStyle/>
+                    <a:p>
+                      <a:endParaRPr lang="en-CH" sz="1400" dirty="0"/>
+                    </a:p>
+                  </a:txBody>
+                  <a:tcPr/>
+                </a:tc>
+                <a:tc>
+                  <a:txBody>
+                    <a:bodyPr/>
+                    <a:lstStyle/>
+                    <a:p>
+                      <a:pPr marL="0" marR="0" lvl="0" indent="0" algn="l" defTabSz="914400" rtl="0" eaLnBrk="1" fontAlgn="auto" latinLnBrk="0" hangingPunct="1">
+                        <a:lnSpc>
+                          <a:spcPct val="100000"/>
+                        </a:lnSpc>
+                        <a:spcBef>
+                          <a:spcPts val="0"/>
+                        </a:spcBef>
+                        <a:spcAft>
+                          <a:spcPts val="0"/>
+                        </a:spcAft>
+                        <a:buClrTx/>
+                        <a:buSzTx/>
+                        <a:buFontTx/>
+                        <a:buNone/>
+                        <a:tabLst/>
+                        <a:defRPr/>
+                      </a:pPr>
+                      <a:endParaRPr kumimoji="0" lang="en-CH" sz="1400" b="0" i="0" u="none" strike="noStrike" kern="1200" cap="none" spc="0" normalizeH="0" baseline="0" noProof="0" dirty="0">
+                        <a:ln>
+                          <a:noFill/>
+                        </a:ln>
+                        <a:solidFill>
+                          <a:prstClr val="black"/>
+                        </a:solidFill>
+                        <a:effectLst/>
+                        <a:uLnTx/>
+                        <a:uFillTx/>
+                        <a:latin typeface="Calibri" panose="020F0502020204030204"/>
+                        <a:ea typeface="+mn-ea"/>
+                        <a:cs typeface="+mn-cs"/>
+                      </a:endParaRPr>
+                    </a:p>
+                  </a:txBody>
+                  <a:tcPr/>
+                </a:tc>
+                <a:extLst>
+                  <a:ext uri="{0D108BD9-81ED-4DB2-BD59-A6C34878D82A}">
+                    <a16:rowId xmlns:a16="http://schemas.microsoft.com/office/drawing/2014/main" val="1653469390"/>
+                  </a:ext>
+                </a:extLst>
+              </a:tr>
+              <a:tr h="370840">
+                <a:tc>
+                  <a:txBody>
+                    <a:bodyPr/>
+                    <a:lstStyle/>
+                    <a:p>
+                      <a:endParaRPr lang="en-CH" sz="1400" dirty="0"/>
+                    </a:p>
+                  </a:txBody>
+                  <a:tcPr/>
+                </a:tc>
+                <a:tc>
+                  <a:txBody>
+                    <a:bodyPr/>
+                    <a:lstStyle/>
+                    <a:p>
+                      <a:pPr marL="0" marR="0" lvl="0" indent="0" algn="l" defTabSz="914400" rtl="0" eaLnBrk="1" fontAlgn="auto" latinLnBrk="0" hangingPunct="1">
+                        <a:lnSpc>
+                          <a:spcPct val="100000"/>
+                        </a:lnSpc>
+                        <a:spcBef>
+                          <a:spcPts val="0"/>
+                        </a:spcBef>
+                        <a:spcAft>
+                          <a:spcPts val="0"/>
+                        </a:spcAft>
+                        <a:buClrTx/>
+                        <a:buSzTx/>
+                        <a:buFontTx/>
+                        <a:buNone/>
+                        <a:tabLst/>
+                        <a:defRPr/>
+                      </a:pPr>
+                      <a:endParaRPr lang="en-CH" sz="1400" dirty="0"/>
+                    </a:p>
+                  </a:txBody>
+                  <a:tcPr/>
+                </a:tc>
+                <a:tc>
+                  <a:txBody>
+                    <a:bodyPr/>
+                    <a:lstStyle/>
+                    <a:p>
+                      <a:endParaRPr lang="en-CH" sz="1400" dirty="0"/>
+                    </a:p>
+                  </a:txBody>
+                  <a:tcPr/>
+                </a:tc>
+                <a:tc>
+                  <a:txBody>
+                    <a:bodyPr/>
+                    <a:lstStyle/>
+                    <a:p>
+                      <a:endParaRPr lang="en-CH" sz="1400" dirty="0"/>
+                    </a:p>
+                  </a:txBody>
+                  <a:tcPr/>
+                </a:tc>
+                <a:tc>
+                  <a:txBody>
+                    <a:bodyPr/>
+                    <a:lstStyle/>
+                    <a:p>
+                      <a:endParaRPr lang="en-CH" sz="1400" dirty="0"/>
+                    </a:p>
+                  </a:txBody>
+                  <a:tcPr/>
+                </a:tc>
+                <a:tc>
+                  <a:txBody>
+                    <a:bodyPr/>
+                    <a:lstStyle/>
+                    <a:p>
+                      <a:endParaRPr lang="en-CH" sz="1400" dirty="0"/>
+                    </a:p>
+                  </a:txBody>
+                  <a:tcPr/>
+                </a:tc>
+                <a:tc>
+                  <a:txBody>
+                    <a:bodyPr/>
+                    <a:lstStyle/>
+                    <a:p>
+                      <a:endParaRPr lang="en-CH" sz="1400" dirty="0"/>
+                    </a:p>
+                  </a:txBody>
+                  <a:tcPr/>
+                </a:tc>
+                <a:tc>
+                  <a:txBody>
+                    <a:bodyPr/>
+                    <a:lstStyle/>
+                    <a:p>
+                      <a:pPr marL="0" marR="0" lvl="0" indent="0" algn="l" defTabSz="914400" rtl="0" eaLnBrk="1" fontAlgn="auto" latinLnBrk="0" hangingPunct="1">
+                        <a:lnSpc>
+                          <a:spcPct val="100000"/>
+                        </a:lnSpc>
+                        <a:spcBef>
+                          <a:spcPts val="0"/>
+                        </a:spcBef>
+                        <a:spcAft>
+                          <a:spcPts val="0"/>
+                        </a:spcAft>
+                        <a:buClrTx/>
+                        <a:buSzTx/>
+                        <a:buFontTx/>
+                        <a:buNone/>
+                        <a:tabLst/>
+                        <a:defRPr/>
+                      </a:pPr>
+                      <a:endParaRPr kumimoji="0" lang="en-CH" sz="1400" b="0" i="0" u="none" strike="noStrike" kern="1200" cap="none" spc="0" normalizeH="0" baseline="0" noProof="0" dirty="0">
+                        <a:ln>
+                          <a:noFill/>
+                        </a:ln>
+                        <a:solidFill>
+                          <a:prstClr val="black"/>
+                        </a:solidFill>
+                        <a:effectLst/>
+                        <a:uLnTx/>
+                        <a:uFillTx/>
+                        <a:latin typeface="Calibri" panose="020F0502020204030204"/>
+                        <a:ea typeface="+mn-ea"/>
+                        <a:cs typeface="+mn-cs"/>
+                      </a:endParaRPr>
+                    </a:p>
+                  </a:txBody>
+                  <a:tcPr/>
+                </a:tc>
+                <a:extLst>
+                  <a:ext uri="{0D108BD9-81ED-4DB2-BD59-A6C34878D82A}">
+                    <a16:rowId xmlns:a16="http://schemas.microsoft.com/office/drawing/2014/main" val="1632130514"/>
+                  </a:ext>
+                </a:extLst>
+              </a:tr>
+            </a:tbl>
+          </a:graphicData>
+        </a:graphic>
+      </p:graphicFrame>
+    </p:spTree>
+    <p:extLst>
+      <p:ext uri="{BB962C8B-B14F-4D97-AF65-F5344CB8AC3E}">
+        <p14:creationId xmlns:p14="http://schemas.microsoft.com/office/powerpoint/2010/main" val="1174565086"/>
+      </p:ext>
+    </p:extLst>
+  </p:cSld>
+  <p:clrMapOvr>
+    <a:masterClrMapping/>
+  </p:clrMapOvr>
+</p:sld>
+</file>
+
 <file path=ppt/theme/theme1.xml><?xml version="1.0" encoding="utf-8"?>
 <a:theme xmlns:a="http://schemas.openxmlformats.org/drawingml/2006/main" name="Office Theme">
   <a:themeElements>

</xml_diff>

<commit_message>
updating the list in the pptx file
</commit_message>
<xml_diff>
--- a/Projects/M3/Project.pptx
+++ b/Projects/M3/Project.pptx
@@ -4710,7 +4710,7 @@
           <p:nvPr>
             <p:extLst>
               <p:ext uri="{D42A27DB-BD31-4B8C-83A1-F6EECF244321}">
-                <p14:modId xmlns:p14="http://schemas.microsoft.com/office/powerpoint/2010/main" val="2239274586"/>
+                <p14:modId xmlns:p14="http://schemas.microsoft.com/office/powerpoint/2010/main" val="2061729650"/>
               </p:ext>
             </p:extLst>
           </p:nvPr>
@@ -5248,7 +5248,7 @@
                     <a:p>
                       <a:r>
                         <a:rPr lang="en-CH" sz="1400" dirty="0"/>
-                        <a:t>Ruben</a:t>
+                        <a:t>Ruben/Valeria</a:t>
                       </a:r>
                     </a:p>
                   </a:txBody>
@@ -5422,125 +5422,6 @@
                     <a:bodyPr/>
                     <a:lstStyle/>
                     <a:p>
-                      <a:r>
-                        <a:rPr lang="en-CH" sz="1400" dirty="0"/>
-                        <a:t>Ruben</a:t>
-                      </a:r>
-                    </a:p>
-                  </a:txBody>
-                  <a:tcPr/>
-                </a:tc>
-                <a:tc>
-                  <a:txBody>
-                    <a:bodyPr/>
-                    <a:lstStyle/>
-                    <a:p>
-                      <a:r>
-                        <a:rPr lang="en-GB" sz="1400" dirty="0"/>
-                        <a:t>http://</a:t>
-                      </a:r>
-                      <a:r>
-                        <a:rPr lang="en-GB" sz="1400" dirty="0" err="1"/>
-                        <a:t>info.worldbank.org</a:t>
-                      </a:r>
-                      <a:r>
-                        <a:rPr lang="en-GB" sz="1400" dirty="0"/>
-                        <a:t>/governance/</a:t>
-                      </a:r>
-                      <a:r>
-                        <a:rPr lang="en-GB" sz="1400" dirty="0" err="1"/>
-                        <a:t>wgi</a:t>
-                      </a:r>
-                      <a:r>
-                        <a:rPr lang="en-GB" sz="1400" dirty="0"/>
-                        <a:t>/</a:t>
-                      </a:r>
-                      <a:endParaRPr lang="en-CH" sz="1400" dirty="0"/>
-                    </a:p>
-                  </a:txBody>
-                  <a:tcPr/>
-                </a:tc>
-                <a:extLst>
-                  <a:ext uri="{0D108BD9-81ED-4DB2-BD59-A6C34878D82A}">
-                    <a16:rowId xmlns:a16="http://schemas.microsoft.com/office/drawing/2014/main" val="499843032"/>
-                  </a:ext>
-                </a:extLst>
-              </a:tr>
-              <a:tr h="370840">
-                <a:tc>
-                  <a:txBody>
-                    <a:bodyPr/>
-                    <a:lstStyle/>
-                    <a:p>
-                      <a:r>
-                        <a:rPr lang="en-CH" sz="1400" dirty="0"/>
-                        <a:t>Politics right Index (PRI)</a:t>
-                      </a:r>
-                    </a:p>
-                  </a:txBody>
-                  <a:tcPr/>
-                </a:tc>
-                <a:tc>
-                  <a:txBody>
-                    <a:bodyPr/>
-                    <a:lstStyle/>
-                    <a:p>
-                      <a:r>
-                        <a:rPr lang="en-CH" sz="1400" dirty="0"/>
-                        <a:t>Freedom Hause</a:t>
-                      </a:r>
-                    </a:p>
-                  </a:txBody>
-                  <a:tcPr/>
-                </a:tc>
-                <a:tc>
-                  <a:txBody>
-                    <a:bodyPr/>
-                    <a:lstStyle/>
-                    <a:p>
-                      <a:r>
-                        <a:rPr lang="en-CH" sz="1400" dirty="0"/>
-                        <a:t>Political, social, complex</a:t>
-                      </a:r>
-                    </a:p>
-                  </a:txBody>
-                  <a:tcPr/>
-                </a:tc>
-                <a:tc>
-                  <a:txBody>
-                    <a:bodyPr/>
-                    <a:lstStyle/>
-                    <a:p>
-                      <a:r>
-                        <a:rPr lang="en-CH" sz="1400" dirty="0"/>
-                        <a:t>&gt;2013</a:t>
-                      </a:r>
-                    </a:p>
-                  </a:txBody>
-                  <a:tcPr/>
-                </a:tc>
-                <a:tc>
-                  <a:txBody>
-                    <a:bodyPr/>
-                    <a:lstStyle/>
-                    <a:p>
-                      <a:r>
-                        <a:rPr lang="en-GB" sz="1400" dirty="0"/>
-                        <a:t>A</a:t>
-                      </a:r>
-                      <a:r>
-                        <a:rPr lang="en-CH" sz="1400" dirty="0"/>
-                        <a:t>ll?</a:t>
-                      </a:r>
-                    </a:p>
-                  </a:txBody>
-                  <a:tcPr/>
-                </a:tc>
-                <a:tc>
-                  <a:txBody>
-                    <a:bodyPr/>
-                    <a:lstStyle/>
-                    <a:p>
                       <a:pPr marL="0" marR="0" lvl="0" indent="0" algn="l" defTabSz="914400" rtl="0" eaLnBrk="1" fontAlgn="auto" latinLnBrk="0" hangingPunct="1">
                         <a:lnSpc>
                           <a:spcPct val="100000"/>
@@ -5559,46 +5440,64 @@
                         <a:defRPr/>
                       </a:pPr>
                       <a:r>
+                        <a:rPr kumimoji="0" lang="en-CH" sz="1400" b="0" i="0" u="none" strike="noStrike" kern="1200" cap="none" spc="0" normalizeH="0" baseline="0" noProof="0">
+                          <a:ln>
+                            <a:noFill/>
+                          </a:ln>
+                          <a:solidFill>
+                            <a:prstClr val="black"/>
+                          </a:solidFill>
+                          <a:effectLst/>
+                          <a:uLnTx/>
+                          <a:uFillTx/>
+                          <a:latin typeface="Calibri" panose="020F0502020204030204"/>
+                          <a:ea typeface="+mn-ea"/>
+                          <a:cs typeface="+mn-cs"/>
+                        </a:rPr>
+                        <a:t>Ruben/Valeria</a:t>
+                      </a:r>
+                      <a:endParaRPr kumimoji="0" lang="en-CH" sz="1400" b="0" i="0" u="none" strike="noStrike" kern="1200" cap="none" spc="0" normalizeH="0" baseline="0" noProof="0" dirty="0">
+                        <a:ln>
+                          <a:noFill/>
+                        </a:ln>
+                        <a:solidFill>
+                          <a:prstClr val="black"/>
+                        </a:solidFill>
+                        <a:effectLst/>
+                        <a:uLnTx/>
+                        <a:uFillTx/>
+                        <a:latin typeface="Calibri" panose="020F0502020204030204"/>
+                        <a:ea typeface="+mn-ea"/>
+                        <a:cs typeface="+mn-cs"/>
+                      </a:endParaRPr>
+                    </a:p>
+                  </a:txBody>
+                  <a:tcPr/>
+                </a:tc>
+                <a:tc>
+                  <a:txBody>
+                    <a:bodyPr/>
+                    <a:lstStyle/>
+                    <a:p>
+                      <a:r>
                         <a:rPr lang="en-GB" sz="1400" dirty="0"/>
-                        <a:t>D</a:t>
-                      </a:r>
-                      <a:r>
-                        <a:rPr lang="en-CH" sz="1400" dirty="0"/>
-                        <a:t>irect download</a:t>
-                      </a:r>
-                    </a:p>
-                  </a:txBody>
-                  <a:tcPr/>
-                </a:tc>
-                <a:tc>
-                  <a:txBody>
-                    <a:bodyPr/>
-                    <a:lstStyle/>
-                    <a:p>
-                      <a:r>
-                        <a:rPr lang="en-CH" sz="1400" dirty="0"/>
-                        <a:t>Ruben</a:t>
-                      </a:r>
-                    </a:p>
-                  </a:txBody>
-                  <a:tcPr/>
-                </a:tc>
-                <a:tc>
-                  <a:txBody>
-                    <a:bodyPr/>
-                    <a:lstStyle/>
-                    <a:p>
+                        <a:t>http://</a:t>
+                      </a:r>
+                      <a:r>
+                        <a:rPr lang="en-GB" sz="1400" dirty="0" err="1"/>
+                        <a:t>info.worldbank.org</a:t>
+                      </a:r>
                       <a:r>
                         <a:rPr lang="en-GB" sz="1400" dirty="0"/>
-                        <a:t>https://</a:t>
+                        <a:t>/governance/</a:t>
                       </a:r>
                       <a:r>
                         <a:rPr lang="en-GB" sz="1400" dirty="0" err="1"/>
-                        <a:t>freedomhouse.org</a:t>
+                        <a:t>wgi</a:t>
                       </a:r>
                       <a:r>
                         <a:rPr lang="en-GB" sz="1400" dirty="0"/>
-                        <a:t>/report/freedom-world</a:t>
+                        <a:t>/</a:t>
                       </a:r>
                       <a:endParaRPr lang="en-CH" sz="1400" dirty="0"/>
                     </a:p>
@@ -5607,7 +5506,7 @@
                 </a:tc>
                 <a:extLst>
                   <a:ext uri="{0D108BD9-81ED-4DB2-BD59-A6C34878D82A}">
-                    <a16:rowId xmlns:a16="http://schemas.microsoft.com/office/drawing/2014/main" val="4103178330"/>
+                    <a16:rowId xmlns:a16="http://schemas.microsoft.com/office/drawing/2014/main" val="499843032"/>
                   </a:ext>
                 </a:extLst>
               </a:tr>
@@ -5619,7 +5518,63 @@
                     <a:p>
                       <a:r>
                         <a:rPr lang="en-CH" sz="1400" dirty="0"/>
-                        <a:t>Civil Liberties index</a:t>
+                        <a:t>Politics right Index (PRI)</a:t>
+                      </a:r>
+                    </a:p>
+                  </a:txBody>
+                  <a:tcPr/>
+                </a:tc>
+                <a:tc>
+                  <a:txBody>
+                    <a:bodyPr/>
+                    <a:lstStyle/>
+                    <a:p>
+                      <a:r>
+                        <a:rPr lang="en-CH" sz="1400" dirty="0"/>
+                        <a:t>Freedom Hause</a:t>
+                      </a:r>
+                    </a:p>
+                  </a:txBody>
+                  <a:tcPr/>
+                </a:tc>
+                <a:tc>
+                  <a:txBody>
+                    <a:bodyPr/>
+                    <a:lstStyle/>
+                    <a:p>
+                      <a:r>
+                        <a:rPr lang="en-CH" sz="1400" dirty="0"/>
+                        <a:t>Political, social, complex</a:t>
+                      </a:r>
+                    </a:p>
+                  </a:txBody>
+                  <a:tcPr/>
+                </a:tc>
+                <a:tc>
+                  <a:txBody>
+                    <a:bodyPr/>
+                    <a:lstStyle/>
+                    <a:p>
+                      <a:r>
+                        <a:rPr lang="en-CH" sz="1400" dirty="0"/>
+                        <a:t>&gt;2013</a:t>
+                      </a:r>
+                    </a:p>
+                  </a:txBody>
+                  <a:tcPr/>
+                </a:tc>
+                <a:tc>
+                  <a:txBody>
+                    <a:bodyPr/>
+                    <a:lstStyle/>
+                    <a:p>
+                      <a:r>
+                        <a:rPr lang="en-GB" sz="1400" dirty="0"/>
+                        <a:t>A</a:t>
+                      </a:r>
+                      <a:r>
+                        <a:rPr lang="en-CH" sz="1400" dirty="0"/>
+                        <a:t>ll?</a:t>
                       </a:r>
                     </a:p>
                   </a:txBody>
@@ -5648,58 +5603,6 @@
                         <a:defRPr/>
                       </a:pPr>
                       <a:r>
-                        <a:rPr lang="en-CH" sz="1400" dirty="0"/>
-                        <a:t>World Bank</a:t>
-                      </a:r>
-                    </a:p>
-                  </a:txBody>
-                  <a:tcPr/>
-                </a:tc>
-                <a:tc>
-                  <a:txBody>
-                    <a:bodyPr/>
-                    <a:lstStyle/>
-                    <a:p>
-                      <a:r>
-                        <a:rPr lang="en-CH" sz="1400" dirty="0"/>
-                        <a:t>Social, political, complex</a:t>
-                      </a:r>
-                    </a:p>
-                  </a:txBody>
-                  <a:tcPr/>
-                </a:tc>
-                <a:tc>
-                  <a:txBody>
-                    <a:bodyPr/>
-                    <a:lstStyle/>
-                    <a:p>
-                      <a:r>
-                        <a:rPr lang="en-CH" sz="1400" dirty="0"/>
-                        <a:t>&gt;1975</a:t>
-                      </a:r>
-                    </a:p>
-                  </a:txBody>
-                  <a:tcPr/>
-                </a:tc>
-                <a:tc>
-                  <a:txBody>
-                    <a:bodyPr/>
-                    <a:lstStyle/>
-                    <a:p>
-                      <a:r>
-                        <a:rPr lang="en-CH" sz="1400" dirty="0"/>
-                        <a:t>All?</a:t>
-                      </a:r>
-                    </a:p>
-                  </a:txBody>
-                  <a:tcPr/>
-                </a:tc>
-                <a:tc>
-                  <a:txBody>
-                    <a:bodyPr/>
-                    <a:lstStyle/>
-                    <a:p>
-                      <a:r>
                         <a:rPr lang="en-GB" sz="1400" dirty="0"/>
                         <a:t>D</a:t>
                       </a:r>
@@ -5716,9 +5619,224 @@
                     <a:bodyPr/>
                     <a:lstStyle/>
                     <a:p>
-                      <a:r>
-                        <a:rPr lang="en-CH" sz="1400" dirty="0"/>
-                        <a:t>Ruben</a:t>
+                      <a:pPr marL="0" marR="0" lvl="0" indent="0" algn="l" defTabSz="914400" rtl="0" eaLnBrk="1" fontAlgn="auto" latinLnBrk="0" hangingPunct="1">
+                        <a:lnSpc>
+                          <a:spcPct val="100000"/>
+                        </a:lnSpc>
+                        <a:spcBef>
+                          <a:spcPts val="0"/>
+                        </a:spcBef>
+                        <a:spcAft>
+                          <a:spcPts val="0"/>
+                        </a:spcAft>
+                        <a:buClrTx/>
+                        <a:buSzTx/>
+                        <a:buFontTx/>
+                        <a:buNone/>
+                        <a:tabLst/>
+                        <a:defRPr/>
+                      </a:pPr>
+                      <a:r>
+                        <a:rPr kumimoji="0" lang="en-CH" sz="1400" b="0" i="0" u="none" strike="noStrike" kern="1200" cap="none" spc="0" normalizeH="0" baseline="0" noProof="0">
+                          <a:ln>
+                            <a:noFill/>
+                          </a:ln>
+                          <a:solidFill>
+                            <a:prstClr val="black"/>
+                          </a:solidFill>
+                          <a:effectLst/>
+                          <a:uLnTx/>
+                          <a:uFillTx/>
+                          <a:latin typeface="Calibri" panose="020F0502020204030204"/>
+                          <a:ea typeface="+mn-ea"/>
+                          <a:cs typeface="+mn-cs"/>
+                        </a:rPr>
+                        <a:t>Ruben/Valeria</a:t>
+                      </a:r>
+                      <a:endParaRPr kumimoji="0" lang="en-CH" sz="1400" b="0" i="0" u="none" strike="noStrike" kern="1200" cap="none" spc="0" normalizeH="0" baseline="0" noProof="0" dirty="0">
+                        <a:ln>
+                          <a:noFill/>
+                        </a:ln>
+                        <a:solidFill>
+                          <a:prstClr val="black"/>
+                        </a:solidFill>
+                        <a:effectLst/>
+                        <a:uLnTx/>
+                        <a:uFillTx/>
+                        <a:latin typeface="Calibri" panose="020F0502020204030204"/>
+                        <a:ea typeface="+mn-ea"/>
+                        <a:cs typeface="+mn-cs"/>
+                      </a:endParaRPr>
+                    </a:p>
+                  </a:txBody>
+                  <a:tcPr/>
+                </a:tc>
+                <a:tc>
+                  <a:txBody>
+                    <a:bodyPr/>
+                    <a:lstStyle/>
+                    <a:p>
+                      <a:r>
+                        <a:rPr lang="en-GB" sz="1400" dirty="0"/>
+                        <a:t>https://</a:t>
+                      </a:r>
+                      <a:r>
+                        <a:rPr lang="en-GB" sz="1400" dirty="0" err="1"/>
+                        <a:t>freedomhouse.org</a:t>
+                      </a:r>
+                      <a:r>
+                        <a:rPr lang="en-GB" sz="1400" dirty="0"/>
+                        <a:t>/report/freedom-world</a:t>
+                      </a:r>
+                      <a:endParaRPr lang="en-CH" sz="1400" dirty="0"/>
+                    </a:p>
+                  </a:txBody>
+                  <a:tcPr/>
+                </a:tc>
+                <a:extLst>
+                  <a:ext uri="{0D108BD9-81ED-4DB2-BD59-A6C34878D82A}">
+                    <a16:rowId xmlns:a16="http://schemas.microsoft.com/office/drawing/2014/main" val="4103178330"/>
+                  </a:ext>
+                </a:extLst>
+              </a:tr>
+              <a:tr h="370840">
+                <a:tc>
+                  <a:txBody>
+                    <a:bodyPr/>
+                    <a:lstStyle/>
+                    <a:p>
+                      <a:r>
+                        <a:rPr lang="en-CH" sz="1400" dirty="0"/>
+                        <a:t>Civil Liberties index</a:t>
+                      </a:r>
+                    </a:p>
+                  </a:txBody>
+                  <a:tcPr/>
+                </a:tc>
+                <a:tc>
+                  <a:txBody>
+                    <a:bodyPr/>
+                    <a:lstStyle/>
+                    <a:p>
+                      <a:pPr marL="0" marR="0" lvl="0" indent="0" algn="l" defTabSz="914400" rtl="0" eaLnBrk="1" fontAlgn="auto" latinLnBrk="0" hangingPunct="1">
+                        <a:lnSpc>
+                          <a:spcPct val="100000"/>
+                        </a:lnSpc>
+                        <a:spcBef>
+                          <a:spcPts val="0"/>
+                        </a:spcBef>
+                        <a:spcAft>
+                          <a:spcPts val="0"/>
+                        </a:spcAft>
+                        <a:buClrTx/>
+                        <a:buSzTx/>
+                        <a:buFontTx/>
+                        <a:buNone/>
+                        <a:tabLst/>
+                        <a:defRPr/>
+                      </a:pPr>
+                      <a:r>
+                        <a:rPr lang="en-CH" sz="1400" dirty="0"/>
+                        <a:t>World Bank</a:t>
+                      </a:r>
+                    </a:p>
+                  </a:txBody>
+                  <a:tcPr/>
+                </a:tc>
+                <a:tc>
+                  <a:txBody>
+                    <a:bodyPr/>
+                    <a:lstStyle/>
+                    <a:p>
+                      <a:r>
+                        <a:rPr lang="en-CH" sz="1400" dirty="0"/>
+                        <a:t>Social, political, complex</a:t>
+                      </a:r>
+                    </a:p>
+                  </a:txBody>
+                  <a:tcPr/>
+                </a:tc>
+                <a:tc>
+                  <a:txBody>
+                    <a:bodyPr/>
+                    <a:lstStyle/>
+                    <a:p>
+                      <a:r>
+                        <a:rPr lang="en-CH" sz="1400" dirty="0"/>
+                        <a:t>&gt;1975</a:t>
+                      </a:r>
+                    </a:p>
+                  </a:txBody>
+                  <a:tcPr/>
+                </a:tc>
+                <a:tc>
+                  <a:txBody>
+                    <a:bodyPr/>
+                    <a:lstStyle/>
+                    <a:p>
+                      <a:r>
+                        <a:rPr lang="en-CH" sz="1400" dirty="0"/>
+                        <a:t>All?</a:t>
+                      </a:r>
+                    </a:p>
+                  </a:txBody>
+                  <a:tcPr/>
+                </a:tc>
+                <a:tc>
+                  <a:txBody>
+                    <a:bodyPr/>
+                    <a:lstStyle/>
+                    <a:p>
+                      <a:r>
+                        <a:rPr lang="en-GB" sz="1400" dirty="0"/>
+                        <a:t>D</a:t>
+                      </a:r>
+                      <a:r>
+                        <a:rPr lang="en-CH" sz="1400" dirty="0"/>
+                        <a:t>irect download</a:t>
+                      </a:r>
+                    </a:p>
+                  </a:txBody>
+                  <a:tcPr/>
+                </a:tc>
+                <a:tc>
+                  <a:txBody>
+                    <a:bodyPr/>
+                    <a:lstStyle/>
+                    <a:p>
+                      <a:pPr marL="0" marR="0" lvl="0" indent="0" algn="l" defTabSz="914400" rtl="0" eaLnBrk="1" fontAlgn="auto" latinLnBrk="0" hangingPunct="1">
+                        <a:lnSpc>
+                          <a:spcPct val="100000"/>
+                        </a:lnSpc>
+                        <a:spcBef>
+                          <a:spcPts val="0"/>
+                        </a:spcBef>
+                        <a:spcAft>
+                          <a:spcPts val="0"/>
+                        </a:spcAft>
+                        <a:buClrTx/>
+                        <a:buSzTx/>
+                        <a:buFontTx/>
+                        <a:buNone/>
+                        <a:tabLst/>
+                        <a:defRPr/>
+                      </a:pPr>
+                      <a:r>
+                        <a:rPr kumimoji="0" lang="en-CH" sz="1400" b="0" i="0" u="none" strike="noStrike" kern="1200" cap="none" spc="0" normalizeH="0" baseline="0" noProof="0" dirty="0">
+                          <a:ln>
+                            <a:noFill/>
+                          </a:ln>
+                          <a:solidFill>
+                            <a:prstClr val="black"/>
+                          </a:solidFill>
+                          <a:effectLst/>
+                          <a:uLnTx/>
+                          <a:uFillTx/>
+                          <a:latin typeface="Calibri" panose="020F0502020204030204"/>
+                          <a:ea typeface="+mn-ea"/>
+                          <a:cs typeface="+mn-cs"/>
+                        </a:rPr>
+                        <a:t>Ruben/Valeria</a:t>
                       </a:r>
                     </a:p>
                   </a:txBody>

</xml_diff>

<commit_message>
make color code to the pptx file to recon databases completed
</commit_message>
<xml_diff>
--- a/Projects/M3/Project.pptx
+++ b/Projects/M3/Project.pptx
@@ -275,7 +275,7 @@
           <a:p>
             <a:fld id="{076CEB0B-9A46-6E4F-A893-3E4C3C2FD4BF}" type="datetimeFigureOut">
               <a:rPr lang="en-CH" smtClean="0"/>
-              <a:t>21.02.21</a:t>
+              <a:t>22.02.21</a:t>
             </a:fld>
             <a:endParaRPr lang="en-CH"/>
           </a:p>
@@ -475,7 +475,7 @@
           <a:p>
             <a:fld id="{076CEB0B-9A46-6E4F-A893-3E4C3C2FD4BF}" type="datetimeFigureOut">
               <a:rPr lang="en-CH" smtClean="0"/>
-              <a:t>21.02.21</a:t>
+              <a:t>22.02.21</a:t>
             </a:fld>
             <a:endParaRPr lang="en-CH"/>
           </a:p>
@@ -685,7 +685,7 @@
           <a:p>
             <a:fld id="{076CEB0B-9A46-6E4F-A893-3E4C3C2FD4BF}" type="datetimeFigureOut">
               <a:rPr lang="en-CH" smtClean="0"/>
-              <a:t>21.02.21</a:t>
+              <a:t>22.02.21</a:t>
             </a:fld>
             <a:endParaRPr lang="en-CH"/>
           </a:p>
@@ -885,7 +885,7 @@
           <a:p>
             <a:fld id="{076CEB0B-9A46-6E4F-A893-3E4C3C2FD4BF}" type="datetimeFigureOut">
               <a:rPr lang="en-CH" smtClean="0"/>
-              <a:t>21.02.21</a:t>
+              <a:t>22.02.21</a:t>
             </a:fld>
             <a:endParaRPr lang="en-CH"/>
           </a:p>
@@ -1161,7 +1161,7 @@
           <a:p>
             <a:fld id="{076CEB0B-9A46-6E4F-A893-3E4C3C2FD4BF}" type="datetimeFigureOut">
               <a:rPr lang="en-CH" smtClean="0"/>
-              <a:t>21.02.21</a:t>
+              <a:t>22.02.21</a:t>
             </a:fld>
             <a:endParaRPr lang="en-CH"/>
           </a:p>
@@ -1429,7 +1429,7 @@
           <a:p>
             <a:fld id="{076CEB0B-9A46-6E4F-A893-3E4C3C2FD4BF}" type="datetimeFigureOut">
               <a:rPr lang="en-CH" smtClean="0"/>
-              <a:t>21.02.21</a:t>
+              <a:t>22.02.21</a:t>
             </a:fld>
             <a:endParaRPr lang="en-CH"/>
           </a:p>
@@ -1844,7 +1844,7 @@
           <a:p>
             <a:fld id="{076CEB0B-9A46-6E4F-A893-3E4C3C2FD4BF}" type="datetimeFigureOut">
               <a:rPr lang="en-CH" smtClean="0"/>
-              <a:t>21.02.21</a:t>
+              <a:t>22.02.21</a:t>
             </a:fld>
             <a:endParaRPr lang="en-CH"/>
           </a:p>
@@ -1986,7 +1986,7 @@
           <a:p>
             <a:fld id="{076CEB0B-9A46-6E4F-A893-3E4C3C2FD4BF}" type="datetimeFigureOut">
               <a:rPr lang="en-CH" smtClean="0"/>
-              <a:t>21.02.21</a:t>
+              <a:t>22.02.21</a:t>
             </a:fld>
             <a:endParaRPr lang="en-CH"/>
           </a:p>
@@ -2099,7 +2099,7 @@
           <a:p>
             <a:fld id="{076CEB0B-9A46-6E4F-A893-3E4C3C2FD4BF}" type="datetimeFigureOut">
               <a:rPr lang="en-CH" smtClean="0"/>
-              <a:t>21.02.21</a:t>
+              <a:t>22.02.21</a:t>
             </a:fld>
             <a:endParaRPr lang="en-CH"/>
           </a:p>
@@ -2412,7 +2412,7 @@
           <a:p>
             <a:fld id="{076CEB0B-9A46-6E4F-A893-3E4C3C2FD4BF}" type="datetimeFigureOut">
               <a:rPr lang="en-CH" smtClean="0"/>
-              <a:t>21.02.21</a:t>
+              <a:t>22.02.21</a:t>
             </a:fld>
             <a:endParaRPr lang="en-CH"/>
           </a:p>
@@ -2701,7 +2701,7 @@
           <a:p>
             <a:fld id="{076CEB0B-9A46-6E4F-A893-3E4C3C2FD4BF}" type="datetimeFigureOut">
               <a:rPr lang="en-CH" smtClean="0"/>
-              <a:t>21.02.21</a:t>
+              <a:t>22.02.21</a:t>
             </a:fld>
             <a:endParaRPr lang="en-CH"/>
           </a:p>
@@ -2944,7 +2944,7 @@
           <a:p>
             <a:fld id="{076CEB0B-9A46-6E4F-A893-3E4C3C2FD4BF}" type="datetimeFigureOut">
               <a:rPr lang="en-CH" smtClean="0"/>
-              <a:t>21.02.21</a:t>
+              <a:t>22.02.21</a:t>
             </a:fld>
             <a:endParaRPr lang="en-CH"/>
           </a:p>
@@ -4710,7 +4710,7 @@
           <p:nvPr>
             <p:extLst>
               <p:ext uri="{D42A27DB-BD31-4B8C-83A1-F6EECF244321}">
-                <p14:modId xmlns:p14="http://schemas.microsoft.com/office/powerpoint/2010/main" val="2061729650"/>
+                <p14:modId xmlns:p14="http://schemas.microsoft.com/office/powerpoint/2010/main" val="2179076646"/>
               </p:ext>
             </p:extLst>
           </p:nvPr>
@@ -4905,7 +4905,11 @@
                     <a:lstStyle/>
                     <a:p>
                       <a:r>
-                        <a:rPr lang="en-CH" sz="1400" dirty="0"/>
+                        <a:rPr lang="en-CH" sz="1400" dirty="0">
+                          <a:highlight>
+                            <a:srgbClr val="00FF00"/>
+                          </a:highlight>
+                        </a:rPr>
                         <a:t>Human development Index (HDI)</a:t>
                       </a:r>
                     </a:p>
@@ -5927,7 +5931,7 @@
           <p:nvPr>
             <p:extLst>
               <p:ext uri="{D42A27DB-BD31-4B8C-83A1-F6EECF244321}">
-                <p14:modId xmlns:p14="http://schemas.microsoft.com/office/powerpoint/2010/main" val="4275760309"/>
+                <p14:modId xmlns:p14="http://schemas.microsoft.com/office/powerpoint/2010/main" val="4026441900"/>
               </p:ext>
             </p:extLst>
           </p:nvPr>
@@ -6376,7 +6380,11 @@
                     <a:lstStyle/>
                     <a:p>
                       <a:r>
-                        <a:rPr lang="en-CH" sz="1400" dirty="0"/>
+                        <a:rPr lang="en-CH" sz="1400" dirty="0">
+                          <a:highlight>
+                            <a:srgbClr val="00FF00"/>
+                          </a:highlight>
+                        </a:rPr>
                         <a:t>Population</a:t>
                       </a:r>
                     </a:p>
@@ -6388,78 +6396,73 @@
                     <a:bodyPr/>
                     <a:lstStyle/>
                     <a:p>
-                      <a:pPr marL="0" marR="0" lvl="0" indent="0" algn="l" defTabSz="914400" rtl="0" eaLnBrk="1" fontAlgn="auto" latinLnBrk="0" hangingPunct="1">
-                        <a:lnSpc>
-                          <a:spcPct val="100000"/>
-                        </a:lnSpc>
-                        <a:spcBef>
-                          <a:spcPts val="0"/>
-                        </a:spcBef>
-                        <a:spcAft>
-                          <a:spcPts val="0"/>
-                        </a:spcAft>
-                        <a:buClrTx/>
-                        <a:buSzTx/>
-                        <a:buFontTx/>
-                        <a:buNone/>
-                        <a:tabLst/>
-                        <a:defRPr/>
-                      </a:pPr>
-                      <a:r>
-                        <a:rPr lang="en-CH" sz="1400" dirty="0"/>
-                        <a:t>World Bank</a:t>
-                      </a:r>
-                    </a:p>
-                  </a:txBody>
-                  <a:tcPr/>
-                </a:tc>
-                <a:tc>
-                  <a:txBody>
-                    <a:bodyPr/>
-                    <a:lstStyle/>
-                    <a:p>
-                      <a:r>
-                        <a:rPr lang="en-CH" sz="1400" dirty="0"/>
-                        <a:t>Demografic</a:t>
-                      </a:r>
-                    </a:p>
-                  </a:txBody>
-                  <a:tcPr/>
-                </a:tc>
-                <a:tc>
-                  <a:txBody>
-                    <a:bodyPr/>
-                    <a:lstStyle/>
-                    <a:p>
-                      <a:r>
-                        <a:rPr lang="en-CH" sz="1400" dirty="0"/>
-                        <a:t>all?</a:t>
-                      </a:r>
-                    </a:p>
-                  </a:txBody>
-                  <a:tcPr/>
-                </a:tc>
-                <a:tc>
-                  <a:txBody>
-                    <a:bodyPr/>
-                    <a:lstStyle/>
-                    <a:p>
-                      <a:r>
-                        <a:rPr lang="en-CH" sz="1400" dirty="0"/>
-                        <a:t>All?</a:t>
-                      </a:r>
-                    </a:p>
-                  </a:txBody>
-                  <a:tcPr/>
-                </a:tc>
-                <a:tc>
-                  <a:txBody>
-                    <a:bodyPr/>
-                    <a:lstStyle/>
-                    <a:p>
-                      <a:r>
-                        <a:rPr lang="en-CH" sz="1400" dirty="0"/>
-                        <a:t>API – World Bnak</a:t>
+                      <a:r>
+                        <a:rPr lang="en-CH" sz="1400" dirty="0"/>
+                        <a:t>Human development data center (UNDP)</a:t>
+                      </a:r>
+                    </a:p>
+                  </a:txBody>
+                  <a:tcPr/>
+                </a:tc>
+                <a:tc>
+                  <a:txBody>
+                    <a:bodyPr/>
+                    <a:lstStyle/>
+                    <a:p>
+                      <a:r>
+                        <a:rPr lang="en-CH" sz="1400" dirty="0"/>
+                        <a:t>Socio economic, complex</a:t>
+                      </a:r>
+                    </a:p>
+                  </a:txBody>
+                  <a:tcPr/>
+                </a:tc>
+                <a:tc>
+                  <a:txBody>
+                    <a:bodyPr/>
+                    <a:lstStyle/>
+                    <a:p>
+                      <a:r>
+                        <a:rPr lang="en-CH" sz="1400" dirty="0"/>
+                        <a:t>2019-2010,</a:t>
+                      </a:r>
+                    </a:p>
+                    <a:p>
+                      <a:r>
+                        <a:rPr lang="en-CH" sz="1400" dirty="0"/>
+                        <a:t>2005, 2000,</a:t>
+                      </a:r>
+                    </a:p>
+                    <a:p>
+                      <a:r>
+                        <a:rPr lang="en-CH" sz="1400" dirty="0"/>
+                        <a:t>1995,1990</a:t>
+                      </a:r>
+                    </a:p>
+                  </a:txBody>
+                  <a:tcPr/>
+                </a:tc>
+                <a:tc>
+                  <a:txBody>
+                    <a:bodyPr/>
+                    <a:lstStyle/>
+                    <a:p>
+                      <a:r>
+                        <a:rPr lang="en-CH" sz="1400" dirty="0"/>
+                        <a:t>ALL?</a:t>
+                      </a:r>
+                    </a:p>
+                  </a:txBody>
+                  <a:tcPr/>
+                </a:tc>
+                <a:tc>
+                  <a:txBody>
+                    <a:bodyPr/>
+                    <a:lstStyle/>
+                    <a:p>
+                      <a:r>
+                        <a:rPr lang="en-CH" sz="1400" dirty="0"/>
+                        <a:t>API - UNDP</a:t>
                       </a:r>
                     </a:p>
                   </a:txBody>
@@ -6483,54 +6486,27 @@
                     <a:bodyPr/>
                     <a:lstStyle/>
                     <a:p>
-                      <a:pPr marL="0" marR="0" lvl="0" indent="0" algn="l" defTabSz="914400" rtl="0" eaLnBrk="1" fontAlgn="auto" latinLnBrk="0" hangingPunct="1">
-                        <a:lnSpc>
-                          <a:spcPct val="100000"/>
-                        </a:lnSpc>
-                        <a:spcBef>
-                          <a:spcPts val="0"/>
-                        </a:spcBef>
-                        <a:spcAft>
-                          <a:spcPts val="0"/>
-                        </a:spcAft>
-                        <a:buClrTx/>
-                        <a:buSzTx/>
-                        <a:buFontTx/>
-                        <a:buNone/>
-                        <a:tabLst/>
-                        <a:defRPr/>
-                      </a:pPr>
-                      <a:r>
-                        <a:rPr kumimoji="0" lang="en-GB" sz="1400" b="0" i="0" u="none" strike="noStrike" kern="1200" cap="none" spc="0" normalizeH="0" baseline="0" noProof="0">
-                          <a:ln>
-                            <a:noFill/>
-                          </a:ln>
-                          <a:solidFill>
-                            <a:prstClr val="black"/>
-                          </a:solidFill>
-                          <a:effectLst/>
-                          <a:uLnTx/>
-                          <a:uFillTx/>
-                          <a:latin typeface="Calibri" panose="020F0502020204030204"/>
-                          <a:ea typeface="+mn-ea"/>
-                          <a:cs typeface="+mn-cs"/>
-                        </a:rPr>
-                        <a:t>https://datahelpdesk.worldbank.org/knowledgebase/topics/125589-developer-information</a:t>
-                      </a:r>
-                      <a:endParaRPr kumimoji="0" lang="en-CH" sz="1400" b="0" i="0" u="none" strike="noStrike" kern="1200" cap="none" spc="0" normalizeH="0" baseline="0" noProof="0" dirty="0">
-                        <a:ln>
-                          <a:noFill/>
-                        </a:ln>
-                        <a:solidFill>
-                          <a:prstClr val="black"/>
-                        </a:solidFill>
-                        <a:effectLst/>
-                        <a:uLnTx/>
-                        <a:uFillTx/>
-                        <a:latin typeface="Calibri" panose="020F0502020204030204"/>
-                        <a:ea typeface="+mn-ea"/>
-                        <a:cs typeface="+mn-cs"/>
-                      </a:endParaRPr>
+                      <a:r>
+                        <a:rPr lang="en-GB" sz="1400" dirty="0"/>
+                        <a:t>http://</a:t>
+                      </a:r>
+                      <a:r>
+                        <a:rPr lang="en-GB" sz="1400" dirty="0" err="1"/>
+                        <a:t>hdr.undp.org</a:t>
+                      </a:r>
+                      <a:r>
+                        <a:rPr lang="en-GB" sz="1400" dirty="0"/>
+                        <a:t>/</a:t>
+                      </a:r>
+                      <a:r>
+                        <a:rPr lang="en-GB" sz="1400" dirty="0" err="1"/>
+                        <a:t>en</a:t>
+                      </a:r>
+                      <a:r>
+                        <a:rPr lang="en-GB" sz="1400" dirty="0"/>
+                        <a:t>/data</a:t>
+                      </a:r>
+                      <a:endParaRPr lang="en-CH" sz="1400" dirty="0"/>
                     </a:p>
                   </a:txBody>
                   <a:tcPr/>
@@ -6548,164 +6524,133 @@
                     <a:lstStyle/>
                     <a:p>
                       <a:r>
-                        <a:rPr lang="en-CH" sz="1400" dirty="0"/>
-                        <a:t>Life expectancy</a:t>
-                      </a:r>
-                    </a:p>
-                  </a:txBody>
-                  <a:tcPr/>
-                </a:tc>
-                <a:tc>
-                  <a:txBody>
-                    <a:bodyPr/>
-                    <a:lstStyle/>
-                    <a:p>
-                      <a:pPr marL="0" marR="0" lvl="0" indent="0" algn="l" defTabSz="914400" rtl="0" eaLnBrk="1" fontAlgn="auto" latinLnBrk="0" hangingPunct="1">
-                        <a:lnSpc>
-                          <a:spcPct val="100000"/>
-                        </a:lnSpc>
-                        <a:spcBef>
-                          <a:spcPts val="0"/>
-                        </a:spcBef>
-                        <a:spcAft>
-                          <a:spcPts val="0"/>
-                        </a:spcAft>
-                        <a:buClrTx/>
-                        <a:buSzTx/>
-                        <a:buFontTx/>
-                        <a:buNone/>
-                        <a:tabLst/>
-                        <a:defRPr/>
-                      </a:pPr>
-                      <a:r>
-                        <a:rPr lang="en-CH" sz="1400" dirty="0"/>
-                        <a:t>World Bank</a:t>
-                      </a:r>
-                    </a:p>
-                    <a:p>
+                        <a:rPr lang="en-CH" sz="1400" dirty="0">
+                          <a:highlight>
+                            <a:srgbClr val="00FF00"/>
+                          </a:highlight>
+                        </a:rPr>
+                        <a:t>Life expectancy index</a:t>
+                      </a:r>
+                    </a:p>
+                  </a:txBody>
+                  <a:tcPr/>
+                </a:tc>
+                <a:tc>
+                  <a:txBody>
+                    <a:bodyPr/>
+                    <a:lstStyle/>
+                    <a:p>
+                      <a:r>
+                        <a:rPr lang="en-CH" sz="1400" dirty="0"/>
+                        <a:t>Human development data center (UNDP)</a:t>
+                      </a:r>
+                    </a:p>
+                  </a:txBody>
+                  <a:tcPr/>
+                </a:tc>
+                <a:tc>
+                  <a:txBody>
+                    <a:bodyPr/>
+                    <a:lstStyle/>
+                    <a:p>
+                      <a:r>
+                        <a:rPr lang="en-CH" sz="1400" dirty="0"/>
+                        <a:t>Socio economic, complex</a:t>
+                      </a:r>
+                    </a:p>
+                  </a:txBody>
+                  <a:tcPr/>
+                </a:tc>
+                <a:tc>
+                  <a:txBody>
+                    <a:bodyPr/>
+                    <a:lstStyle/>
+                    <a:p>
+                      <a:r>
+                        <a:rPr lang="en-CH" sz="1400" dirty="0"/>
+                        <a:t>2019-2010,</a:t>
+                      </a:r>
+                    </a:p>
+                    <a:p>
+                      <a:r>
+                        <a:rPr lang="en-CH" sz="1400" dirty="0"/>
+                        <a:t>2005, 2000,</a:t>
+                      </a:r>
+                    </a:p>
+                    <a:p>
+                      <a:r>
+                        <a:rPr lang="en-CH" sz="1400" dirty="0"/>
+                        <a:t>1995,1990</a:t>
+                      </a:r>
+                    </a:p>
+                  </a:txBody>
+                  <a:tcPr/>
+                </a:tc>
+                <a:tc>
+                  <a:txBody>
+                    <a:bodyPr/>
+                    <a:lstStyle/>
+                    <a:p>
+                      <a:r>
+                        <a:rPr lang="en-CH" sz="1400" dirty="0"/>
+                        <a:t>ALL?</a:t>
+                      </a:r>
+                    </a:p>
+                  </a:txBody>
+                  <a:tcPr/>
+                </a:tc>
+                <a:tc>
+                  <a:txBody>
+                    <a:bodyPr/>
+                    <a:lstStyle/>
+                    <a:p>
+                      <a:r>
+                        <a:rPr lang="en-CH" sz="1400" dirty="0"/>
+                        <a:t>API - UNDP</a:t>
+                      </a:r>
+                    </a:p>
+                  </a:txBody>
+                  <a:tcPr/>
+                </a:tc>
+                <a:tc>
+                  <a:txBody>
+                    <a:bodyPr/>
+                    <a:lstStyle/>
+                    <a:p>
+                      <a:r>
+                        <a:rPr lang="en-CH" sz="1400" dirty="0"/>
+                        <a:t>Ruben</a:t>
+                      </a:r>
+                    </a:p>
+                  </a:txBody>
+                  <a:tcPr/>
+                </a:tc>
+                <a:tc>
+                  <a:txBody>
+                    <a:bodyPr/>
+                    <a:lstStyle/>
+                    <a:p>
+                      <a:r>
+                        <a:rPr lang="en-GB" sz="1400" dirty="0"/>
+                        <a:t>http://</a:t>
+                      </a:r>
+                      <a:r>
+                        <a:rPr lang="en-GB" sz="1400" dirty="0" err="1"/>
+                        <a:t>hdr.undp.org</a:t>
+                      </a:r>
+                      <a:r>
+                        <a:rPr lang="en-GB" sz="1400" dirty="0"/>
+                        <a:t>/</a:t>
+                      </a:r>
+                      <a:r>
+                        <a:rPr lang="en-GB" sz="1400" dirty="0" err="1"/>
+                        <a:t>en</a:t>
+                      </a:r>
+                      <a:r>
+                        <a:rPr lang="en-GB" sz="1400" dirty="0"/>
+                        <a:t>/data</a:t>
+                      </a:r>
                       <a:endParaRPr lang="en-CH" sz="1400" dirty="0"/>
-                    </a:p>
-                  </a:txBody>
-                  <a:tcPr/>
-                </a:tc>
-                <a:tc>
-                  <a:txBody>
-                    <a:bodyPr/>
-                    <a:lstStyle/>
-                    <a:p>
-                      <a:r>
-                        <a:rPr lang="en-CH" sz="1400" dirty="0"/>
-                        <a:t>Demografic</a:t>
-                      </a:r>
-                    </a:p>
-                  </a:txBody>
-                  <a:tcPr/>
-                </a:tc>
-                <a:tc>
-                  <a:txBody>
-                    <a:bodyPr/>
-                    <a:lstStyle/>
-                    <a:p>
-                      <a:r>
-                        <a:rPr lang="en-CH" sz="1400" dirty="0"/>
-                        <a:t>all?</a:t>
-                      </a:r>
-                    </a:p>
-                  </a:txBody>
-                  <a:tcPr/>
-                </a:tc>
-                <a:tc>
-                  <a:txBody>
-                    <a:bodyPr/>
-                    <a:lstStyle/>
-                    <a:p>
-                      <a:r>
-                        <a:rPr lang="en-CH" sz="1400" dirty="0"/>
-                        <a:t>All?</a:t>
-                      </a:r>
-                    </a:p>
-                  </a:txBody>
-                  <a:tcPr/>
-                </a:tc>
-                <a:tc>
-                  <a:txBody>
-                    <a:bodyPr/>
-                    <a:lstStyle/>
-                    <a:p>
-                      <a:r>
-                        <a:rPr lang="en-CH" sz="1400" dirty="0"/>
-                        <a:t>API – World Bnak</a:t>
-                      </a:r>
-                    </a:p>
-                  </a:txBody>
-                  <a:tcPr/>
-                </a:tc>
-                <a:tc>
-                  <a:txBody>
-                    <a:bodyPr/>
-                    <a:lstStyle/>
-                    <a:p>
-                      <a:r>
-                        <a:rPr lang="en-CH" sz="1400" dirty="0"/>
-                        <a:t>Ruben</a:t>
-                      </a:r>
-                    </a:p>
-                  </a:txBody>
-                  <a:tcPr/>
-                </a:tc>
-                <a:tc>
-                  <a:txBody>
-                    <a:bodyPr/>
-                    <a:lstStyle/>
-                    <a:p>
-                      <a:pPr marL="0" marR="0" lvl="0" indent="0" algn="l" defTabSz="914400" rtl="0" eaLnBrk="1" fontAlgn="auto" latinLnBrk="0" hangingPunct="1">
-                        <a:lnSpc>
-                          <a:spcPct val="100000"/>
-                        </a:lnSpc>
-                        <a:spcBef>
-                          <a:spcPts val="0"/>
-                        </a:spcBef>
-                        <a:spcAft>
-                          <a:spcPts val="0"/>
-                        </a:spcAft>
-                        <a:buClrTx/>
-                        <a:buSzTx/>
-                        <a:buFontTx/>
-                        <a:buNone/>
-                        <a:tabLst/>
-                        <a:defRPr/>
-                      </a:pPr>
-                      <a:r>
-                        <a:rPr kumimoji="0" lang="en-GB" sz="1400" b="0" i="0" u="none" strike="noStrike" kern="1200" cap="none" spc="0" normalizeH="0" baseline="0" noProof="0">
-                          <a:ln>
-                            <a:noFill/>
-                          </a:ln>
-                          <a:solidFill>
-                            <a:prstClr val="black"/>
-                          </a:solidFill>
-                          <a:effectLst/>
-                          <a:uLnTx/>
-                          <a:uFillTx/>
-                          <a:latin typeface="Calibri" panose="020F0502020204030204"/>
-                          <a:ea typeface="+mn-ea"/>
-                          <a:cs typeface="+mn-cs"/>
-                        </a:rPr>
-                        <a:t>https://datahelpdesk.worldbank.org/knowledgebase/topics/125589-developer-information</a:t>
-                      </a:r>
-                      <a:endParaRPr kumimoji="0" lang="en-CH" sz="1400" b="0" i="0" u="none" strike="noStrike" kern="1200" cap="none" spc="0" normalizeH="0" baseline="0" noProof="0" dirty="0">
-                        <a:ln>
-                          <a:noFill/>
-                        </a:ln>
-                        <a:solidFill>
-                          <a:prstClr val="black"/>
-                        </a:solidFill>
-                        <a:effectLst/>
-                        <a:uLnTx/>
-                        <a:uFillTx/>
-                        <a:latin typeface="Calibri" panose="020F0502020204030204"/>
-                        <a:ea typeface="+mn-ea"/>
-                        <a:cs typeface="+mn-cs"/>
-                      </a:endParaRPr>
                     </a:p>
                   </a:txBody>
                   <a:tcPr/>
@@ -6723,7 +6668,11 @@
                     <a:lstStyle/>
                     <a:p>
                       <a:r>
-                        <a:rPr lang="en-CH" sz="1400" dirty="0"/>
+                        <a:rPr lang="en-CH" sz="1400" dirty="0">
+                          <a:highlight>
+                            <a:srgbClr val="00FF00"/>
+                          </a:highlight>
+                        </a:rPr>
                         <a:t>Current health expenditure (%GDP)</a:t>
                       </a:r>
                     </a:p>
@@ -6735,186 +6684,117 @@
                     <a:bodyPr/>
                     <a:lstStyle/>
                     <a:p>
-                      <a:pPr marL="0" marR="0" lvl="0" indent="0" algn="l" defTabSz="914400" rtl="0" eaLnBrk="1" fontAlgn="auto" latinLnBrk="0" hangingPunct="1">
-                        <a:lnSpc>
-                          <a:spcPct val="100000"/>
-                        </a:lnSpc>
-                        <a:spcBef>
-                          <a:spcPts val="0"/>
-                        </a:spcBef>
-                        <a:spcAft>
-                          <a:spcPts val="0"/>
-                        </a:spcAft>
-                        <a:buClrTx/>
-                        <a:buSzTx/>
-                        <a:buFontTx/>
-                        <a:buNone/>
-                        <a:tabLst/>
-                        <a:defRPr/>
-                      </a:pPr>
-                      <a:r>
-                        <a:rPr lang="en-CH" sz="1400" dirty="0"/>
-                        <a:t>World Bank</a:t>
-                      </a:r>
-                    </a:p>
-                    <a:p>
+                      <a:r>
+                        <a:rPr lang="en-CH" sz="1400" dirty="0"/>
+                        <a:t>Human development data center (UNDP)</a:t>
+                      </a:r>
+                    </a:p>
+                  </a:txBody>
+                  <a:tcPr/>
+                </a:tc>
+                <a:tc>
+                  <a:txBody>
+                    <a:bodyPr/>
+                    <a:lstStyle/>
+                    <a:p>
+                      <a:r>
+                        <a:rPr lang="en-CH" sz="1400" dirty="0"/>
+                        <a:t>Socio economic, complex</a:t>
+                      </a:r>
+                    </a:p>
+                  </a:txBody>
+                  <a:tcPr/>
+                </a:tc>
+                <a:tc>
+                  <a:txBody>
+                    <a:bodyPr/>
+                    <a:lstStyle/>
+                    <a:p>
+                      <a:r>
+                        <a:rPr lang="en-CH" sz="1400" dirty="0"/>
+                        <a:t>2019-2010,</a:t>
+                      </a:r>
+                    </a:p>
+                    <a:p>
+                      <a:r>
+                        <a:rPr lang="en-CH" sz="1400" dirty="0"/>
+                        <a:t>2005, 2000,</a:t>
+                      </a:r>
+                    </a:p>
+                    <a:p>
+                      <a:r>
+                        <a:rPr lang="en-CH" sz="1400" dirty="0"/>
+                        <a:t>1995,1990</a:t>
+                      </a:r>
+                    </a:p>
+                  </a:txBody>
+                  <a:tcPr/>
+                </a:tc>
+                <a:tc>
+                  <a:txBody>
+                    <a:bodyPr/>
+                    <a:lstStyle/>
+                    <a:p>
+                      <a:r>
+                        <a:rPr lang="en-CH" sz="1400" dirty="0"/>
+                        <a:t>ALL?</a:t>
+                      </a:r>
+                    </a:p>
+                  </a:txBody>
+                  <a:tcPr/>
+                </a:tc>
+                <a:tc>
+                  <a:txBody>
+                    <a:bodyPr/>
+                    <a:lstStyle/>
+                    <a:p>
+                      <a:r>
+                        <a:rPr lang="en-CH" sz="1400" dirty="0"/>
+                        <a:t>API - UNDP</a:t>
+                      </a:r>
+                    </a:p>
+                  </a:txBody>
+                  <a:tcPr/>
+                </a:tc>
+                <a:tc>
+                  <a:txBody>
+                    <a:bodyPr/>
+                    <a:lstStyle/>
+                    <a:p>
+                      <a:r>
+                        <a:rPr lang="en-CH" sz="1400" dirty="0"/>
+                        <a:t>Ruben</a:t>
+                      </a:r>
+                    </a:p>
+                  </a:txBody>
+                  <a:tcPr/>
+                </a:tc>
+                <a:tc>
+                  <a:txBody>
+                    <a:bodyPr/>
+                    <a:lstStyle/>
+                    <a:p>
+                      <a:r>
+                        <a:rPr lang="en-GB" sz="1400" dirty="0"/>
+                        <a:t>http://</a:t>
+                      </a:r>
+                      <a:r>
+                        <a:rPr lang="en-GB" sz="1400" dirty="0" err="1"/>
+                        <a:t>hdr.undp.org</a:t>
+                      </a:r>
+                      <a:r>
+                        <a:rPr lang="en-GB" sz="1400" dirty="0"/>
+                        <a:t>/</a:t>
+                      </a:r>
+                      <a:r>
+                        <a:rPr lang="en-GB" sz="1400" dirty="0" err="1"/>
+                        <a:t>en</a:t>
+                      </a:r>
+                      <a:r>
+                        <a:rPr lang="en-GB" sz="1400" dirty="0"/>
+                        <a:t>/data</a:t>
+                      </a:r>
                       <a:endParaRPr lang="en-CH" sz="1400" dirty="0"/>
-                    </a:p>
-                  </a:txBody>
-                  <a:tcPr/>
-                </a:tc>
-                <a:tc>
-                  <a:txBody>
-                    <a:bodyPr/>
-                    <a:lstStyle/>
-                    <a:p>
-                      <a:r>
-                        <a:rPr lang="en-CH" sz="1400" dirty="0"/>
-                        <a:t>Health</a:t>
-                      </a:r>
-                    </a:p>
-                  </a:txBody>
-                  <a:tcPr/>
-                </a:tc>
-                <a:tc>
-                  <a:txBody>
-                    <a:bodyPr/>
-                    <a:lstStyle/>
-                    <a:p>
-                      <a:r>
-                        <a:rPr lang="en-CH" sz="1400" dirty="0"/>
-                        <a:t>all?</a:t>
-                      </a:r>
-                    </a:p>
-                  </a:txBody>
-                  <a:tcPr/>
-                </a:tc>
-                <a:tc>
-                  <a:txBody>
-                    <a:bodyPr/>
-                    <a:lstStyle/>
-                    <a:p>
-                      <a:r>
-                        <a:rPr lang="en-CH" sz="1400" dirty="0"/>
-                        <a:t>All?</a:t>
-                      </a:r>
-                    </a:p>
-                  </a:txBody>
-                  <a:tcPr/>
-                </a:tc>
-                <a:tc>
-                  <a:txBody>
-                    <a:bodyPr/>
-                    <a:lstStyle/>
-                    <a:p>
-                      <a:r>
-                        <a:rPr lang="en-CH" sz="1400" dirty="0"/>
-                        <a:t>API – World Bnak</a:t>
-                      </a:r>
-                    </a:p>
-                  </a:txBody>
-                  <a:tcPr/>
-                </a:tc>
-                <a:tc>
-                  <a:txBody>
-                    <a:bodyPr/>
-                    <a:lstStyle/>
-                    <a:p>
-                      <a:r>
-                        <a:rPr lang="en-CH" sz="1400" dirty="0"/>
-                        <a:t>Ruben</a:t>
-                      </a:r>
-                    </a:p>
-                  </a:txBody>
-                  <a:tcPr/>
-                </a:tc>
-                <a:tc>
-                  <a:txBody>
-                    <a:bodyPr/>
-                    <a:lstStyle/>
-                    <a:p>
-                      <a:pPr marL="0" marR="0" lvl="0" indent="0" algn="l" defTabSz="914400" rtl="0" eaLnBrk="1" fontAlgn="auto" latinLnBrk="0" hangingPunct="1">
-                        <a:lnSpc>
-                          <a:spcPct val="100000"/>
-                        </a:lnSpc>
-                        <a:spcBef>
-                          <a:spcPts val="0"/>
-                        </a:spcBef>
-                        <a:spcAft>
-                          <a:spcPts val="0"/>
-                        </a:spcAft>
-                        <a:buClrTx/>
-                        <a:buSzTx/>
-                        <a:buFontTx/>
-                        <a:buNone/>
-                        <a:tabLst/>
-                        <a:defRPr/>
-                      </a:pPr>
-                      <a:r>
-                        <a:rPr kumimoji="0" lang="en-GB" sz="1400" b="0" i="0" u="none" strike="noStrike" kern="1200" cap="none" spc="0" normalizeH="0" baseline="0" noProof="0" dirty="0">
-                          <a:ln>
-                            <a:noFill/>
-                          </a:ln>
-                          <a:solidFill>
-                            <a:prstClr val="black"/>
-                          </a:solidFill>
-                          <a:effectLst/>
-                          <a:uLnTx/>
-                          <a:uFillTx/>
-                          <a:latin typeface="Calibri" panose="020F0502020204030204"/>
-                          <a:ea typeface="+mn-ea"/>
-                          <a:cs typeface="+mn-cs"/>
-                        </a:rPr>
-                        <a:t>https://</a:t>
-                      </a:r>
-                      <a:r>
-                        <a:rPr kumimoji="0" lang="en-GB" sz="1400" b="0" i="0" u="none" strike="noStrike" kern="1200" cap="none" spc="0" normalizeH="0" baseline="0" noProof="0" dirty="0" err="1">
-                          <a:ln>
-                            <a:noFill/>
-                          </a:ln>
-                          <a:solidFill>
-                            <a:prstClr val="black"/>
-                          </a:solidFill>
-                          <a:effectLst/>
-                          <a:uLnTx/>
-                          <a:uFillTx/>
-                          <a:latin typeface="Calibri" panose="020F0502020204030204"/>
-                          <a:ea typeface="+mn-ea"/>
-                          <a:cs typeface="+mn-cs"/>
-                        </a:rPr>
-                        <a:t>datahelpdesk.worldbank.org</a:t>
-                      </a:r>
-                      <a:r>
-                        <a:rPr kumimoji="0" lang="en-GB" sz="1400" b="0" i="0" u="none" strike="noStrike" kern="1200" cap="none" spc="0" normalizeH="0" baseline="0" noProof="0" dirty="0">
-                          <a:ln>
-                            <a:noFill/>
-                          </a:ln>
-                          <a:solidFill>
-                            <a:prstClr val="black"/>
-                          </a:solidFill>
-                          <a:effectLst/>
-                          <a:uLnTx/>
-                          <a:uFillTx/>
-                          <a:latin typeface="Calibri" panose="020F0502020204030204"/>
-                          <a:ea typeface="+mn-ea"/>
-                          <a:cs typeface="+mn-cs"/>
-                        </a:rPr>
-                        <a:t>/knowledgebase/topics/125589-developer-information</a:t>
-                      </a:r>
-                      <a:endParaRPr kumimoji="0" lang="en-CH" sz="1400" b="0" i="0" u="none" strike="noStrike" kern="1200" cap="none" spc="0" normalizeH="0" baseline="0" noProof="0" dirty="0">
-                        <a:ln>
-                          <a:noFill/>
-                        </a:ln>
-                        <a:solidFill>
-                          <a:prstClr val="black"/>
-                        </a:solidFill>
-                        <a:effectLst/>
-                        <a:uLnTx/>
-                        <a:uFillTx/>
-                        <a:latin typeface="Calibri" panose="020F0502020204030204"/>
-                        <a:ea typeface="+mn-ea"/>
-                        <a:cs typeface="+mn-cs"/>
-                      </a:endParaRPr>
                     </a:p>
                   </a:txBody>
                   <a:tcPr/>
@@ -7158,215 +7038,133 @@
                     <a:lstStyle/>
                     <a:p>
                       <a:r>
-                        <a:rPr lang="en-CH" sz="1400" dirty="0"/>
-                        <a:t>Gender equality index</a:t>
-                      </a:r>
-                    </a:p>
-                  </a:txBody>
-                  <a:tcPr/>
-                </a:tc>
-                <a:tc>
-                  <a:txBody>
-                    <a:bodyPr/>
-                    <a:lstStyle/>
-                    <a:p>
-                      <a:pPr marL="0" marR="0" lvl="0" indent="0" algn="l" defTabSz="914400" rtl="0" eaLnBrk="1" fontAlgn="auto" latinLnBrk="0" hangingPunct="1">
-                        <a:lnSpc>
-                          <a:spcPct val="100000"/>
-                        </a:lnSpc>
-                        <a:spcBef>
-                          <a:spcPts val="0"/>
-                        </a:spcBef>
-                        <a:spcAft>
-                          <a:spcPts val="0"/>
-                        </a:spcAft>
-                        <a:buClrTx/>
-                        <a:buSzTx/>
-                        <a:buFontTx/>
-                        <a:buNone/>
-                        <a:tabLst/>
-                        <a:defRPr/>
-                      </a:pPr>
-                      <a:r>
-                        <a:rPr lang="en-CH" sz="1400" dirty="0"/>
-                        <a:t>World Bank</a:t>
-                      </a:r>
-                    </a:p>
-                    <a:p>
-                      <a:pPr marL="0" marR="0" lvl="0" indent="0" algn="l" defTabSz="914400" rtl="0" eaLnBrk="1" fontAlgn="auto" latinLnBrk="0" hangingPunct="1">
-                        <a:lnSpc>
-                          <a:spcPct val="100000"/>
-                        </a:lnSpc>
-                        <a:spcBef>
-                          <a:spcPts val="0"/>
-                        </a:spcBef>
-                        <a:spcAft>
-                          <a:spcPts val="0"/>
-                        </a:spcAft>
-                        <a:buClrTx/>
-                        <a:buSzTx/>
-                        <a:buFontTx/>
-                        <a:buNone/>
-                        <a:tabLst/>
-                        <a:defRPr/>
-                      </a:pPr>
+                        <a:rPr lang="en-CH" sz="1400" dirty="0">
+                          <a:highlight>
+                            <a:srgbClr val="00FF00"/>
+                          </a:highlight>
+                        </a:rPr>
+                        <a:t>Gender inequality index</a:t>
+                      </a:r>
+                    </a:p>
+                  </a:txBody>
+                  <a:tcPr/>
+                </a:tc>
+                <a:tc>
+                  <a:txBody>
+                    <a:bodyPr/>
+                    <a:lstStyle/>
+                    <a:p>
+                      <a:r>
+                        <a:rPr lang="en-CH" sz="1400" dirty="0"/>
+                        <a:t>Human development data center (UNDP)</a:t>
+                      </a:r>
+                    </a:p>
+                  </a:txBody>
+                  <a:tcPr/>
+                </a:tc>
+                <a:tc>
+                  <a:txBody>
+                    <a:bodyPr/>
+                    <a:lstStyle/>
+                    <a:p>
+                      <a:r>
+                        <a:rPr lang="en-CH" sz="1400" dirty="0"/>
+                        <a:t>Socio economic, complex</a:t>
+                      </a:r>
+                    </a:p>
+                  </a:txBody>
+                  <a:tcPr/>
+                </a:tc>
+                <a:tc>
+                  <a:txBody>
+                    <a:bodyPr/>
+                    <a:lstStyle/>
+                    <a:p>
+                      <a:r>
+                        <a:rPr lang="en-CH" sz="1400" dirty="0"/>
+                        <a:t>2019-2010,</a:t>
+                      </a:r>
+                    </a:p>
+                    <a:p>
+                      <a:r>
+                        <a:rPr lang="en-CH" sz="1400" dirty="0"/>
+                        <a:t>2005, 2000,</a:t>
+                      </a:r>
+                    </a:p>
+                    <a:p>
+                      <a:r>
+                        <a:rPr lang="en-CH" sz="1400" dirty="0"/>
+                        <a:t>1995,1990</a:t>
+                      </a:r>
+                    </a:p>
+                  </a:txBody>
+                  <a:tcPr/>
+                </a:tc>
+                <a:tc>
+                  <a:txBody>
+                    <a:bodyPr/>
+                    <a:lstStyle/>
+                    <a:p>
+                      <a:r>
+                        <a:rPr lang="en-CH" sz="1400" dirty="0"/>
+                        <a:t>ALL?</a:t>
+                      </a:r>
+                    </a:p>
+                  </a:txBody>
+                  <a:tcPr/>
+                </a:tc>
+                <a:tc>
+                  <a:txBody>
+                    <a:bodyPr/>
+                    <a:lstStyle/>
+                    <a:p>
+                      <a:r>
+                        <a:rPr lang="en-CH" sz="1400" dirty="0"/>
+                        <a:t>API - UNDP</a:t>
+                      </a:r>
+                    </a:p>
+                  </a:txBody>
+                  <a:tcPr/>
+                </a:tc>
+                <a:tc>
+                  <a:txBody>
+                    <a:bodyPr/>
+                    <a:lstStyle/>
+                    <a:p>
+                      <a:r>
+                        <a:rPr lang="en-CH" sz="1400" dirty="0"/>
+                        <a:t>Ruben</a:t>
+                      </a:r>
+                    </a:p>
+                  </a:txBody>
+                  <a:tcPr/>
+                </a:tc>
+                <a:tc>
+                  <a:txBody>
+                    <a:bodyPr/>
+                    <a:lstStyle/>
+                    <a:p>
+                      <a:r>
+                        <a:rPr lang="en-GB" sz="1400" dirty="0"/>
+                        <a:t>http://</a:t>
+                      </a:r>
+                      <a:r>
+                        <a:rPr lang="en-GB" sz="1400" dirty="0" err="1"/>
+                        <a:t>hdr.undp.org</a:t>
+                      </a:r>
+                      <a:r>
+                        <a:rPr lang="en-GB" sz="1400" dirty="0"/>
+                        <a:t>/</a:t>
+                      </a:r>
+                      <a:r>
+                        <a:rPr lang="en-GB" sz="1400" dirty="0" err="1"/>
+                        <a:t>en</a:t>
+                      </a:r>
+                      <a:r>
+                        <a:rPr lang="en-GB" sz="1400" dirty="0"/>
+                        <a:t>/data</a:t>
+                      </a:r>
                       <a:endParaRPr lang="en-CH" sz="1400" dirty="0"/>
-                    </a:p>
-                  </a:txBody>
-                  <a:tcPr/>
-                </a:tc>
-                <a:tc>
-                  <a:txBody>
-                    <a:bodyPr/>
-                    <a:lstStyle/>
-                    <a:p>
-                      <a:r>
-                        <a:rPr lang="en-CH" sz="1400" dirty="0"/>
-                        <a:t>Social</a:t>
-                      </a:r>
-                    </a:p>
-                  </a:txBody>
-                  <a:tcPr/>
-                </a:tc>
-                <a:tc>
-                  <a:txBody>
-                    <a:bodyPr/>
-                    <a:lstStyle/>
-                    <a:p>
-                      <a:r>
-                        <a:rPr lang="en-CH" sz="1400" dirty="0"/>
-                        <a:t>all?</a:t>
-                      </a:r>
-                    </a:p>
-                  </a:txBody>
-                  <a:tcPr/>
-                </a:tc>
-                <a:tc>
-                  <a:txBody>
-                    <a:bodyPr/>
-                    <a:lstStyle/>
-                    <a:p>
-                      <a:r>
-                        <a:rPr lang="en-CH" sz="1400" dirty="0"/>
-                        <a:t>All?</a:t>
-                      </a:r>
-                    </a:p>
-                  </a:txBody>
-                  <a:tcPr/>
-                </a:tc>
-                <a:tc>
-                  <a:txBody>
-                    <a:bodyPr/>
-                    <a:lstStyle/>
-                    <a:p>
-                      <a:r>
-                        <a:rPr lang="en-CH" sz="1400" dirty="0"/>
-                        <a:t>API – World Bnak</a:t>
-                      </a:r>
-                    </a:p>
-                  </a:txBody>
-                  <a:tcPr/>
-                </a:tc>
-                <a:tc>
-                  <a:txBody>
-                    <a:bodyPr/>
-                    <a:lstStyle/>
-                    <a:p>
-                      <a:r>
-                        <a:rPr lang="en-CH" sz="1400" dirty="0"/>
-                        <a:t>Ruben</a:t>
-                      </a:r>
-                    </a:p>
-                  </a:txBody>
-                  <a:tcPr/>
-                </a:tc>
-                <a:tc>
-                  <a:txBody>
-                    <a:bodyPr/>
-                    <a:lstStyle/>
-                    <a:p>
-                      <a:pPr marL="0" marR="0" lvl="0" indent="0" algn="l" defTabSz="914400" rtl="0" eaLnBrk="1" fontAlgn="auto" latinLnBrk="0" hangingPunct="1">
-                        <a:lnSpc>
-                          <a:spcPct val="100000"/>
-                        </a:lnSpc>
-                        <a:spcBef>
-                          <a:spcPts val="0"/>
-                        </a:spcBef>
-                        <a:spcAft>
-                          <a:spcPts val="0"/>
-                        </a:spcAft>
-                        <a:buClrTx/>
-                        <a:buSzTx/>
-                        <a:buFontTx/>
-                        <a:buNone/>
-                        <a:tabLst/>
-                        <a:defRPr/>
-                      </a:pPr>
-                      <a:r>
-                        <a:rPr kumimoji="0" lang="en-GB" sz="1400" b="0" i="0" u="none" strike="noStrike" kern="1200" cap="none" spc="0" normalizeH="0" baseline="0" noProof="0" dirty="0">
-                          <a:ln>
-                            <a:noFill/>
-                          </a:ln>
-                          <a:solidFill>
-                            <a:prstClr val="black"/>
-                          </a:solidFill>
-                          <a:effectLst/>
-                          <a:uLnTx/>
-                          <a:uFillTx/>
-                          <a:latin typeface="Calibri" panose="020F0502020204030204"/>
-                          <a:ea typeface="+mn-ea"/>
-                          <a:cs typeface="+mn-cs"/>
-                        </a:rPr>
-                        <a:t>https://</a:t>
-                      </a:r>
-                      <a:r>
-                        <a:rPr kumimoji="0" lang="en-GB" sz="1400" b="0" i="0" u="none" strike="noStrike" kern="1200" cap="none" spc="0" normalizeH="0" baseline="0" noProof="0" dirty="0" err="1">
-                          <a:ln>
-                            <a:noFill/>
-                          </a:ln>
-                          <a:solidFill>
-                            <a:prstClr val="black"/>
-                          </a:solidFill>
-                          <a:effectLst/>
-                          <a:uLnTx/>
-                          <a:uFillTx/>
-                          <a:latin typeface="Calibri" panose="020F0502020204030204"/>
-                          <a:ea typeface="+mn-ea"/>
-                          <a:cs typeface="+mn-cs"/>
-                        </a:rPr>
-                        <a:t>datahelpdesk.worldbank.org</a:t>
-                      </a:r>
-                      <a:r>
-                        <a:rPr kumimoji="0" lang="en-GB" sz="1400" b="0" i="0" u="none" strike="noStrike" kern="1200" cap="none" spc="0" normalizeH="0" baseline="0" noProof="0" dirty="0">
-                          <a:ln>
-                            <a:noFill/>
-                          </a:ln>
-                          <a:solidFill>
-                            <a:prstClr val="black"/>
-                          </a:solidFill>
-                          <a:effectLst/>
-                          <a:uLnTx/>
-                          <a:uFillTx/>
-                          <a:latin typeface="Calibri" panose="020F0502020204030204"/>
-                          <a:ea typeface="+mn-ea"/>
-                          <a:cs typeface="+mn-cs"/>
-                        </a:rPr>
-                        <a:t>/knowledgebase/topics/125589-developer-information</a:t>
-                      </a:r>
-                      <a:endParaRPr kumimoji="0" lang="en-CH" sz="1400" b="0" i="0" u="none" strike="noStrike" kern="1200" cap="none" spc="0" normalizeH="0" baseline="0" noProof="0" dirty="0">
-                        <a:ln>
-                          <a:noFill/>
-                        </a:ln>
-                        <a:solidFill>
-                          <a:prstClr val="black"/>
-                        </a:solidFill>
-                        <a:effectLst/>
-                        <a:uLnTx/>
-                        <a:uFillTx/>
-                        <a:latin typeface="Calibri" panose="020F0502020204030204"/>
-                        <a:ea typeface="+mn-ea"/>
-                        <a:cs typeface="+mn-cs"/>
-                      </a:endParaRPr>
                     </a:p>
                   </a:txBody>
                   <a:tcPr/>
@@ -7426,14 +7224,14 @@
           <p:nvPr>
             <p:extLst>
               <p:ext uri="{D42A27DB-BD31-4B8C-83A1-F6EECF244321}">
-                <p14:modId xmlns:p14="http://schemas.microsoft.com/office/powerpoint/2010/main" val="1356703667"/>
+                <p14:modId xmlns:p14="http://schemas.microsoft.com/office/powerpoint/2010/main" val="1011497588"/>
               </p:ext>
             </p:extLst>
           </p:nvPr>
         </p:nvGraphicFramePr>
         <p:xfrm>
           <a:off x="262472" y="149860"/>
-          <a:ext cx="11578156" cy="4770120"/>
+          <a:ext cx="11578156" cy="5344160"/>
         </p:xfrm>
         <a:graphic>
           <a:graphicData uri="http://schemas.openxmlformats.org/drawingml/2006/table">
@@ -7621,7 +7419,11 @@
                     <a:lstStyle/>
                     <a:p>
                       <a:r>
-                        <a:rPr lang="en-CH" sz="1400" dirty="0"/>
+                        <a:rPr lang="en-CH" sz="1400" dirty="0">
+                          <a:highlight>
+                            <a:srgbClr val="00FF00"/>
+                          </a:highlight>
+                        </a:rPr>
                         <a:t>Gender development index</a:t>
                       </a:r>
                     </a:p>
@@ -7761,132 +7563,136 @@
                     <a:lstStyle/>
                     <a:p>
                       <a:r>
+                        <a:rPr lang="en-GB" sz="1400" dirty="0">
+                          <a:highlight>
+                            <a:srgbClr val="00FF00"/>
+                          </a:highlight>
+                        </a:rPr>
+                        <a:t>seats held by women in national parliaments (%)</a:t>
+                      </a:r>
+                      <a:endParaRPr lang="en-CH" sz="1400" dirty="0">
+                        <a:highlight>
+                          <a:srgbClr val="00FF00"/>
+                        </a:highlight>
+                      </a:endParaRPr>
+                    </a:p>
+                  </a:txBody>
+                  <a:tcPr/>
+                </a:tc>
+                <a:tc>
+                  <a:txBody>
+                    <a:bodyPr/>
+                    <a:lstStyle/>
+                    <a:p>
+                      <a:r>
+                        <a:rPr lang="en-CH" sz="1400" dirty="0"/>
+                        <a:t>Human development data center (UNDP)</a:t>
+                      </a:r>
+                    </a:p>
+                  </a:txBody>
+                  <a:tcPr/>
+                </a:tc>
+                <a:tc>
+                  <a:txBody>
+                    <a:bodyPr/>
+                    <a:lstStyle/>
+                    <a:p>
+                      <a:r>
+                        <a:rPr lang="en-CH" sz="1400" dirty="0"/>
+                        <a:t>Socio economic, complex</a:t>
+                      </a:r>
+                    </a:p>
+                  </a:txBody>
+                  <a:tcPr/>
+                </a:tc>
+                <a:tc>
+                  <a:txBody>
+                    <a:bodyPr/>
+                    <a:lstStyle/>
+                    <a:p>
+                      <a:r>
+                        <a:rPr lang="en-CH" sz="1400" dirty="0"/>
+                        <a:t>2019-2010,</a:t>
+                      </a:r>
+                    </a:p>
+                    <a:p>
+                      <a:r>
+                        <a:rPr lang="en-CH" sz="1400" dirty="0"/>
+                        <a:t>2005, 2000,</a:t>
+                      </a:r>
+                    </a:p>
+                    <a:p>
+                      <a:r>
+                        <a:rPr lang="en-CH" sz="1400" dirty="0"/>
+                        <a:t>1995,1990</a:t>
+                      </a:r>
+                    </a:p>
+                  </a:txBody>
+                  <a:tcPr/>
+                </a:tc>
+                <a:tc>
+                  <a:txBody>
+                    <a:bodyPr/>
+                    <a:lstStyle/>
+                    <a:p>
+                      <a:r>
+                        <a:rPr lang="en-CH" sz="1400" dirty="0"/>
+                        <a:t>ALL?</a:t>
+                      </a:r>
+                    </a:p>
+                  </a:txBody>
+                  <a:tcPr/>
+                </a:tc>
+                <a:tc>
+                  <a:txBody>
+                    <a:bodyPr/>
+                    <a:lstStyle/>
+                    <a:p>
+                      <a:r>
+                        <a:rPr lang="en-CH" sz="1400" dirty="0"/>
+                        <a:t>API - UNDP</a:t>
+                      </a:r>
+                    </a:p>
+                  </a:txBody>
+                  <a:tcPr/>
+                </a:tc>
+                <a:tc>
+                  <a:txBody>
+                    <a:bodyPr/>
+                    <a:lstStyle/>
+                    <a:p>
+                      <a:r>
+                        <a:rPr lang="en-CH" sz="1400" dirty="0"/>
+                        <a:t>Ruben</a:t>
+                      </a:r>
+                    </a:p>
+                  </a:txBody>
+                  <a:tcPr/>
+                </a:tc>
+                <a:tc>
+                  <a:txBody>
+                    <a:bodyPr/>
+                    <a:lstStyle/>
+                    <a:p>
+                      <a:r>
                         <a:rPr lang="en-GB" sz="1400" dirty="0"/>
-                        <a:t>seats held by women in national parliaments</a:t>
-                      </a:r>
-                      <a:endParaRPr lang="en-CH" sz="1400" dirty="0"/>
-                    </a:p>
-                  </a:txBody>
-                  <a:tcPr/>
-                </a:tc>
-                <a:tc>
-                  <a:txBody>
-                    <a:bodyPr/>
-                    <a:lstStyle/>
-                    <a:p>
-                      <a:pPr marL="0" marR="0" lvl="0" indent="0" algn="l" defTabSz="914400" rtl="0" eaLnBrk="1" fontAlgn="auto" latinLnBrk="0" hangingPunct="1">
-                        <a:lnSpc>
-                          <a:spcPct val="100000"/>
-                        </a:lnSpc>
-                        <a:spcBef>
-                          <a:spcPts val="0"/>
-                        </a:spcBef>
-                        <a:spcAft>
-                          <a:spcPts val="0"/>
-                        </a:spcAft>
-                        <a:buClrTx/>
-                        <a:buSzTx/>
-                        <a:buFontTx/>
-                        <a:buNone/>
-                        <a:tabLst/>
-                        <a:defRPr/>
-                      </a:pPr>
-                      <a:r>
-                        <a:rPr lang="en-CH" sz="1400"/>
-                        <a:t>World Bank</a:t>
-                      </a:r>
-                    </a:p>
-                    <a:p>
-                      <a:endParaRPr lang="en-CH" sz="1400" dirty="0"/>
-                    </a:p>
-                  </a:txBody>
-                  <a:tcPr/>
-                </a:tc>
-                <a:tc>
-                  <a:txBody>
-                    <a:bodyPr/>
-                    <a:lstStyle/>
-                    <a:p>
+                        <a:t>http://</a:t>
+                      </a:r>
+                      <a:r>
+                        <a:rPr lang="en-GB" sz="1400" dirty="0" err="1"/>
+                        <a:t>hdr.undp.org</a:t>
+                      </a:r>
                       <a:r>
                         <a:rPr lang="en-GB" sz="1400" dirty="0"/>
-                        <a:t>G</a:t>
-                      </a:r>
-                      <a:r>
-                        <a:rPr lang="en-CH" sz="1400" dirty="0"/>
-                        <a:t>ender, political</a:t>
-                      </a:r>
-                    </a:p>
-                  </a:txBody>
-                  <a:tcPr/>
-                </a:tc>
-                <a:tc>
-                  <a:txBody>
-                    <a:bodyPr/>
-                    <a:lstStyle/>
-                    <a:p>
-                      <a:r>
-                        <a:rPr lang="en-CH" sz="1400" dirty="0"/>
-                        <a:t>all?</a:t>
-                      </a:r>
-                    </a:p>
-                  </a:txBody>
-                  <a:tcPr/>
-                </a:tc>
-                <a:tc>
-                  <a:txBody>
-                    <a:bodyPr/>
-                    <a:lstStyle/>
-                    <a:p>
-                      <a:r>
-                        <a:rPr lang="en-CH" sz="1400" dirty="0"/>
-                        <a:t>All?</a:t>
-                      </a:r>
-                    </a:p>
-                  </a:txBody>
-                  <a:tcPr/>
-                </a:tc>
-                <a:tc>
-                  <a:txBody>
-                    <a:bodyPr/>
-                    <a:lstStyle/>
-                    <a:p>
-                      <a:r>
-                        <a:rPr lang="en-CH" sz="1400" dirty="0"/>
-                        <a:t>API – World Bnak</a:t>
-                      </a:r>
-                    </a:p>
-                  </a:txBody>
-                  <a:tcPr/>
-                </a:tc>
-                <a:tc>
-                  <a:txBody>
-                    <a:bodyPr/>
-                    <a:lstStyle/>
-                    <a:p>
-                      <a:r>
-                        <a:rPr lang="en-CH" sz="1400" dirty="0"/>
-                        <a:t>Ruben</a:t>
-                      </a:r>
-                    </a:p>
-                  </a:txBody>
-                  <a:tcPr/>
-                </a:tc>
-                <a:tc>
-                  <a:txBody>
-                    <a:bodyPr/>
-                    <a:lstStyle/>
-                    <a:p>
+                        <a:t>/</a:t>
+                      </a:r>
+                      <a:r>
+                        <a:rPr lang="en-GB" sz="1400" dirty="0" err="1"/>
+                        <a:t>en</a:t>
+                      </a:r>
                       <a:r>
                         <a:rPr lang="en-GB" sz="1400" dirty="0"/>
-                        <a:t>https://</a:t>
-                      </a:r>
-                      <a:r>
-                        <a:rPr lang="en-GB" sz="1400" dirty="0" err="1"/>
-                        <a:t>datahelpdesk.worldbank.org</a:t>
-                      </a:r>
-                      <a:r>
-                        <a:rPr lang="en-GB" sz="1400" dirty="0"/>
-                        <a:t>/knowledgebase/topics/125589-developer-information</a:t>
+                        <a:t>/data</a:t>
                       </a:r>
                       <a:endParaRPr lang="en-CH" sz="1400" dirty="0"/>
                     </a:p>
@@ -7906,7 +7712,11 @@
                     <a:lstStyle/>
                     <a:p>
                       <a:r>
-                        <a:rPr lang="en-CH" sz="1400" dirty="0"/>
+                        <a:rPr lang="en-CH" sz="1400" dirty="0">
+                          <a:highlight>
+                            <a:srgbClr val="FFFF00"/>
+                          </a:highlight>
+                        </a:rPr>
                         <a:t>Multidimentional poverty index</a:t>
                       </a:r>
                     </a:p>
@@ -8222,16 +8032,177 @@
                     <a:bodyPr/>
                     <a:lstStyle/>
                     <a:p>
+                      <a:r>
+                        <a:rPr lang="en-CH" sz="1400" dirty="0">
+                          <a:highlight>
+                            <a:srgbClr val="00FF00"/>
+                          </a:highlight>
+                        </a:rPr>
+                        <a:t>Education Index</a:t>
+                      </a:r>
+                    </a:p>
+                  </a:txBody>
+                  <a:tcPr/>
+                </a:tc>
+                <a:tc>
+                  <a:txBody>
+                    <a:bodyPr/>
+                    <a:lstStyle/>
+                    <a:p>
+                      <a:r>
+                        <a:rPr lang="en-CH" sz="1400" dirty="0"/>
+                        <a:t>Human development data center (UNDP)</a:t>
+                      </a:r>
+                    </a:p>
+                  </a:txBody>
+                  <a:tcPr/>
+                </a:tc>
+                <a:tc>
+                  <a:txBody>
+                    <a:bodyPr/>
+                    <a:lstStyle/>
+                    <a:p>
+                      <a:r>
+                        <a:rPr lang="en-CH" sz="1400" dirty="0"/>
+                        <a:t>Socio economic, complex</a:t>
+                      </a:r>
+                    </a:p>
+                  </a:txBody>
+                  <a:tcPr/>
+                </a:tc>
+                <a:tc>
+                  <a:txBody>
+                    <a:bodyPr/>
+                    <a:lstStyle/>
+                    <a:p>
+                      <a:r>
+                        <a:rPr lang="en-CH" sz="1400" dirty="0"/>
+                        <a:t>2019-2010,</a:t>
+                      </a:r>
+                    </a:p>
+                    <a:p>
+                      <a:r>
+                        <a:rPr lang="en-CH" sz="1400" dirty="0"/>
+                        <a:t>2005, 2000,</a:t>
+                      </a:r>
+                    </a:p>
+                    <a:p>
+                      <a:r>
+                        <a:rPr lang="en-CH" sz="1400" dirty="0"/>
+                        <a:t>1995,1990</a:t>
+                      </a:r>
+                    </a:p>
+                  </a:txBody>
+                  <a:tcPr/>
+                </a:tc>
+                <a:tc>
+                  <a:txBody>
+                    <a:bodyPr/>
+                    <a:lstStyle/>
+                    <a:p>
+                      <a:r>
+                        <a:rPr lang="en-CH" sz="1400" dirty="0"/>
+                        <a:t>ALL?</a:t>
+                      </a:r>
+                    </a:p>
+                  </a:txBody>
+                  <a:tcPr/>
+                </a:tc>
+                <a:tc>
+                  <a:txBody>
+                    <a:bodyPr/>
+                    <a:lstStyle/>
+                    <a:p>
+                      <a:r>
+                        <a:rPr lang="en-CH" sz="1400" dirty="0"/>
+                        <a:t>API - UNDP</a:t>
+                      </a:r>
+                    </a:p>
+                  </a:txBody>
+                  <a:tcPr/>
+                </a:tc>
+                <a:tc>
+                  <a:txBody>
+                    <a:bodyPr/>
+                    <a:lstStyle/>
+                    <a:p>
+                      <a:r>
+                        <a:rPr lang="en-CH" sz="1400" dirty="0"/>
+                        <a:t>Ruben</a:t>
+                      </a:r>
+                    </a:p>
+                  </a:txBody>
+                  <a:tcPr/>
+                </a:tc>
+                <a:tc>
+                  <a:txBody>
+                    <a:bodyPr/>
+                    <a:lstStyle/>
+                    <a:p>
+                      <a:r>
+                        <a:rPr lang="en-GB" sz="1400" dirty="0"/>
+                        <a:t>http://</a:t>
+                      </a:r>
+                      <a:r>
+                        <a:rPr lang="en-GB" sz="1400" dirty="0" err="1"/>
+                        <a:t>hdr.undp.org</a:t>
+                      </a:r>
+                      <a:r>
+                        <a:rPr lang="en-GB" sz="1400" dirty="0"/>
+                        <a:t>/</a:t>
+                      </a:r>
+                      <a:r>
+                        <a:rPr lang="en-GB" sz="1400" dirty="0" err="1"/>
+                        <a:t>en</a:t>
+                      </a:r>
+                      <a:r>
+                        <a:rPr lang="en-GB" sz="1400" dirty="0"/>
+                        <a:t>/data</a:t>
+                      </a:r>
                       <a:endParaRPr lang="en-CH" sz="1400" dirty="0"/>
                     </a:p>
                   </a:txBody>
                   <a:tcPr/>
                 </a:tc>
-                <a:tc>
-                  <a:txBody>
-                    <a:bodyPr/>
-                    <a:lstStyle/>
-                    <a:p>
+                <a:extLst>
+                  <a:ext uri="{0D108BD9-81ED-4DB2-BD59-A6C34878D82A}">
+                    <a16:rowId xmlns:a16="http://schemas.microsoft.com/office/drawing/2014/main" val="4103178330"/>
+                  </a:ext>
+                </a:extLst>
+              </a:tr>
+              <a:tr h="370840">
+                <a:tc>
+                  <a:txBody>
+                    <a:bodyPr/>
+                    <a:lstStyle/>
+                    <a:p>
+                      <a:endParaRPr lang="en-CH" sz="1400" dirty="0"/>
+                    </a:p>
+                  </a:txBody>
+                  <a:tcPr/>
+                </a:tc>
+                <a:tc>
+                  <a:txBody>
+                    <a:bodyPr/>
+                    <a:lstStyle/>
+                    <a:p>
+                      <a:pPr marL="0" marR="0" lvl="0" indent="0" algn="l" defTabSz="914400" rtl="0" eaLnBrk="1" fontAlgn="auto" latinLnBrk="0" hangingPunct="1">
+                        <a:lnSpc>
+                          <a:spcPct val="100000"/>
+                        </a:lnSpc>
+                        <a:spcBef>
+                          <a:spcPts val="0"/>
+                        </a:spcBef>
+                        <a:spcAft>
+                          <a:spcPts val="0"/>
+                        </a:spcAft>
+                        <a:buClrTx/>
+                        <a:buSzTx/>
+                        <a:buFontTx/>
+                        <a:buNone/>
+                        <a:tabLst/>
+                        <a:defRPr/>
+                      </a:pPr>
                       <a:endParaRPr lang="en-CH" sz="1400" dirty="0"/>
                     </a:p>
                   </a:txBody>
@@ -8329,7 +8300,7 @@
                 </a:tc>
                 <a:extLst>
                   <a:ext uri="{0D108BD9-81ED-4DB2-BD59-A6C34878D82A}">
-                    <a16:rowId xmlns:a16="http://schemas.microsoft.com/office/drawing/2014/main" val="4103178330"/>
+                    <a16:rowId xmlns:a16="http://schemas.microsoft.com/office/drawing/2014/main" val="1653469390"/>
                   </a:ext>
                 </a:extLst>
               </a:tr>
@@ -8463,140 +8434,6 @@
                 </a:tc>
                 <a:extLst>
                   <a:ext uri="{0D108BD9-81ED-4DB2-BD59-A6C34878D82A}">
-                    <a16:rowId xmlns:a16="http://schemas.microsoft.com/office/drawing/2014/main" val="1653469390"/>
-                  </a:ext>
-                </a:extLst>
-              </a:tr>
-              <a:tr h="370840">
-                <a:tc>
-                  <a:txBody>
-                    <a:bodyPr/>
-                    <a:lstStyle/>
-                    <a:p>
-                      <a:endParaRPr lang="en-CH" sz="1400" dirty="0"/>
-                    </a:p>
-                  </a:txBody>
-                  <a:tcPr/>
-                </a:tc>
-                <a:tc>
-                  <a:txBody>
-                    <a:bodyPr/>
-                    <a:lstStyle/>
-                    <a:p>
-                      <a:pPr marL="0" marR="0" lvl="0" indent="0" algn="l" defTabSz="914400" rtl="0" eaLnBrk="1" fontAlgn="auto" latinLnBrk="0" hangingPunct="1">
-                        <a:lnSpc>
-                          <a:spcPct val="100000"/>
-                        </a:lnSpc>
-                        <a:spcBef>
-                          <a:spcPts val="0"/>
-                        </a:spcBef>
-                        <a:spcAft>
-                          <a:spcPts val="0"/>
-                        </a:spcAft>
-                        <a:buClrTx/>
-                        <a:buSzTx/>
-                        <a:buFontTx/>
-                        <a:buNone/>
-                        <a:tabLst/>
-                        <a:defRPr/>
-                      </a:pPr>
-                      <a:endParaRPr lang="en-CH" sz="1400" dirty="0"/>
-                    </a:p>
-                  </a:txBody>
-                  <a:tcPr/>
-                </a:tc>
-                <a:tc>
-                  <a:txBody>
-                    <a:bodyPr/>
-                    <a:lstStyle/>
-                    <a:p>
-                      <a:endParaRPr lang="en-CH" sz="1400" dirty="0"/>
-                    </a:p>
-                  </a:txBody>
-                  <a:tcPr/>
-                </a:tc>
-                <a:tc>
-                  <a:txBody>
-                    <a:bodyPr/>
-                    <a:lstStyle/>
-                    <a:p>
-                      <a:endParaRPr lang="en-CH" sz="1400" dirty="0"/>
-                    </a:p>
-                  </a:txBody>
-                  <a:tcPr/>
-                </a:tc>
-                <a:tc>
-                  <a:txBody>
-                    <a:bodyPr/>
-                    <a:lstStyle/>
-                    <a:p>
-                      <a:endParaRPr lang="en-CH" sz="1400" dirty="0"/>
-                    </a:p>
-                  </a:txBody>
-                  <a:tcPr/>
-                </a:tc>
-                <a:tc>
-                  <a:txBody>
-                    <a:bodyPr/>
-                    <a:lstStyle/>
-                    <a:p>
-                      <a:endParaRPr lang="en-CH" sz="1400" dirty="0"/>
-                    </a:p>
-                  </a:txBody>
-                  <a:tcPr/>
-                </a:tc>
-                <a:tc>
-                  <a:txBody>
-                    <a:bodyPr/>
-                    <a:lstStyle/>
-                    <a:p>
-                      <a:endParaRPr lang="en-CH" sz="1400" dirty="0"/>
-                    </a:p>
-                  </a:txBody>
-                  <a:tcPr/>
-                </a:tc>
-                <a:tc>
-                  <a:txBody>
-                    <a:bodyPr/>
-                    <a:lstStyle/>
-                    <a:p>
-                      <a:pPr marL="0" marR="0" lvl="0" indent="0" algn="l" defTabSz="914400" rtl="0" eaLnBrk="1" fontAlgn="auto" latinLnBrk="0" hangingPunct="1">
-                        <a:lnSpc>
-                          <a:spcPct val="100000"/>
-                        </a:lnSpc>
-                        <a:spcBef>
-                          <a:spcPts val="0"/>
-                        </a:spcBef>
-                        <a:spcAft>
-                          <a:spcPts val="0"/>
-                        </a:spcAft>
-                        <a:buClrTx/>
-                        <a:buSzTx/>
-                        <a:buFontTx/>
-                        <a:buNone/>
-                        <a:tabLst/>
-                        <a:defRPr/>
-                      </a:pPr>
-                      <a:endParaRPr kumimoji="0" lang="en-CH" sz="1400" b="0" i="0" u="none" strike="noStrike" kern="1200" cap="none" spc="0" normalizeH="0" baseline="0" noProof="0" dirty="0">
-                        <a:ln>
-                          <a:noFill/>
-                        </a:ln>
-                        <a:solidFill>
-                          <a:prstClr val="black"/>
-                        </a:solidFill>
-                        <a:effectLst/>
-                        <a:uLnTx/>
-                        <a:uFillTx/>
-                        <a:latin typeface="Calibri" panose="020F0502020204030204"/>
-                        <a:ea typeface="+mn-ea"/>
-                        <a:cs typeface="+mn-cs"/>
-                      </a:endParaRPr>
-                    </a:p>
-                  </a:txBody>
-                  <a:tcPr/>
-                </a:tc>
-                <a:extLst>
-                  <a:ext uri="{0D108BD9-81ED-4DB2-BD59-A6C34878D82A}">
                     <a16:rowId xmlns:a16="http://schemas.microsoft.com/office/drawing/2014/main" val="1632130514"/>
                   </a:ext>
                 </a:extLst>
@@ -8605,6 +8442,81 @@
           </a:graphicData>
         </a:graphic>
       </p:graphicFrame>
+      <p:sp>
+        <p:nvSpPr>
+          <p:cNvPr id="3" name="TextBox 2">
+            <a:extLst>
+              <a:ext uri="{FF2B5EF4-FFF2-40B4-BE49-F238E27FC236}">
+                <a16:creationId xmlns:a16="http://schemas.microsoft.com/office/drawing/2014/main" id="{9E314EE3-976C-8247-AEB3-A9D88760B823}"/>
+              </a:ext>
+            </a:extLst>
+          </p:cNvPr>
+          <p:cNvSpPr txBox="1"/>
+          <p:nvPr/>
+        </p:nvSpPr>
+        <p:spPr>
+          <a:xfrm>
+            <a:off x="262472" y="5907921"/>
+            <a:ext cx="1555750" cy="800219"/>
+          </a:xfrm>
+          <a:prstGeom prst="rect">
+            <a:avLst/>
+          </a:prstGeom>
+          <a:noFill/>
+        </p:spPr>
+        <p:txBody>
+          <a:bodyPr wrap="square" rtlCol="0">
+            <a:spAutoFit/>
+          </a:bodyPr>
+          <a:lstStyle/>
+          <a:p>
+            <a:r>
+              <a:rPr lang="en-GB" dirty="0"/>
+              <a:t>C</a:t>
+            </a:r>
+            <a:r>
+              <a:rPr lang="en-CH" dirty="0"/>
+              <a:t>olor code</a:t>
+            </a:r>
+          </a:p>
+          <a:p>
+            <a:r>
+              <a:rPr lang="en-GB" sz="1400" dirty="0">
+                <a:highlight>
+                  <a:srgbClr val="00FF00"/>
+                </a:highlight>
+              </a:rPr>
+              <a:t>D</a:t>
+            </a:r>
+            <a:r>
+              <a:rPr lang="en-CH" sz="1400" dirty="0">
+                <a:highlight>
+                  <a:srgbClr val="00FF00"/>
+                </a:highlight>
+              </a:rPr>
+              <a:t>one</a:t>
+            </a:r>
+          </a:p>
+          <a:p>
+            <a:r>
+              <a:rPr lang="en-GB" sz="1400" dirty="0">
+                <a:highlight>
+                  <a:srgbClr val="FFFF00"/>
+                </a:highlight>
+              </a:rPr>
+              <a:t>N</a:t>
+            </a:r>
+            <a:r>
+              <a:rPr lang="en-CH" sz="1400" dirty="0">
+                <a:highlight>
+                  <a:srgbClr val="FFFF00"/>
+                </a:highlight>
+              </a:rPr>
+              <a:t>o enough data</a:t>
+            </a:r>
+          </a:p>
+        </p:txBody>
+      </p:sp>
     </p:spTree>
     <p:extLst>
       <p:ext uri="{BB962C8B-B14F-4D97-AF65-F5344CB8AC3E}">

</xml_diff>

<commit_message>
adding formated dataframe from WB and UNDP and fixing name of the files in a consisten way
</commit_message>
<xml_diff>
--- a/Projects/M3/Project.pptx
+++ b/Projects/M3/Project.pptx
@@ -275,7 +275,7 @@
           <a:p>
             <a:fld id="{076CEB0B-9A46-6E4F-A893-3E4C3C2FD4BF}" type="datetimeFigureOut">
               <a:rPr lang="en-CH" smtClean="0"/>
-              <a:t>22.02.21</a:t>
+              <a:t>25.02.21</a:t>
             </a:fld>
             <a:endParaRPr lang="en-CH"/>
           </a:p>
@@ -475,7 +475,7 @@
           <a:p>
             <a:fld id="{076CEB0B-9A46-6E4F-A893-3E4C3C2FD4BF}" type="datetimeFigureOut">
               <a:rPr lang="en-CH" smtClean="0"/>
-              <a:t>22.02.21</a:t>
+              <a:t>25.02.21</a:t>
             </a:fld>
             <a:endParaRPr lang="en-CH"/>
           </a:p>
@@ -685,7 +685,7 @@
           <a:p>
             <a:fld id="{076CEB0B-9A46-6E4F-A893-3E4C3C2FD4BF}" type="datetimeFigureOut">
               <a:rPr lang="en-CH" smtClean="0"/>
-              <a:t>22.02.21</a:t>
+              <a:t>25.02.21</a:t>
             </a:fld>
             <a:endParaRPr lang="en-CH"/>
           </a:p>
@@ -885,7 +885,7 @@
           <a:p>
             <a:fld id="{076CEB0B-9A46-6E4F-A893-3E4C3C2FD4BF}" type="datetimeFigureOut">
               <a:rPr lang="en-CH" smtClean="0"/>
-              <a:t>22.02.21</a:t>
+              <a:t>25.02.21</a:t>
             </a:fld>
             <a:endParaRPr lang="en-CH"/>
           </a:p>
@@ -1161,7 +1161,7 @@
           <a:p>
             <a:fld id="{076CEB0B-9A46-6E4F-A893-3E4C3C2FD4BF}" type="datetimeFigureOut">
               <a:rPr lang="en-CH" smtClean="0"/>
-              <a:t>22.02.21</a:t>
+              <a:t>25.02.21</a:t>
             </a:fld>
             <a:endParaRPr lang="en-CH"/>
           </a:p>
@@ -1429,7 +1429,7 @@
           <a:p>
             <a:fld id="{076CEB0B-9A46-6E4F-A893-3E4C3C2FD4BF}" type="datetimeFigureOut">
               <a:rPr lang="en-CH" smtClean="0"/>
-              <a:t>22.02.21</a:t>
+              <a:t>25.02.21</a:t>
             </a:fld>
             <a:endParaRPr lang="en-CH"/>
           </a:p>
@@ -1844,7 +1844,7 @@
           <a:p>
             <a:fld id="{076CEB0B-9A46-6E4F-A893-3E4C3C2FD4BF}" type="datetimeFigureOut">
               <a:rPr lang="en-CH" smtClean="0"/>
-              <a:t>22.02.21</a:t>
+              <a:t>25.02.21</a:t>
             </a:fld>
             <a:endParaRPr lang="en-CH"/>
           </a:p>
@@ -1986,7 +1986,7 @@
           <a:p>
             <a:fld id="{076CEB0B-9A46-6E4F-A893-3E4C3C2FD4BF}" type="datetimeFigureOut">
               <a:rPr lang="en-CH" smtClean="0"/>
-              <a:t>22.02.21</a:t>
+              <a:t>25.02.21</a:t>
             </a:fld>
             <a:endParaRPr lang="en-CH"/>
           </a:p>
@@ -2099,7 +2099,7 @@
           <a:p>
             <a:fld id="{076CEB0B-9A46-6E4F-A893-3E4C3C2FD4BF}" type="datetimeFigureOut">
               <a:rPr lang="en-CH" smtClean="0"/>
-              <a:t>22.02.21</a:t>
+              <a:t>25.02.21</a:t>
             </a:fld>
             <a:endParaRPr lang="en-CH"/>
           </a:p>
@@ -2412,7 +2412,7 @@
           <a:p>
             <a:fld id="{076CEB0B-9A46-6E4F-A893-3E4C3C2FD4BF}" type="datetimeFigureOut">
               <a:rPr lang="en-CH" smtClean="0"/>
-              <a:t>22.02.21</a:t>
+              <a:t>25.02.21</a:t>
             </a:fld>
             <a:endParaRPr lang="en-CH"/>
           </a:p>
@@ -2701,7 +2701,7 @@
           <a:p>
             <a:fld id="{076CEB0B-9A46-6E4F-A893-3E4C3C2FD4BF}" type="datetimeFigureOut">
               <a:rPr lang="en-CH" smtClean="0"/>
-              <a:t>22.02.21</a:t>
+              <a:t>25.02.21</a:t>
             </a:fld>
             <a:endParaRPr lang="en-CH"/>
           </a:p>
@@ -2944,7 +2944,7 @@
           <a:p>
             <a:fld id="{076CEB0B-9A46-6E4F-A893-3E4C3C2FD4BF}" type="datetimeFigureOut">
               <a:rPr lang="en-CH" smtClean="0"/>
-              <a:t>22.02.21</a:t>
+              <a:t>25.02.21</a:t>
             </a:fld>
             <a:endParaRPr lang="en-CH"/>
           </a:p>
@@ -4710,7 +4710,7 @@
           <p:nvPr>
             <p:extLst>
               <p:ext uri="{D42A27DB-BD31-4B8C-83A1-F6EECF244321}">
-                <p14:modId xmlns:p14="http://schemas.microsoft.com/office/powerpoint/2010/main" val="2179076646"/>
+                <p14:modId xmlns:p14="http://schemas.microsoft.com/office/powerpoint/2010/main" val="2214945989"/>
               </p:ext>
             </p:extLst>
           </p:nvPr>
@@ -5049,7 +5049,11 @@
                     <a:lstStyle/>
                     <a:p>
                       <a:r>
-                        <a:rPr lang="en-CH" sz="1400" dirty="0"/>
+                        <a:rPr lang="en-CH" sz="1400" dirty="0">
+                          <a:highlight>
+                            <a:srgbClr val="00FF00"/>
+                          </a:highlight>
+                        </a:rPr>
                         <a:t>Gross National Income per capita in purchasing power parities (GNI,ppp)</a:t>
                       </a:r>
                     </a:p>
@@ -5305,7 +5309,11 @@
                     <a:lstStyle/>
                     <a:p>
                       <a:r>
-                        <a:rPr lang="en-CH" sz="1400" dirty="0"/>
+                        <a:rPr lang="en-CH" sz="1400" dirty="0">
+                          <a:highlight>
+                            <a:srgbClr val="00FF00"/>
+                          </a:highlight>
+                        </a:rPr>
                         <a:t>Government Effectiveness Indicator (GEI)</a:t>
                       </a:r>
                     </a:p>

</xml_diff>

<commit_message>
updating list of datasets done in the pptx file
</commit_message>
<xml_diff>
--- a/Projects/M3/Project.pptx
+++ b/Projects/M3/Project.pptx
@@ -4710,7 +4710,7 @@
           <p:nvPr>
             <p:extLst>
               <p:ext uri="{D42A27DB-BD31-4B8C-83A1-F6EECF244321}">
-                <p14:modId xmlns:p14="http://schemas.microsoft.com/office/powerpoint/2010/main" val="2214945989"/>
+                <p14:modId xmlns:p14="http://schemas.microsoft.com/office/powerpoint/2010/main" val="3462273176"/>
               </p:ext>
             </p:extLst>
           </p:nvPr>
@@ -5173,7 +5173,11 @@
                     <a:lstStyle/>
                     <a:p>
                       <a:r>
-                        <a:rPr lang="en-CH" sz="1400" dirty="0"/>
+                        <a:rPr lang="en-CH" sz="1400" dirty="0">
+                          <a:highlight>
+                            <a:srgbClr val="00FF00"/>
+                          </a:highlight>
+                        </a:rPr>
                         <a:t>Corruption Perception Index (CPI)</a:t>
                       </a:r>
                     </a:p>
@@ -5529,8 +5533,16 @@
                     <a:lstStyle/>
                     <a:p>
                       <a:r>
-                        <a:rPr lang="en-CH" sz="1400" dirty="0"/>
-                        <a:t>Politics right Index (PRI)</a:t>
+                        <a:rPr lang="en-CH" sz="1400" dirty="0">
+                          <a:highlight>
+                            <a:srgbClr val="00FF00"/>
+                          </a:highlight>
+                        </a:rPr>
+                        <a:t>Politics right Index (PRI</a:t>
+                      </a:r>
+                      <a:r>
+                        <a:rPr lang="en-CH" sz="1400" dirty="0"/>
+                        <a:t>)</a:t>
                       </a:r>
                     </a:p>
                   </a:txBody>
@@ -5649,7 +5661,7 @@
                         <a:defRPr/>
                       </a:pPr>
                       <a:r>
-                        <a:rPr kumimoji="0" lang="en-CH" sz="1400" b="0" i="0" u="none" strike="noStrike" kern="1200" cap="none" spc="0" normalizeH="0" baseline="0" noProof="0">
+                        <a:rPr kumimoji="0" lang="en-CH" sz="1400" b="0" i="0" u="none" strike="noStrike" kern="1200" cap="none" spc="0" normalizeH="0" baseline="0" noProof="0" dirty="0">
                           <a:ln>
                             <a:noFill/>
                           </a:ln>
@@ -5665,20 +5677,6 @@
                         </a:rPr>
                         <a:t>Ruben/Valeria</a:t>
                       </a:r>
-                      <a:endParaRPr kumimoji="0" lang="en-CH" sz="1400" b="0" i="0" u="none" strike="noStrike" kern="1200" cap="none" spc="0" normalizeH="0" baseline="0" noProof="0" dirty="0">
-                        <a:ln>
-                          <a:noFill/>
-                        </a:ln>
-                        <a:solidFill>
-                          <a:prstClr val="black"/>
-                        </a:solidFill>
-                        <a:effectLst/>
-                        <a:uLnTx/>
-                        <a:uFillTx/>
-                        <a:latin typeface="Calibri" panose="020F0502020204030204"/>
-                        <a:ea typeface="+mn-ea"/>
-                        <a:cs typeface="+mn-cs"/>
-                      </a:endParaRPr>
                     </a:p>
                   </a:txBody>
                   <a:tcPr/>

</xml_diff>

<commit_message>
update list of datasets done in the pptx file
</commit_message>
<xml_diff>
--- a/Projects/M3/Project.pptx
+++ b/Projects/M3/Project.pptx
@@ -4710,7 +4710,7 @@
           <p:nvPr>
             <p:extLst>
               <p:ext uri="{D42A27DB-BD31-4B8C-83A1-F6EECF244321}">
-                <p14:modId xmlns:p14="http://schemas.microsoft.com/office/powerpoint/2010/main" val="3462273176"/>
+                <p14:modId xmlns:p14="http://schemas.microsoft.com/office/powerpoint/2010/main" val="2964521514"/>
               </p:ext>
             </p:extLst>
           </p:nvPr>
@@ -5716,7 +5716,11 @@
                     <a:lstStyle/>
                     <a:p>
                       <a:r>
-                        <a:rPr lang="en-CH" sz="1400" dirty="0"/>
+                        <a:rPr lang="en-CH" sz="1400" dirty="0">
+                          <a:highlight>
+                            <a:srgbClr val="00FF00"/>
+                          </a:highlight>
+                        </a:rPr>
                         <a:t>Civil Liberties index</a:t>
                       </a:r>
                     </a:p>
@@ -5937,7 +5941,7 @@
           <p:nvPr>
             <p:extLst>
               <p:ext uri="{D42A27DB-BD31-4B8C-83A1-F6EECF244321}">
-                <p14:modId xmlns:p14="http://schemas.microsoft.com/office/powerpoint/2010/main" val="4026441900"/>
+                <p14:modId xmlns:p14="http://schemas.microsoft.com/office/powerpoint/2010/main" val="1497812245"/>
               </p:ext>
             </p:extLst>
           </p:nvPr>
@@ -6818,7 +6822,11 @@
                     <a:lstStyle/>
                     <a:p>
                       <a:r>
-                        <a:rPr lang="en-CH" sz="1400" dirty="0"/>
+                        <a:rPr lang="en-CH" sz="1400" dirty="0">
+                          <a:highlight>
+                            <a:srgbClr val="00FF00"/>
+                          </a:highlight>
+                        </a:rPr>
                         <a:t>Economic Group</a:t>
                       </a:r>
                     </a:p>
@@ -7230,7 +7238,7 @@
           <p:nvPr>
             <p:extLst>
               <p:ext uri="{D42A27DB-BD31-4B8C-83A1-F6EECF244321}">
-                <p14:modId xmlns:p14="http://schemas.microsoft.com/office/powerpoint/2010/main" val="1011497588"/>
+                <p14:modId xmlns:p14="http://schemas.microsoft.com/office/powerpoint/2010/main" val="738300643"/>
               </p:ext>
             </p:extLst>
           </p:nvPr>
@@ -7899,7 +7907,11 @@
                     <a:lstStyle/>
                     <a:p>
                       <a:r>
-                        <a:rPr lang="en-CH" sz="1400" dirty="0"/>
+                        <a:rPr lang="en-CH" sz="1400" dirty="0">
+                          <a:highlight>
+                            <a:srgbClr val="00FF00"/>
+                          </a:highlight>
+                        </a:rPr>
                         <a:t>Geographical regions</a:t>
                       </a:r>
                     </a:p>

</xml_diff>

<commit_message>
End of Valeria's part on the Revolution file.
</commit_message>
<xml_diff>
--- a/Projects/M3/Project.pptx
+++ b/Projects/M3/Project.pptx
@@ -4710,7 +4710,7 @@
           <p:nvPr>
             <p:extLst>
               <p:ext uri="{D42A27DB-BD31-4B8C-83A1-F6EECF244321}">
-                <p14:modId xmlns:p14="http://schemas.microsoft.com/office/powerpoint/2010/main" val="2964521514"/>
+                <p14:modId xmlns:p14="http://schemas.microsoft.com/office/powerpoint/2010/main" val="2214945989"/>
               </p:ext>
             </p:extLst>
           </p:nvPr>
@@ -5173,11 +5173,7 @@
                     <a:lstStyle/>
                     <a:p>
                       <a:r>
-                        <a:rPr lang="en-CH" sz="1400" dirty="0">
-                          <a:highlight>
-                            <a:srgbClr val="00FF00"/>
-                          </a:highlight>
-                        </a:rPr>
+                        <a:rPr lang="en-CH" sz="1400" dirty="0"/>
                         <a:t>Corruption Perception Index (CPI)</a:t>
                       </a:r>
                     </a:p>
@@ -5533,16 +5529,8 @@
                     <a:lstStyle/>
                     <a:p>
                       <a:r>
-                        <a:rPr lang="en-CH" sz="1400" dirty="0">
-                          <a:highlight>
-                            <a:srgbClr val="00FF00"/>
-                          </a:highlight>
-                        </a:rPr>
-                        <a:t>Politics right Index (PRI</a:t>
-                      </a:r>
-                      <a:r>
-                        <a:rPr lang="en-CH" sz="1400" dirty="0"/>
-                        <a:t>)</a:t>
+                        <a:rPr lang="en-CH" sz="1400" dirty="0"/>
+                        <a:t>Politics right Index (PRI)</a:t>
                       </a:r>
                     </a:p>
                   </a:txBody>
@@ -5661,7 +5649,7 @@
                         <a:defRPr/>
                       </a:pPr>
                       <a:r>
-                        <a:rPr kumimoji="0" lang="en-CH" sz="1400" b="0" i="0" u="none" strike="noStrike" kern="1200" cap="none" spc="0" normalizeH="0" baseline="0" noProof="0" dirty="0">
+                        <a:rPr kumimoji="0" lang="en-CH" sz="1400" b="0" i="0" u="none" strike="noStrike" kern="1200" cap="none" spc="0" normalizeH="0" baseline="0" noProof="0">
                           <a:ln>
                             <a:noFill/>
                           </a:ln>
@@ -5677,6 +5665,20 @@
                         </a:rPr>
                         <a:t>Ruben/Valeria</a:t>
                       </a:r>
+                      <a:endParaRPr kumimoji="0" lang="en-CH" sz="1400" b="0" i="0" u="none" strike="noStrike" kern="1200" cap="none" spc="0" normalizeH="0" baseline="0" noProof="0" dirty="0">
+                        <a:ln>
+                          <a:noFill/>
+                        </a:ln>
+                        <a:solidFill>
+                          <a:prstClr val="black"/>
+                        </a:solidFill>
+                        <a:effectLst/>
+                        <a:uLnTx/>
+                        <a:uFillTx/>
+                        <a:latin typeface="Calibri" panose="020F0502020204030204"/>
+                        <a:ea typeface="+mn-ea"/>
+                        <a:cs typeface="+mn-cs"/>
+                      </a:endParaRPr>
                     </a:p>
                   </a:txBody>
                   <a:tcPr/>
@@ -5716,11 +5718,7 @@
                     <a:lstStyle/>
                     <a:p>
                       <a:r>
-                        <a:rPr lang="en-CH" sz="1400" dirty="0">
-                          <a:highlight>
-                            <a:srgbClr val="00FF00"/>
-                          </a:highlight>
-                        </a:rPr>
+                        <a:rPr lang="en-CH" sz="1400" dirty="0"/>
                         <a:t>Civil Liberties index</a:t>
                       </a:r>
                     </a:p>
@@ -5941,7 +5939,7 @@
           <p:nvPr>
             <p:extLst>
               <p:ext uri="{D42A27DB-BD31-4B8C-83A1-F6EECF244321}">
-                <p14:modId xmlns:p14="http://schemas.microsoft.com/office/powerpoint/2010/main" val="1497812245"/>
+                <p14:modId xmlns:p14="http://schemas.microsoft.com/office/powerpoint/2010/main" val="4026441900"/>
               </p:ext>
             </p:extLst>
           </p:nvPr>
@@ -6822,11 +6820,7 @@
                     <a:lstStyle/>
                     <a:p>
                       <a:r>
-                        <a:rPr lang="en-CH" sz="1400" dirty="0">
-                          <a:highlight>
-                            <a:srgbClr val="00FF00"/>
-                          </a:highlight>
-                        </a:rPr>
+                        <a:rPr lang="en-CH" sz="1400" dirty="0"/>
                         <a:t>Economic Group</a:t>
                       </a:r>
                     </a:p>
@@ -7238,7 +7232,7 @@
           <p:nvPr>
             <p:extLst>
               <p:ext uri="{D42A27DB-BD31-4B8C-83A1-F6EECF244321}">
-                <p14:modId xmlns:p14="http://schemas.microsoft.com/office/powerpoint/2010/main" val="738300643"/>
+                <p14:modId xmlns:p14="http://schemas.microsoft.com/office/powerpoint/2010/main" val="1011497588"/>
               </p:ext>
             </p:extLst>
           </p:nvPr>
@@ -7907,11 +7901,7 @@
                     <a:lstStyle/>
                     <a:p>
                       <a:r>
-                        <a:rPr lang="en-CH" sz="1400" dirty="0">
-                          <a:highlight>
-                            <a:srgbClr val="00FF00"/>
-                          </a:highlight>
-                        </a:rPr>
+                        <a:rPr lang="en-CH" sz="1400" dirty="0"/>
                         <a:t>Geographical regions</a:t>
                       </a:r>
                     </a:p>

</xml_diff>